<commit_message>
Adds Qs 25,26,27 and answers
</commit_message>
<xml_diff>
--- a/ISTQB Foundation Level Preparation.pptx
+++ b/ISTQB Foundation Level Preparation.pptx
@@ -69,21 +69,27 @@
     <p:sldId id="314" r:id="rId65"/>
     <p:sldId id="315" r:id="rId66"/>
     <p:sldId id="316" r:id="rId67"/>
+    <p:sldId id="317" r:id="rId68"/>
+    <p:sldId id="318" r:id="rId69"/>
+    <p:sldId id="319" r:id="rId70"/>
+    <p:sldId id="320" r:id="rId71"/>
+    <p:sldId id="321" r:id="rId72"/>
+    <p:sldId id="322" r:id="rId73"/>
   </p:sldIdLst>
   <p:sldSz cy="5143500" cx="9144000"/>
   <p:notesSz cx="6858000" cy="9144000"/>
   <p:embeddedFontLst>
     <p:embeddedFont>
       <p:font typeface="PT Sans Narrow"/>
-      <p:regular r:id="rId68"/>
-      <p:bold r:id="rId69"/>
+      <p:regular r:id="rId74"/>
+      <p:bold r:id="rId75"/>
     </p:embeddedFont>
     <p:embeddedFont>
       <p:font typeface="Open Sans"/>
-      <p:regular r:id="rId70"/>
-      <p:bold r:id="rId71"/>
-      <p:italic r:id="rId72"/>
-      <p:boldItalic r:id="rId73"/>
+      <p:regular r:id="rId76"/>
+      <p:bold r:id="rId77"/>
+      <p:italic r:id="rId78"/>
+      <p:boldItalic r:id="rId79"/>
     </p:embeddedFont>
   </p:embeddedFontLst>
   <p:defaultTextStyle>
@@ -6458,6 +6464,600 @@
       <p:sp>
         <p:nvSpPr>
           <p:cNvPr id="423" name="Google Shape;423;g2f13a2c1d0d_4_40:notes"/>
+          <p:cNvSpPr txBox="1"/>
+          <p:nvPr>
+            <p:ph idx="1" type="body"/>
+          </p:nvPr>
+        </p:nvSpPr>
+        <p:spPr>
+          <a:xfrm>
+            <a:off x="685800" y="4343400"/>
+            <a:ext cx="5486400" cy="4114800"/>
+          </a:xfrm>
+          <a:prstGeom prst="rect">
+            <a:avLst/>
+          </a:prstGeom>
+        </p:spPr>
+        <p:txBody>
+          <a:bodyPr anchorCtr="0" anchor="t" bIns="91425" lIns="91425" spcFirstLastPara="1" rIns="91425" wrap="square" tIns="91425">
+            <a:noAutofit/>
+          </a:bodyPr>
+          <a:lstStyle/>
+          <a:p>
+            <a:pPr indent="0" lvl="0" marL="0" rtl="0" algn="l">
+              <a:spcBef>
+                <a:spcPts val="0"/>
+              </a:spcBef>
+              <a:spcAft>
+                <a:spcPts val="0"/>
+              </a:spcAft>
+              <a:buNone/>
+            </a:pPr>
+            <a:r>
+              <a:t/>
+            </a:r>
+            <a:endParaRPr/>
+          </a:p>
+        </p:txBody>
+      </p:sp>
+    </p:spTree>
+  </p:cSld>
+  <p:clrMapOvr>
+    <a:masterClrMapping/>
+  </p:clrMapOvr>
+</p:notes>
+</file>
+
+<file path=ppt/notesSlides/notesSlide62.xml><?xml version="1.0" encoding="utf-8"?>
+<p:notes xmlns:a="http://schemas.openxmlformats.org/drawingml/2006/main" xmlns:r="http://schemas.openxmlformats.org/officeDocument/2006/relationships" xmlns:mc="http://schemas.openxmlformats.org/markup-compatibility/2006" xmlns:mv="urn:schemas-microsoft-com:mac:vml" xmlns:p="http://schemas.openxmlformats.org/presentationml/2006/main" xmlns:c="http://schemas.openxmlformats.org/drawingml/2006/chart" xmlns:dgm="http://schemas.openxmlformats.org/drawingml/2006/diagram" xmlns:o="urn:schemas-microsoft-com:office:office" xmlns:v="urn:schemas-microsoft-com:vml" xmlns:pvml="urn:schemas-microsoft-com:office:powerpoint" xmlns:com="http://schemas.openxmlformats.org/drawingml/2006/compatibility" xmlns:p14="http://schemas.microsoft.com/office/powerpoint/2010/main" xmlns:p15="http://schemas.microsoft.com/office/powerpoint/2012/main" xmlns:ahyp="http://schemas.microsoft.com/office/drawing/2018/hyperlinkcolor" showMasterPhAnim="0" showMasterSp="0">
+  <p:cSld>
+    <p:spTree>
+      <p:nvGrpSpPr>
+        <p:cNvPr id="426" name="Shape 426"/>
+        <p:cNvGrpSpPr/>
+        <p:nvPr/>
+      </p:nvGrpSpPr>
+      <p:grpSpPr>
+        <a:xfrm>
+          <a:off x="0" y="0"/>
+          <a:ext cx="0" cy="0"/>
+          <a:chOff x="0" y="0"/>
+          <a:chExt cx="0" cy="0"/>
+        </a:xfrm>
+      </p:grpSpPr>
+      <p:sp>
+        <p:nvSpPr>
+          <p:cNvPr id="427" name="Google Shape;427;g2f13a2c1d0d_4_47:notes"/>
+          <p:cNvSpPr/>
+          <p:nvPr>
+            <p:ph idx="2" type="sldImg"/>
+          </p:nvPr>
+        </p:nvSpPr>
+        <p:spPr>
+          <a:xfrm>
+            <a:off x="381300" y="685800"/>
+            <a:ext cx="6096000" cy="3429000"/>
+          </a:xfrm>
+          <a:custGeom>
+            <a:rect b="b" l="l" r="r" t="t"/>
+            <a:pathLst>
+              <a:path extrusionOk="0" h="120000" w="120000">
+                <a:moveTo>
+                  <a:pt x="0" y="0"/>
+                </a:moveTo>
+                <a:lnTo>
+                  <a:pt x="120000" y="0"/>
+                </a:lnTo>
+                <a:lnTo>
+                  <a:pt x="120000" y="120000"/>
+                </a:lnTo>
+                <a:lnTo>
+                  <a:pt x="0" y="120000"/>
+                </a:lnTo>
+                <a:close/>
+              </a:path>
+            </a:pathLst>
+          </a:custGeom>
+        </p:spPr>
+      </p:sp>
+      <p:sp>
+        <p:nvSpPr>
+          <p:cNvPr id="428" name="Google Shape;428;g2f13a2c1d0d_4_47:notes"/>
+          <p:cNvSpPr txBox="1"/>
+          <p:nvPr>
+            <p:ph idx="1" type="body"/>
+          </p:nvPr>
+        </p:nvSpPr>
+        <p:spPr>
+          <a:xfrm>
+            <a:off x="685800" y="4343400"/>
+            <a:ext cx="5486400" cy="4114800"/>
+          </a:xfrm>
+          <a:prstGeom prst="rect">
+            <a:avLst/>
+          </a:prstGeom>
+        </p:spPr>
+        <p:txBody>
+          <a:bodyPr anchorCtr="0" anchor="t" bIns="91425" lIns="91425" spcFirstLastPara="1" rIns="91425" wrap="square" tIns="91425">
+            <a:noAutofit/>
+          </a:bodyPr>
+          <a:lstStyle/>
+          <a:p>
+            <a:pPr indent="0" lvl="0" marL="0" rtl="0" algn="l">
+              <a:spcBef>
+                <a:spcPts val="0"/>
+              </a:spcBef>
+              <a:spcAft>
+                <a:spcPts val="0"/>
+              </a:spcAft>
+              <a:buNone/>
+            </a:pPr>
+            <a:r>
+              <a:t/>
+            </a:r>
+            <a:endParaRPr/>
+          </a:p>
+        </p:txBody>
+      </p:sp>
+    </p:spTree>
+  </p:cSld>
+  <p:clrMapOvr>
+    <a:masterClrMapping/>
+  </p:clrMapOvr>
+</p:notes>
+</file>
+
+<file path=ppt/notesSlides/notesSlide63.xml><?xml version="1.0" encoding="utf-8"?>
+<p:notes xmlns:a="http://schemas.openxmlformats.org/drawingml/2006/main" xmlns:r="http://schemas.openxmlformats.org/officeDocument/2006/relationships" xmlns:mc="http://schemas.openxmlformats.org/markup-compatibility/2006" xmlns:mv="urn:schemas-microsoft-com:mac:vml" xmlns:p="http://schemas.openxmlformats.org/presentationml/2006/main" xmlns:c="http://schemas.openxmlformats.org/drawingml/2006/chart" xmlns:dgm="http://schemas.openxmlformats.org/drawingml/2006/diagram" xmlns:o="urn:schemas-microsoft-com:office:office" xmlns:v="urn:schemas-microsoft-com:vml" xmlns:pvml="urn:schemas-microsoft-com:office:powerpoint" xmlns:com="http://schemas.openxmlformats.org/drawingml/2006/compatibility" xmlns:p14="http://schemas.microsoft.com/office/powerpoint/2010/main" xmlns:p15="http://schemas.microsoft.com/office/powerpoint/2012/main" xmlns:ahyp="http://schemas.microsoft.com/office/drawing/2018/hyperlinkcolor" showMasterPhAnim="0" showMasterSp="0">
+  <p:cSld>
+    <p:spTree>
+      <p:nvGrpSpPr>
+        <p:cNvPr id="431" name="Shape 431"/>
+        <p:cNvGrpSpPr/>
+        <p:nvPr/>
+      </p:nvGrpSpPr>
+      <p:grpSpPr>
+        <a:xfrm>
+          <a:off x="0" y="0"/>
+          <a:ext cx="0" cy="0"/>
+          <a:chOff x="0" y="0"/>
+          <a:chExt cx="0" cy="0"/>
+        </a:xfrm>
+      </p:grpSpPr>
+      <p:sp>
+        <p:nvSpPr>
+          <p:cNvPr id="432" name="Google Shape;432;g2f13a2c1d0d_4_52:notes"/>
+          <p:cNvSpPr/>
+          <p:nvPr>
+            <p:ph idx="2" type="sldImg"/>
+          </p:nvPr>
+        </p:nvSpPr>
+        <p:spPr>
+          <a:xfrm>
+            <a:off x="381300" y="685800"/>
+            <a:ext cx="6096000" cy="3429000"/>
+          </a:xfrm>
+          <a:custGeom>
+            <a:rect b="b" l="l" r="r" t="t"/>
+            <a:pathLst>
+              <a:path extrusionOk="0" h="120000" w="120000">
+                <a:moveTo>
+                  <a:pt x="0" y="0"/>
+                </a:moveTo>
+                <a:lnTo>
+                  <a:pt x="120000" y="0"/>
+                </a:lnTo>
+                <a:lnTo>
+                  <a:pt x="120000" y="120000"/>
+                </a:lnTo>
+                <a:lnTo>
+                  <a:pt x="0" y="120000"/>
+                </a:lnTo>
+                <a:close/>
+              </a:path>
+            </a:pathLst>
+          </a:custGeom>
+        </p:spPr>
+      </p:sp>
+      <p:sp>
+        <p:nvSpPr>
+          <p:cNvPr id="433" name="Google Shape;433;g2f13a2c1d0d_4_52:notes"/>
+          <p:cNvSpPr txBox="1"/>
+          <p:nvPr>
+            <p:ph idx="1" type="body"/>
+          </p:nvPr>
+        </p:nvSpPr>
+        <p:spPr>
+          <a:xfrm>
+            <a:off x="685800" y="4343400"/>
+            <a:ext cx="5486400" cy="4114800"/>
+          </a:xfrm>
+          <a:prstGeom prst="rect">
+            <a:avLst/>
+          </a:prstGeom>
+        </p:spPr>
+        <p:txBody>
+          <a:bodyPr anchorCtr="0" anchor="t" bIns="91425" lIns="91425" spcFirstLastPara="1" rIns="91425" wrap="square" tIns="91425">
+            <a:noAutofit/>
+          </a:bodyPr>
+          <a:lstStyle/>
+          <a:p>
+            <a:pPr indent="0" lvl="0" marL="0" rtl="0" algn="l">
+              <a:spcBef>
+                <a:spcPts val="0"/>
+              </a:spcBef>
+              <a:spcAft>
+                <a:spcPts val="0"/>
+              </a:spcAft>
+              <a:buNone/>
+            </a:pPr>
+            <a:r>
+              <a:t/>
+            </a:r>
+            <a:endParaRPr/>
+          </a:p>
+        </p:txBody>
+      </p:sp>
+    </p:spTree>
+  </p:cSld>
+  <p:clrMapOvr>
+    <a:masterClrMapping/>
+  </p:clrMapOvr>
+</p:notes>
+</file>
+
+<file path=ppt/notesSlides/notesSlide64.xml><?xml version="1.0" encoding="utf-8"?>
+<p:notes xmlns:a="http://schemas.openxmlformats.org/drawingml/2006/main" xmlns:r="http://schemas.openxmlformats.org/officeDocument/2006/relationships" xmlns:mc="http://schemas.openxmlformats.org/markup-compatibility/2006" xmlns:mv="urn:schemas-microsoft-com:mac:vml" xmlns:p="http://schemas.openxmlformats.org/presentationml/2006/main" xmlns:c="http://schemas.openxmlformats.org/drawingml/2006/chart" xmlns:dgm="http://schemas.openxmlformats.org/drawingml/2006/diagram" xmlns:o="urn:schemas-microsoft-com:office:office" xmlns:v="urn:schemas-microsoft-com:vml" xmlns:pvml="urn:schemas-microsoft-com:office:powerpoint" xmlns:com="http://schemas.openxmlformats.org/drawingml/2006/compatibility" xmlns:p14="http://schemas.microsoft.com/office/powerpoint/2010/main" xmlns:p15="http://schemas.microsoft.com/office/powerpoint/2012/main" xmlns:ahyp="http://schemas.microsoft.com/office/drawing/2018/hyperlinkcolor" showMasterPhAnim="0" showMasterSp="0">
+  <p:cSld>
+    <p:spTree>
+      <p:nvGrpSpPr>
+        <p:cNvPr id="436" name="Shape 436"/>
+        <p:cNvGrpSpPr/>
+        <p:nvPr/>
+      </p:nvGrpSpPr>
+      <p:grpSpPr>
+        <a:xfrm>
+          <a:off x="0" y="0"/>
+          <a:ext cx="0" cy="0"/>
+          <a:chOff x="0" y="0"/>
+          <a:chExt cx="0" cy="0"/>
+        </a:xfrm>
+      </p:grpSpPr>
+      <p:sp>
+        <p:nvSpPr>
+          <p:cNvPr id="437" name="Google Shape;437;g2f13a2c1d0d_4_57:notes"/>
+          <p:cNvSpPr/>
+          <p:nvPr>
+            <p:ph idx="2" type="sldImg"/>
+          </p:nvPr>
+        </p:nvSpPr>
+        <p:spPr>
+          <a:xfrm>
+            <a:off x="381300" y="685800"/>
+            <a:ext cx="6096000" cy="3429000"/>
+          </a:xfrm>
+          <a:custGeom>
+            <a:rect b="b" l="l" r="r" t="t"/>
+            <a:pathLst>
+              <a:path extrusionOk="0" h="120000" w="120000">
+                <a:moveTo>
+                  <a:pt x="0" y="0"/>
+                </a:moveTo>
+                <a:lnTo>
+                  <a:pt x="120000" y="0"/>
+                </a:lnTo>
+                <a:lnTo>
+                  <a:pt x="120000" y="120000"/>
+                </a:lnTo>
+                <a:lnTo>
+                  <a:pt x="0" y="120000"/>
+                </a:lnTo>
+                <a:close/>
+              </a:path>
+            </a:pathLst>
+          </a:custGeom>
+        </p:spPr>
+      </p:sp>
+      <p:sp>
+        <p:nvSpPr>
+          <p:cNvPr id="438" name="Google Shape;438;g2f13a2c1d0d_4_57:notes"/>
+          <p:cNvSpPr txBox="1"/>
+          <p:nvPr>
+            <p:ph idx="1" type="body"/>
+          </p:nvPr>
+        </p:nvSpPr>
+        <p:spPr>
+          <a:xfrm>
+            <a:off x="685800" y="4343400"/>
+            <a:ext cx="5486400" cy="4114800"/>
+          </a:xfrm>
+          <a:prstGeom prst="rect">
+            <a:avLst/>
+          </a:prstGeom>
+        </p:spPr>
+        <p:txBody>
+          <a:bodyPr anchorCtr="0" anchor="t" bIns="91425" lIns="91425" spcFirstLastPara="1" rIns="91425" wrap="square" tIns="91425">
+            <a:noAutofit/>
+          </a:bodyPr>
+          <a:lstStyle/>
+          <a:p>
+            <a:pPr indent="0" lvl="0" marL="0" rtl="0" algn="l">
+              <a:spcBef>
+                <a:spcPts val="0"/>
+              </a:spcBef>
+              <a:spcAft>
+                <a:spcPts val="0"/>
+              </a:spcAft>
+              <a:buNone/>
+            </a:pPr>
+            <a:r>
+              <a:t/>
+            </a:r>
+            <a:endParaRPr/>
+          </a:p>
+        </p:txBody>
+      </p:sp>
+    </p:spTree>
+  </p:cSld>
+  <p:clrMapOvr>
+    <a:masterClrMapping/>
+  </p:clrMapOvr>
+</p:notes>
+</file>
+
+<file path=ppt/notesSlides/notesSlide65.xml><?xml version="1.0" encoding="utf-8"?>
+<p:notes xmlns:a="http://schemas.openxmlformats.org/drawingml/2006/main" xmlns:r="http://schemas.openxmlformats.org/officeDocument/2006/relationships" xmlns:mc="http://schemas.openxmlformats.org/markup-compatibility/2006" xmlns:mv="urn:schemas-microsoft-com:mac:vml" xmlns:p="http://schemas.openxmlformats.org/presentationml/2006/main" xmlns:c="http://schemas.openxmlformats.org/drawingml/2006/chart" xmlns:dgm="http://schemas.openxmlformats.org/drawingml/2006/diagram" xmlns:o="urn:schemas-microsoft-com:office:office" xmlns:v="urn:schemas-microsoft-com:vml" xmlns:pvml="urn:schemas-microsoft-com:office:powerpoint" xmlns:com="http://schemas.openxmlformats.org/drawingml/2006/compatibility" xmlns:p14="http://schemas.microsoft.com/office/powerpoint/2010/main" xmlns:p15="http://schemas.microsoft.com/office/powerpoint/2012/main" xmlns:ahyp="http://schemas.microsoft.com/office/drawing/2018/hyperlinkcolor" showMasterPhAnim="0" showMasterSp="0">
+  <p:cSld>
+    <p:spTree>
+      <p:nvGrpSpPr>
+        <p:cNvPr id="441" name="Shape 441"/>
+        <p:cNvGrpSpPr/>
+        <p:nvPr/>
+      </p:nvGrpSpPr>
+      <p:grpSpPr>
+        <a:xfrm>
+          <a:off x="0" y="0"/>
+          <a:ext cx="0" cy="0"/>
+          <a:chOff x="0" y="0"/>
+          <a:chExt cx="0" cy="0"/>
+        </a:xfrm>
+      </p:grpSpPr>
+      <p:sp>
+        <p:nvSpPr>
+          <p:cNvPr id="442" name="Google Shape;442;g2f13a2c1d0d_4_62:notes"/>
+          <p:cNvSpPr/>
+          <p:nvPr>
+            <p:ph idx="2" type="sldImg"/>
+          </p:nvPr>
+        </p:nvSpPr>
+        <p:spPr>
+          <a:xfrm>
+            <a:off x="381300" y="685800"/>
+            <a:ext cx="6096000" cy="3429000"/>
+          </a:xfrm>
+          <a:custGeom>
+            <a:rect b="b" l="l" r="r" t="t"/>
+            <a:pathLst>
+              <a:path extrusionOk="0" h="120000" w="120000">
+                <a:moveTo>
+                  <a:pt x="0" y="0"/>
+                </a:moveTo>
+                <a:lnTo>
+                  <a:pt x="120000" y="0"/>
+                </a:lnTo>
+                <a:lnTo>
+                  <a:pt x="120000" y="120000"/>
+                </a:lnTo>
+                <a:lnTo>
+                  <a:pt x="0" y="120000"/>
+                </a:lnTo>
+                <a:close/>
+              </a:path>
+            </a:pathLst>
+          </a:custGeom>
+        </p:spPr>
+      </p:sp>
+      <p:sp>
+        <p:nvSpPr>
+          <p:cNvPr id="443" name="Google Shape;443;g2f13a2c1d0d_4_62:notes"/>
+          <p:cNvSpPr txBox="1"/>
+          <p:nvPr>
+            <p:ph idx="1" type="body"/>
+          </p:nvPr>
+        </p:nvSpPr>
+        <p:spPr>
+          <a:xfrm>
+            <a:off x="685800" y="4343400"/>
+            <a:ext cx="5486400" cy="4114800"/>
+          </a:xfrm>
+          <a:prstGeom prst="rect">
+            <a:avLst/>
+          </a:prstGeom>
+        </p:spPr>
+        <p:txBody>
+          <a:bodyPr anchorCtr="0" anchor="t" bIns="91425" lIns="91425" spcFirstLastPara="1" rIns="91425" wrap="square" tIns="91425">
+            <a:noAutofit/>
+          </a:bodyPr>
+          <a:lstStyle/>
+          <a:p>
+            <a:pPr indent="0" lvl="0" marL="0" rtl="0" algn="l">
+              <a:spcBef>
+                <a:spcPts val="0"/>
+              </a:spcBef>
+              <a:spcAft>
+                <a:spcPts val="0"/>
+              </a:spcAft>
+              <a:buNone/>
+            </a:pPr>
+            <a:r>
+              <a:t/>
+            </a:r>
+            <a:endParaRPr/>
+          </a:p>
+        </p:txBody>
+      </p:sp>
+    </p:spTree>
+  </p:cSld>
+  <p:clrMapOvr>
+    <a:masterClrMapping/>
+  </p:clrMapOvr>
+</p:notes>
+</file>
+
+<file path=ppt/notesSlides/notesSlide66.xml><?xml version="1.0" encoding="utf-8"?>
+<p:notes xmlns:a="http://schemas.openxmlformats.org/drawingml/2006/main" xmlns:r="http://schemas.openxmlformats.org/officeDocument/2006/relationships" xmlns:mc="http://schemas.openxmlformats.org/markup-compatibility/2006" xmlns:mv="urn:schemas-microsoft-com:mac:vml" xmlns:p="http://schemas.openxmlformats.org/presentationml/2006/main" xmlns:c="http://schemas.openxmlformats.org/drawingml/2006/chart" xmlns:dgm="http://schemas.openxmlformats.org/drawingml/2006/diagram" xmlns:o="urn:schemas-microsoft-com:office:office" xmlns:v="urn:schemas-microsoft-com:vml" xmlns:pvml="urn:schemas-microsoft-com:office:powerpoint" xmlns:com="http://schemas.openxmlformats.org/drawingml/2006/compatibility" xmlns:p14="http://schemas.microsoft.com/office/powerpoint/2010/main" xmlns:p15="http://schemas.microsoft.com/office/powerpoint/2012/main" xmlns:ahyp="http://schemas.microsoft.com/office/drawing/2018/hyperlinkcolor" showMasterPhAnim="0" showMasterSp="0">
+  <p:cSld>
+    <p:spTree>
+      <p:nvGrpSpPr>
+        <p:cNvPr id="446" name="Shape 446"/>
+        <p:cNvGrpSpPr/>
+        <p:nvPr/>
+      </p:nvGrpSpPr>
+      <p:grpSpPr>
+        <a:xfrm>
+          <a:off x="0" y="0"/>
+          <a:ext cx="0" cy="0"/>
+          <a:chOff x="0" y="0"/>
+          <a:chExt cx="0" cy="0"/>
+        </a:xfrm>
+      </p:grpSpPr>
+      <p:sp>
+        <p:nvSpPr>
+          <p:cNvPr id="447" name="Google Shape;447;g2f13a2c1d0d_4_67:notes"/>
+          <p:cNvSpPr/>
+          <p:nvPr>
+            <p:ph idx="2" type="sldImg"/>
+          </p:nvPr>
+        </p:nvSpPr>
+        <p:spPr>
+          <a:xfrm>
+            <a:off x="381300" y="685800"/>
+            <a:ext cx="6096000" cy="3429000"/>
+          </a:xfrm>
+          <a:custGeom>
+            <a:rect b="b" l="l" r="r" t="t"/>
+            <a:pathLst>
+              <a:path extrusionOk="0" h="120000" w="120000">
+                <a:moveTo>
+                  <a:pt x="0" y="0"/>
+                </a:moveTo>
+                <a:lnTo>
+                  <a:pt x="120000" y="0"/>
+                </a:lnTo>
+                <a:lnTo>
+                  <a:pt x="120000" y="120000"/>
+                </a:lnTo>
+                <a:lnTo>
+                  <a:pt x="0" y="120000"/>
+                </a:lnTo>
+                <a:close/>
+              </a:path>
+            </a:pathLst>
+          </a:custGeom>
+        </p:spPr>
+      </p:sp>
+      <p:sp>
+        <p:nvSpPr>
+          <p:cNvPr id="448" name="Google Shape;448;g2f13a2c1d0d_4_67:notes"/>
+          <p:cNvSpPr txBox="1"/>
+          <p:nvPr>
+            <p:ph idx="1" type="body"/>
+          </p:nvPr>
+        </p:nvSpPr>
+        <p:spPr>
+          <a:xfrm>
+            <a:off x="685800" y="4343400"/>
+            <a:ext cx="5486400" cy="4114800"/>
+          </a:xfrm>
+          <a:prstGeom prst="rect">
+            <a:avLst/>
+          </a:prstGeom>
+        </p:spPr>
+        <p:txBody>
+          <a:bodyPr anchorCtr="0" anchor="t" bIns="91425" lIns="91425" spcFirstLastPara="1" rIns="91425" wrap="square" tIns="91425">
+            <a:noAutofit/>
+          </a:bodyPr>
+          <a:lstStyle/>
+          <a:p>
+            <a:pPr indent="0" lvl="0" marL="0" rtl="0" algn="l">
+              <a:spcBef>
+                <a:spcPts val="0"/>
+              </a:spcBef>
+              <a:spcAft>
+                <a:spcPts val="0"/>
+              </a:spcAft>
+              <a:buNone/>
+            </a:pPr>
+            <a:r>
+              <a:t/>
+            </a:r>
+            <a:endParaRPr/>
+          </a:p>
+        </p:txBody>
+      </p:sp>
+    </p:spTree>
+  </p:cSld>
+  <p:clrMapOvr>
+    <a:masterClrMapping/>
+  </p:clrMapOvr>
+</p:notes>
+</file>
+
+<file path=ppt/notesSlides/notesSlide67.xml><?xml version="1.0" encoding="utf-8"?>
+<p:notes xmlns:a="http://schemas.openxmlformats.org/drawingml/2006/main" xmlns:r="http://schemas.openxmlformats.org/officeDocument/2006/relationships" xmlns:mc="http://schemas.openxmlformats.org/markup-compatibility/2006" xmlns:mv="urn:schemas-microsoft-com:mac:vml" xmlns:p="http://schemas.openxmlformats.org/presentationml/2006/main" xmlns:c="http://schemas.openxmlformats.org/drawingml/2006/chart" xmlns:dgm="http://schemas.openxmlformats.org/drawingml/2006/diagram" xmlns:o="urn:schemas-microsoft-com:office:office" xmlns:v="urn:schemas-microsoft-com:vml" xmlns:pvml="urn:schemas-microsoft-com:office:powerpoint" xmlns:com="http://schemas.openxmlformats.org/drawingml/2006/compatibility" xmlns:p14="http://schemas.microsoft.com/office/powerpoint/2010/main" xmlns:p15="http://schemas.microsoft.com/office/powerpoint/2012/main" xmlns:ahyp="http://schemas.microsoft.com/office/drawing/2018/hyperlinkcolor" showMasterPhAnim="0" showMasterSp="0">
+  <p:cSld>
+    <p:spTree>
+      <p:nvGrpSpPr>
+        <p:cNvPr id="451" name="Shape 451"/>
+        <p:cNvGrpSpPr/>
+        <p:nvPr/>
+      </p:nvGrpSpPr>
+      <p:grpSpPr>
+        <a:xfrm>
+          <a:off x="0" y="0"/>
+          <a:ext cx="0" cy="0"/>
+          <a:chOff x="0" y="0"/>
+          <a:chExt cx="0" cy="0"/>
+        </a:xfrm>
+      </p:grpSpPr>
+      <p:sp>
+        <p:nvSpPr>
+          <p:cNvPr id="452" name="Google Shape;452;g2f13a2c1d0d_4_72:notes"/>
+          <p:cNvSpPr/>
+          <p:nvPr>
+            <p:ph idx="2" type="sldImg"/>
+          </p:nvPr>
+        </p:nvSpPr>
+        <p:spPr>
+          <a:xfrm>
+            <a:off x="381300" y="685800"/>
+            <a:ext cx="6096000" cy="3429000"/>
+          </a:xfrm>
+          <a:custGeom>
+            <a:rect b="b" l="l" r="r" t="t"/>
+            <a:pathLst>
+              <a:path extrusionOk="0" h="120000" w="120000">
+                <a:moveTo>
+                  <a:pt x="0" y="0"/>
+                </a:moveTo>
+                <a:lnTo>
+                  <a:pt x="120000" y="0"/>
+                </a:lnTo>
+                <a:lnTo>
+                  <a:pt x="120000" y="120000"/>
+                </a:lnTo>
+                <a:lnTo>
+                  <a:pt x="0" y="120000"/>
+                </a:lnTo>
+                <a:close/>
+              </a:path>
+            </a:pathLst>
+          </a:custGeom>
+        </p:spPr>
+      </p:sp>
+      <p:sp>
+        <p:nvSpPr>
+          <p:cNvPr id="453" name="Google Shape;453;g2f13a2c1d0d_4_72:notes"/>
           <p:cNvSpPr txBox="1"/>
           <p:nvPr>
             <p:ph idx="1" type="body"/>
@@ -19041,7 +19641,7 @@
             <a:tbl>
               <a:tblPr>
                 <a:noFill/>
-                <a:tableStyleId>{7E9CDAC2-F0DF-485C-ADB0-ED5493A748C1}</a:tableStyleId>
+                <a:tableStyleId>{7559F03E-C012-4ECB-87B2-DC20DBBFA527}</a:tableStyleId>
               </a:tblPr>
               <a:tblGrid>
                 <a:gridCol w="5713925"/>
@@ -25259,6 +25859,1003 @@
 </p:sld>
 </file>
 
+<file path=ppt/slides/slide62.xml><?xml version="1.0" encoding="utf-8"?>
+<p:sld xmlns:a="http://schemas.openxmlformats.org/drawingml/2006/main" xmlns:r="http://schemas.openxmlformats.org/officeDocument/2006/relationships" xmlns:mc="http://schemas.openxmlformats.org/markup-compatibility/2006" xmlns:mv="urn:schemas-microsoft-com:mac:vml" xmlns:p="http://schemas.openxmlformats.org/presentationml/2006/main" xmlns:c="http://schemas.openxmlformats.org/drawingml/2006/chart" xmlns:dgm="http://schemas.openxmlformats.org/drawingml/2006/diagram" xmlns:o="urn:schemas-microsoft-com:office:office" xmlns:v="urn:schemas-microsoft-com:vml" xmlns:pvml="urn:schemas-microsoft-com:office:powerpoint" xmlns:com="http://schemas.openxmlformats.org/drawingml/2006/compatibility" xmlns:p14="http://schemas.microsoft.com/office/powerpoint/2010/main" xmlns:p15="http://schemas.microsoft.com/office/powerpoint/2012/main" xmlns:ahyp="http://schemas.microsoft.com/office/drawing/2018/hyperlinkcolor">
+  <p:cSld>
+    <p:spTree>
+      <p:nvGrpSpPr>
+        <p:cNvPr id="429" name="Shape 429"/>
+        <p:cNvGrpSpPr/>
+        <p:nvPr/>
+      </p:nvGrpSpPr>
+      <p:grpSpPr>
+        <a:xfrm>
+          <a:off x="0" y="0"/>
+          <a:ext cx="0" cy="0"/>
+          <a:chOff x="0" y="0"/>
+          <a:chExt cx="0" cy="0"/>
+        </a:xfrm>
+      </p:grpSpPr>
+      <p:sp>
+        <p:nvSpPr>
+          <p:cNvPr id="430" name="Google Shape;430;p74"/>
+          <p:cNvSpPr txBox="1"/>
+          <p:nvPr>
+            <p:ph idx="1" type="body"/>
+          </p:nvPr>
+        </p:nvSpPr>
+        <p:spPr>
+          <a:xfrm>
+            <a:off x="311700" y="279925"/>
+            <a:ext cx="8520600" cy="4289100"/>
+          </a:xfrm>
+          <a:prstGeom prst="rect">
+            <a:avLst/>
+          </a:prstGeom>
+        </p:spPr>
+        <p:txBody>
+          <a:bodyPr anchorCtr="0" anchor="t" bIns="91425" lIns="91425" spcFirstLastPara="1" rIns="91425" wrap="square" tIns="91425">
+            <a:normAutofit/>
+          </a:bodyPr>
+          <a:lstStyle/>
+          <a:p>
+            <a:pPr indent="0" lvl="0" marL="0" rtl="0" algn="l">
+              <a:spcBef>
+                <a:spcPts val="0"/>
+              </a:spcBef>
+              <a:spcAft>
+                <a:spcPts val="0"/>
+              </a:spcAft>
+              <a:buNone/>
+            </a:pPr>
+            <a:r>
+              <a:rPr b="1" lang="en" sz="2100">
+                <a:solidFill>
+                  <a:schemeClr val="accent1"/>
+                </a:solidFill>
+              </a:rPr>
+              <a:t>25. </a:t>
+            </a:r>
+            <a:r>
+              <a:rPr lang="en" sz="2100">
+                <a:solidFill>
+                  <a:schemeClr val="accent1"/>
+                </a:solidFill>
+              </a:rPr>
+              <a:t>Which of the following is NOT true for white-box testing?</a:t>
+            </a:r>
+            <a:endParaRPr sz="2100">
+              <a:solidFill>
+                <a:schemeClr val="accent1"/>
+              </a:solidFill>
+            </a:endParaRPr>
+          </a:p>
+          <a:p>
+            <a:pPr indent="0" lvl="0" marL="0" rtl="0" algn="l">
+              <a:spcBef>
+                <a:spcPts val="1200"/>
+              </a:spcBef>
+              <a:spcAft>
+                <a:spcPts val="0"/>
+              </a:spcAft>
+              <a:buNone/>
+            </a:pPr>
+            <a:r>
+              <a:rPr b="1" lang="en" sz="2100">
+                <a:solidFill>
+                  <a:schemeClr val="accent1"/>
+                </a:solidFill>
+              </a:rPr>
+              <a:t>a)</a:t>
+            </a:r>
+            <a:r>
+              <a:rPr lang="en" sz="2100">
+                <a:solidFill>
+                  <a:schemeClr val="accent1"/>
+                </a:solidFill>
+              </a:rPr>
+              <a:t> During white-box testing the entire software implementation is considered</a:t>
+            </a:r>
+            <a:endParaRPr sz="2100">
+              <a:solidFill>
+                <a:schemeClr val="accent1"/>
+              </a:solidFill>
+            </a:endParaRPr>
+          </a:p>
+          <a:p>
+            <a:pPr indent="0" lvl="0" marL="0" rtl="0" algn="l">
+              <a:spcBef>
+                <a:spcPts val="1200"/>
+              </a:spcBef>
+              <a:spcAft>
+                <a:spcPts val="0"/>
+              </a:spcAft>
+              <a:buNone/>
+            </a:pPr>
+            <a:r>
+              <a:rPr b="1" lang="en" sz="2100">
+                <a:solidFill>
+                  <a:schemeClr val="accent1"/>
+                </a:solidFill>
+              </a:rPr>
+              <a:t>b)</a:t>
+            </a:r>
+            <a:r>
+              <a:rPr lang="en" sz="2100">
+                <a:solidFill>
+                  <a:schemeClr val="accent1"/>
+                </a:solidFill>
+              </a:rPr>
+              <a:t> White-box coverage metrics can help identify additional tests to increase code coverage</a:t>
+            </a:r>
+            <a:endParaRPr sz="2100">
+              <a:solidFill>
+                <a:schemeClr val="accent1"/>
+              </a:solidFill>
+            </a:endParaRPr>
+          </a:p>
+          <a:p>
+            <a:pPr indent="0" lvl="0" marL="0" rtl="0" algn="l">
+              <a:spcBef>
+                <a:spcPts val="1200"/>
+              </a:spcBef>
+              <a:spcAft>
+                <a:spcPts val="0"/>
+              </a:spcAft>
+              <a:buNone/>
+            </a:pPr>
+            <a:r>
+              <a:rPr b="1" lang="en" sz="2100">
+                <a:solidFill>
+                  <a:schemeClr val="accent1"/>
+                </a:solidFill>
+              </a:rPr>
+              <a:t>c)</a:t>
+            </a:r>
+            <a:r>
+              <a:rPr lang="en" sz="2100">
+                <a:solidFill>
+                  <a:schemeClr val="accent1"/>
+                </a:solidFill>
+              </a:rPr>
+              <a:t> White-box test techniques can be used in static testing</a:t>
+            </a:r>
+            <a:endParaRPr sz="2100">
+              <a:solidFill>
+                <a:schemeClr val="accent1"/>
+              </a:solidFill>
+            </a:endParaRPr>
+          </a:p>
+          <a:p>
+            <a:pPr indent="0" lvl="0" marL="0" rtl="0" algn="l">
+              <a:spcBef>
+                <a:spcPts val="1200"/>
+              </a:spcBef>
+              <a:spcAft>
+                <a:spcPts val="0"/>
+              </a:spcAft>
+              <a:buNone/>
+            </a:pPr>
+            <a:r>
+              <a:rPr b="1" lang="en" sz="2100">
+                <a:solidFill>
+                  <a:schemeClr val="accent1"/>
+                </a:solidFill>
+              </a:rPr>
+              <a:t>d)</a:t>
+            </a:r>
+            <a:r>
+              <a:rPr lang="en" sz="2100">
+                <a:solidFill>
+                  <a:schemeClr val="accent1"/>
+                </a:solidFill>
+              </a:rPr>
+              <a:t> White-box testing can help identify gaps in requirements implementation</a:t>
+            </a:r>
+            <a:endParaRPr sz="2100">
+              <a:solidFill>
+                <a:schemeClr val="accent1"/>
+              </a:solidFill>
+            </a:endParaRPr>
+          </a:p>
+          <a:p>
+            <a:pPr indent="0" lvl="0" marL="0" rtl="0" algn="l">
+              <a:spcBef>
+                <a:spcPts val="1200"/>
+              </a:spcBef>
+              <a:spcAft>
+                <a:spcPts val="1200"/>
+              </a:spcAft>
+              <a:buNone/>
+            </a:pPr>
+            <a:r>
+              <a:rPr lang="en" sz="2100">
+                <a:solidFill>
+                  <a:schemeClr val="accent1"/>
+                </a:solidFill>
+              </a:rPr>
+              <a:t>Select ONE option.</a:t>
+            </a:r>
+            <a:endParaRPr sz="2100">
+              <a:solidFill>
+                <a:schemeClr val="accent1"/>
+              </a:solidFill>
+            </a:endParaRPr>
+          </a:p>
+        </p:txBody>
+      </p:sp>
+    </p:spTree>
+  </p:cSld>
+  <p:clrMapOvr>
+    <a:masterClrMapping/>
+  </p:clrMapOvr>
+</p:sld>
+</file>
+
+<file path=ppt/slides/slide63.xml><?xml version="1.0" encoding="utf-8"?>
+<p:sld xmlns:a="http://schemas.openxmlformats.org/drawingml/2006/main" xmlns:r="http://schemas.openxmlformats.org/officeDocument/2006/relationships" xmlns:mc="http://schemas.openxmlformats.org/markup-compatibility/2006" xmlns:mv="urn:schemas-microsoft-com:mac:vml" xmlns:p="http://schemas.openxmlformats.org/presentationml/2006/main" xmlns:c="http://schemas.openxmlformats.org/drawingml/2006/chart" xmlns:dgm="http://schemas.openxmlformats.org/drawingml/2006/diagram" xmlns:o="urn:schemas-microsoft-com:office:office" xmlns:v="urn:schemas-microsoft-com:vml" xmlns:pvml="urn:schemas-microsoft-com:office:powerpoint" xmlns:com="http://schemas.openxmlformats.org/drawingml/2006/compatibility" xmlns:p14="http://schemas.microsoft.com/office/powerpoint/2010/main" xmlns:p15="http://schemas.microsoft.com/office/powerpoint/2012/main" xmlns:ahyp="http://schemas.microsoft.com/office/drawing/2018/hyperlinkcolor">
+  <p:cSld>
+    <p:spTree>
+      <p:nvGrpSpPr>
+        <p:cNvPr id="434" name="Shape 434"/>
+        <p:cNvGrpSpPr/>
+        <p:nvPr/>
+      </p:nvGrpSpPr>
+      <p:grpSpPr>
+        <a:xfrm>
+          <a:off x="0" y="0"/>
+          <a:ext cx="0" cy="0"/>
+          <a:chOff x="0" y="0"/>
+          <a:chExt cx="0" cy="0"/>
+        </a:xfrm>
+      </p:grpSpPr>
+      <p:sp>
+        <p:nvSpPr>
+          <p:cNvPr id="435" name="Google Shape;435;p75"/>
+          <p:cNvSpPr txBox="1"/>
+          <p:nvPr>
+            <p:ph idx="1" type="body"/>
+          </p:nvPr>
+        </p:nvSpPr>
+        <p:spPr>
+          <a:xfrm>
+            <a:off x="311700" y="262425"/>
+            <a:ext cx="8520600" cy="4531200"/>
+          </a:xfrm>
+          <a:prstGeom prst="rect">
+            <a:avLst/>
+          </a:prstGeom>
+        </p:spPr>
+        <p:txBody>
+          <a:bodyPr anchorCtr="0" anchor="t" bIns="91425" lIns="91425" spcFirstLastPara="1" rIns="91425" wrap="square" tIns="91425">
+            <a:noAutofit/>
+          </a:bodyPr>
+          <a:lstStyle/>
+          <a:p>
+            <a:pPr indent="0" lvl="0" marL="0" rtl="0" algn="l">
+              <a:spcBef>
+                <a:spcPts val="0"/>
+              </a:spcBef>
+              <a:spcAft>
+                <a:spcPts val="0"/>
+              </a:spcAft>
+              <a:buNone/>
+            </a:pPr>
+            <a:r>
+              <a:rPr lang="en" sz="1900"/>
+              <a:t>a) Is not correct. The fundamental strength of white-box test techniques is that the entire software implementation is taken into account during testing</a:t>
+            </a:r>
+            <a:endParaRPr sz="1900"/>
+          </a:p>
+          <a:p>
+            <a:pPr indent="0" lvl="0" marL="0" rtl="0" algn="l">
+              <a:spcBef>
+                <a:spcPts val="1200"/>
+              </a:spcBef>
+              <a:spcAft>
+                <a:spcPts val="0"/>
+              </a:spcAft>
+              <a:buNone/>
+            </a:pPr>
+            <a:r>
+              <a:rPr lang="en" sz="1900"/>
+              <a:t>b) Is not correct. White-box coverage measures provide an objective measure of coverage and provide the necessary information to allow additional tests to be generated to increase this coverage</a:t>
+            </a:r>
+            <a:endParaRPr sz="1900"/>
+          </a:p>
+          <a:p>
+            <a:pPr indent="0" lvl="0" marL="0" rtl="0" algn="l">
+              <a:spcBef>
+                <a:spcPts val="1200"/>
+              </a:spcBef>
+              <a:spcAft>
+                <a:spcPts val="0"/>
+              </a:spcAft>
+              <a:buNone/>
+            </a:pPr>
+            <a:r>
+              <a:rPr lang="en" sz="1900"/>
+              <a:t>c) Is not correct. White-box test techniques can be used to perform reviews (static testing)</a:t>
+            </a:r>
+            <a:endParaRPr sz="1900"/>
+          </a:p>
+          <a:p>
+            <a:pPr indent="0" lvl="0" marL="0" rtl="0" algn="l">
+              <a:spcBef>
+                <a:spcPts val="1200"/>
+              </a:spcBef>
+              <a:spcAft>
+                <a:spcPts val="1200"/>
+              </a:spcAft>
+              <a:buNone/>
+            </a:pPr>
+            <a:r>
+              <a:rPr lang="en" sz="1900">
+                <a:highlight>
+                  <a:schemeClr val="accent6"/>
+                </a:highlight>
+              </a:rPr>
+              <a:t>d) Is correct. This is the weakness of the white-box test techniques. They are not able to identify the missing implementation, because they are based solely on the test object structure, not on the requirements specification</a:t>
+            </a:r>
+            <a:endParaRPr sz="1900">
+              <a:highlight>
+                <a:schemeClr val="accent6"/>
+              </a:highlight>
+            </a:endParaRPr>
+          </a:p>
+        </p:txBody>
+      </p:sp>
+    </p:spTree>
+  </p:cSld>
+  <p:clrMapOvr>
+    <a:masterClrMapping/>
+  </p:clrMapOvr>
+</p:sld>
+</file>
+
+<file path=ppt/slides/slide64.xml><?xml version="1.0" encoding="utf-8"?>
+<p:sld xmlns:a="http://schemas.openxmlformats.org/drawingml/2006/main" xmlns:r="http://schemas.openxmlformats.org/officeDocument/2006/relationships" xmlns:mc="http://schemas.openxmlformats.org/markup-compatibility/2006" xmlns:mv="urn:schemas-microsoft-com:mac:vml" xmlns:p="http://schemas.openxmlformats.org/presentationml/2006/main" xmlns:c="http://schemas.openxmlformats.org/drawingml/2006/chart" xmlns:dgm="http://schemas.openxmlformats.org/drawingml/2006/diagram" xmlns:o="urn:schemas-microsoft-com:office:office" xmlns:v="urn:schemas-microsoft-com:vml" xmlns:pvml="urn:schemas-microsoft-com:office:powerpoint" xmlns:com="http://schemas.openxmlformats.org/drawingml/2006/compatibility" xmlns:p14="http://schemas.microsoft.com/office/powerpoint/2010/main" xmlns:p15="http://schemas.microsoft.com/office/powerpoint/2012/main" xmlns:ahyp="http://schemas.microsoft.com/office/drawing/2018/hyperlinkcolor">
+  <p:cSld>
+    <p:spTree>
+      <p:nvGrpSpPr>
+        <p:cNvPr id="439" name="Shape 439"/>
+        <p:cNvGrpSpPr/>
+        <p:nvPr/>
+      </p:nvGrpSpPr>
+      <p:grpSpPr>
+        <a:xfrm>
+          <a:off x="0" y="0"/>
+          <a:ext cx="0" cy="0"/>
+          <a:chOff x="0" y="0"/>
+          <a:chExt cx="0" cy="0"/>
+        </a:xfrm>
+      </p:grpSpPr>
+      <p:sp>
+        <p:nvSpPr>
+          <p:cNvPr id="440" name="Google Shape;440;p76"/>
+          <p:cNvSpPr txBox="1"/>
+          <p:nvPr>
+            <p:ph idx="1" type="body"/>
+          </p:nvPr>
+        </p:nvSpPr>
+        <p:spPr>
+          <a:xfrm>
+            <a:off x="311700" y="279925"/>
+            <a:ext cx="8520600" cy="4289100"/>
+          </a:xfrm>
+          <a:prstGeom prst="rect">
+            <a:avLst/>
+          </a:prstGeom>
+        </p:spPr>
+        <p:txBody>
+          <a:bodyPr anchorCtr="0" anchor="t" bIns="91425" lIns="91425" spcFirstLastPara="1" rIns="91425" wrap="square" tIns="91425">
+            <a:noAutofit/>
+          </a:bodyPr>
+          <a:lstStyle/>
+          <a:p>
+            <a:pPr indent="0" lvl="0" marL="0" rtl="0" algn="l">
+              <a:spcBef>
+                <a:spcPts val="0"/>
+              </a:spcBef>
+              <a:spcAft>
+                <a:spcPts val="0"/>
+              </a:spcAft>
+              <a:buNone/>
+            </a:pPr>
+            <a:r>
+              <a:rPr b="1" lang="en">
+                <a:solidFill>
+                  <a:schemeClr val="accent1"/>
+                </a:solidFill>
+              </a:rPr>
+              <a:t>26. </a:t>
+            </a:r>
+            <a:r>
+              <a:rPr lang="en">
+                <a:solidFill>
+                  <a:schemeClr val="accent1"/>
+                </a:solidFill>
+              </a:rPr>
+              <a:t>Which of the following BEST describes the concept behind error guessing?</a:t>
+            </a:r>
+            <a:endParaRPr>
+              <a:solidFill>
+                <a:schemeClr val="accent1"/>
+              </a:solidFill>
+            </a:endParaRPr>
+          </a:p>
+          <a:p>
+            <a:pPr indent="0" lvl="0" marL="0" rtl="0" algn="l">
+              <a:spcBef>
+                <a:spcPts val="1200"/>
+              </a:spcBef>
+              <a:spcAft>
+                <a:spcPts val="0"/>
+              </a:spcAft>
+              <a:buNone/>
+            </a:pPr>
+            <a:r>
+              <a:rPr b="1" lang="en">
+                <a:solidFill>
+                  <a:schemeClr val="accent1"/>
+                </a:solidFill>
+              </a:rPr>
+              <a:t>a)</a:t>
+            </a:r>
+            <a:r>
+              <a:rPr lang="en">
+                <a:solidFill>
+                  <a:schemeClr val="accent1"/>
+                </a:solidFill>
+              </a:rPr>
+              <a:t> Error guessing involves using your knowledge and experience of defects found in the past and typical errors made by developers</a:t>
+            </a:r>
+            <a:endParaRPr>
+              <a:solidFill>
+                <a:schemeClr val="accent1"/>
+              </a:solidFill>
+            </a:endParaRPr>
+          </a:p>
+          <a:p>
+            <a:pPr indent="0" lvl="0" marL="0" rtl="0" algn="l">
+              <a:spcBef>
+                <a:spcPts val="1200"/>
+              </a:spcBef>
+              <a:spcAft>
+                <a:spcPts val="0"/>
+              </a:spcAft>
+              <a:buNone/>
+            </a:pPr>
+            <a:r>
+              <a:rPr b="1" lang="en">
+                <a:solidFill>
+                  <a:schemeClr val="accent1"/>
+                </a:solidFill>
+              </a:rPr>
+              <a:t>b)</a:t>
+            </a:r>
+            <a:r>
+              <a:rPr lang="en">
+                <a:solidFill>
+                  <a:schemeClr val="accent1"/>
+                </a:solidFill>
+              </a:rPr>
+              <a:t> Error guessing involves using your personal experience of development and the errors you made as a developer</a:t>
+            </a:r>
+            <a:endParaRPr>
+              <a:solidFill>
+                <a:schemeClr val="accent1"/>
+              </a:solidFill>
+            </a:endParaRPr>
+          </a:p>
+          <a:p>
+            <a:pPr indent="0" lvl="0" marL="0" rtl="0" algn="l">
+              <a:spcBef>
+                <a:spcPts val="1200"/>
+              </a:spcBef>
+              <a:spcAft>
+                <a:spcPts val="0"/>
+              </a:spcAft>
+              <a:buNone/>
+            </a:pPr>
+            <a:r>
+              <a:rPr b="1" lang="en">
+                <a:solidFill>
+                  <a:schemeClr val="accent1"/>
+                </a:solidFill>
+              </a:rPr>
+              <a:t>c)</a:t>
+            </a:r>
+            <a:r>
+              <a:rPr lang="en">
+                <a:solidFill>
+                  <a:schemeClr val="accent1"/>
+                </a:solidFill>
+              </a:rPr>
+              <a:t> Error guessing requires you to imagine that you are the user of the test object and to guess errors the user could make interacting with it</a:t>
+            </a:r>
+            <a:endParaRPr>
+              <a:solidFill>
+                <a:schemeClr val="accent1"/>
+              </a:solidFill>
+            </a:endParaRPr>
+          </a:p>
+          <a:p>
+            <a:pPr indent="0" lvl="0" marL="0" rtl="0" algn="l">
+              <a:spcBef>
+                <a:spcPts val="1200"/>
+              </a:spcBef>
+              <a:spcAft>
+                <a:spcPts val="0"/>
+              </a:spcAft>
+              <a:buNone/>
+            </a:pPr>
+            <a:r>
+              <a:rPr b="1" lang="en">
+                <a:solidFill>
+                  <a:schemeClr val="accent1"/>
+                </a:solidFill>
+              </a:rPr>
+              <a:t>d) </a:t>
+            </a:r>
+            <a:r>
+              <a:rPr lang="en">
+                <a:solidFill>
+                  <a:schemeClr val="accent1"/>
+                </a:solidFill>
+              </a:rPr>
+              <a:t>Error guessing requires you to rapidly duplicate the development task to identify the sort of errors a developer might make</a:t>
+            </a:r>
+            <a:endParaRPr>
+              <a:solidFill>
+                <a:schemeClr val="accent1"/>
+              </a:solidFill>
+            </a:endParaRPr>
+          </a:p>
+          <a:p>
+            <a:pPr indent="0" lvl="0" marL="0" rtl="0" algn="l">
+              <a:spcBef>
+                <a:spcPts val="1200"/>
+              </a:spcBef>
+              <a:spcAft>
+                <a:spcPts val="1200"/>
+              </a:spcAft>
+              <a:buNone/>
+            </a:pPr>
+            <a:r>
+              <a:rPr lang="en">
+                <a:solidFill>
+                  <a:schemeClr val="accent1"/>
+                </a:solidFill>
+              </a:rPr>
+              <a:t>Select ONE option.</a:t>
+            </a:r>
+            <a:endParaRPr>
+              <a:solidFill>
+                <a:schemeClr val="accent1"/>
+              </a:solidFill>
+            </a:endParaRPr>
+          </a:p>
+        </p:txBody>
+      </p:sp>
+    </p:spTree>
+  </p:cSld>
+  <p:clrMapOvr>
+    <a:masterClrMapping/>
+  </p:clrMapOvr>
+</p:sld>
+</file>
+
+<file path=ppt/slides/slide65.xml><?xml version="1.0" encoding="utf-8"?>
+<p:sld xmlns:a="http://schemas.openxmlformats.org/drawingml/2006/main" xmlns:r="http://schemas.openxmlformats.org/officeDocument/2006/relationships" xmlns:mc="http://schemas.openxmlformats.org/markup-compatibility/2006" xmlns:mv="urn:schemas-microsoft-com:mac:vml" xmlns:p="http://schemas.openxmlformats.org/presentationml/2006/main" xmlns:c="http://schemas.openxmlformats.org/drawingml/2006/chart" xmlns:dgm="http://schemas.openxmlformats.org/drawingml/2006/diagram" xmlns:o="urn:schemas-microsoft-com:office:office" xmlns:v="urn:schemas-microsoft-com:vml" xmlns:pvml="urn:schemas-microsoft-com:office:powerpoint" xmlns:com="http://schemas.openxmlformats.org/drawingml/2006/compatibility" xmlns:p14="http://schemas.microsoft.com/office/powerpoint/2010/main" xmlns:p15="http://schemas.microsoft.com/office/powerpoint/2012/main" xmlns:ahyp="http://schemas.microsoft.com/office/drawing/2018/hyperlinkcolor">
+  <p:cSld>
+    <p:spTree>
+      <p:nvGrpSpPr>
+        <p:cNvPr id="444" name="Shape 444"/>
+        <p:cNvGrpSpPr/>
+        <p:nvPr/>
+      </p:nvGrpSpPr>
+      <p:grpSpPr>
+        <a:xfrm>
+          <a:off x="0" y="0"/>
+          <a:ext cx="0" cy="0"/>
+          <a:chOff x="0" y="0"/>
+          <a:chExt cx="0" cy="0"/>
+        </a:xfrm>
+      </p:grpSpPr>
+      <p:sp>
+        <p:nvSpPr>
+          <p:cNvPr id="445" name="Google Shape;445;p77"/>
+          <p:cNvSpPr txBox="1"/>
+          <p:nvPr>
+            <p:ph idx="1" type="body"/>
+          </p:nvPr>
+        </p:nvSpPr>
+        <p:spPr>
+          <a:xfrm>
+            <a:off x="311700" y="279925"/>
+            <a:ext cx="8520600" cy="4289100"/>
+          </a:xfrm>
+          <a:prstGeom prst="rect">
+            <a:avLst/>
+          </a:prstGeom>
+        </p:spPr>
+        <p:txBody>
+          <a:bodyPr anchorCtr="0" anchor="t" bIns="91425" lIns="91425" spcFirstLastPara="1" rIns="91425" wrap="square" tIns="91425">
+            <a:normAutofit lnSpcReduction="10000"/>
+          </a:bodyPr>
+          <a:lstStyle/>
+          <a:p>
+            <a:pPr indent="0" lvl="0" marL="0" rtl="0" algn="l">
+              <a:spcBef>
+                <a:spcPts val="0"/>
+              </a:spcBef>
+              <a:spcAft>
+                <a:spcPts val="0"/>
+              </a:spcAft>
+              <a:buNone/>
+            </a:pPr>
+            <a:r>
+              <a:rPr lang="en">
+                <a:highlight>
+                  <a:schemeClr val="accent6"/>
+                </a:highlight>
+              </a:rPr>
+              <a:t>a) Is correct. The basic concept behind error guessing is that the tester tries to guess what errors may have been made by the developer and what defects may be in the test object based on past experience (and sometimes checklists)</a:t>
+            </a:r>
+            <a:endParaRPr>
+              <a:highlight>
+                <a:schemeClr val="accent6"/>
+              </a:highlight>
+            </a:endParaRPr>
+          </a:p>
+          <a:p>
+            <a:pPr indent="0" lvl="0" marL="0" rtl="0" algn="l">
+              <a:spcBef>
+                <a:spcPts val="1200"/>
+              </a:spcBef>
+              <a:spcAft>
+                <a:spcPts val="0"/>
+              </a:spcAft>
+              <a:buNone/>
+            </a:pPr>
+            <a:r>
+              <a:rPr lang="en"/>
+              <a:t>b) Is not correct. Although a testers who used to be a developer may use their personal experience to help them when performing error guessing, the test technique is not based on prior knowledge of development</a:t>
+            </a:r>
+            <a:endParaRPr/>
+          </a:p>
+          <a:p>
+            <a:pPr indent="0" lvl="0" marL="0" rtl="0" algn="l">
+              <a:spcBef>
+                <a:spcPts val="1200"/>
+              </a:spcBef>
+              <a:spcAft>
+                <a:spcPts val="0"/>
+              </a:spcAft>
+              <a:buNone/>
+            </a:pPr>
+            <a:r>
+              <a:rPr lang="en"/>
+              <a:t>c) Is not correct. Error guessing is not a usability technique for guessing how users may fail to interact with the test object</a:t>
+            </a:r>
+            <a:endParaRPr/>
+          </a:p>
+          <a:p>
+            <a:pPr indent="0" lvl="0" marL="0" rtl="0" algn="l">
+              <a:spcBef>
+                <a:spcPts val="1200"/>
+              </a:spcBef>
+              <a:spcAft>
+                <a:spcPts val="1200"/>
+              </a:spcAft>
+              <a:buNone/>
+            </a:pPr>
+            <a:r>
+              <a:rPr lang="en"/>
+              <a:t>d) Is not correct. Duplicating the development task has several flaws that make it impractical, such as the tester having equivalent skills to the developer and the time involved to perform the development. It is not error guessing</a:t>
+            </a:r>
+            <a:endParaRPr/>
+          </a:p>
+        </p:txBody>
+      </p:sp>
+    </p:spTree>
+  </p:cSld>
+  <p:clrMapOvr>
+    <a:masterClrMapping/>
+  </p:clrMapOvr>
+</p:sld>
+</file>
+
+<file path=ppt/slides/slide66.xml><?xml version="1.0" encoding="utf-8"?>
+<p:sld xmlns:a="http://schemas.openxmlformats.org/drawingml/2006/main" xmlns:r="http://schemas.openxmlformats.org/officeDocument/2006/relationships" xmlns:mc="http://schemas.openxmlformats.org/markup-compatibility/2006" xmlns:mv="urn:schemas-microsoft-com:mac:vml" xmlns:p="http://schemas.openxmlformats.org/presentationml/2006/main" xmlns:c="http://schemas.openxmlformats.org/drawingml/2006/chart" xmlns:dgm="http://schemas.openxmlformats.org/drawingml/2006/diagram" xmlns:o="urn:schemas-microsoft-com:office:office" xmlns:v="urn:schemas-microsoft-com:vml" xmlns:pvml="urn:schemas-microsoft-com:office:powerpoint" xmlns:com="http://schemas.openxmlformats.org/drawingml/2006/compatibility" xmlns:p14="http://schemas.microsoft.com/office/powerpoint/2010/main" xmlns:p15="http://schemas.microsoft.com/office/powerpoint/2012/main" xmlns:ahyp="http://schemas.microsoft.com/office/drawing/2018/hyperlinkcolor">
+  <p:cSld>
+    <p:spTree>
+      <p:nvGrpSpPr>
+        <p:cNvPr id="449" name="Shape 449"/>
+        <p:cNvGrpSpPr/>
+        <p:nvPr/>
+      </p:nvGrpSpPr>
+      <p:grpSpPr>
+        <a:xfrm>
+          <a:off x="0" y="0"/>
+          <a:ext cx="0" cy="0"/>
+          <a:chOff x="0" y="0"/>
+          <a:chExt cx="0" cy="0"/>
+        </a:xfrm>
+      </p:grpSpPr>
+      <p:sp>
+        <p:nvSpPr>
+          <p:cNvPr id="450" name="Google Shape;450;p78"/>
+          <p:cNvSpPr txBox="1"/>
+          <p:nvPr>
+            <p:ph type="title"/>
+          </p:nvPr>
+        </p:nvSpPr>
+        <p:spPr>
+          <a:xfrm>
+            <a:off x="311700" y="192450"/>
+            <a:ext cx="8520600" cy="4653600"/>
+          </a:xfrm>
+          <a:prstGeom prst="rect">
+            <a:avLst/>
+          </a:prstGeom>
+        </p:spPr>
+        <p:txBody>
+          <a:bodyPr anchorCtr="0" anchor="t" bIns="91425" lIns="91425" spcFirstLastPara="1" rIns="91425" wrap="square" tIns="91425">
+            <a:noAutofit/>
+          </a:bodyPr>
+          <a:lstStyle/>
+          <a:p>
+            <a:pPr indent="0" lvl="0" marL="0" rtl="0" algn="l">
+              <a:spcBef>
+                <a:spcPts val="0"/>
+              </a:spcBef>
+              <a:spcAft>
+                <a:spcPts val="0"/>
+              </a:spcAft>
+              <a:buSzPts val="990"/>
+              <a:buNone/>
+            </a:pPr>
+            <a:r>
+              <a:rPr b="0" lang="en" sz="2640"/>
+              <a:t>27. In your project there has been a delay in the release of a brand-new application and test execution started late, but you have very detailed domain knowledge and good analytical skills. The full list of requirements has not yet been shared with the team, but management is asking for some test results to be presented.</a:t>
+            </a:r>
+            <a:endParaRPr b="0" sz="2640"/>
+          </a:p>
+          <a:p>
+            <a:pPr indent="0" lvl="0" marL="0" rtl="0" algn="l">
+              <a:spcBef>
+                <a:spcPts val="0"/>
+              </a:spcBef>
+              <a:spcAft>
+                <a:spcPts val="0"/>
+              </a:spcAft>
+              <a:buSzPts val="990"/>
+              <a:buNone/>
+            </a:pPr>
+            <a:r>
+              <a:rPr b="0" lang="en" sz="2640"/>
+              <a:t>Which test technique fits BEST in this situation?</a:t>
+            </a:r>
+            <a:endParaRPr b="0" sz="2640"/>
+          </a:p>
+          <a:p>
+            <a:pPr indent="0" lvl="0" marL="0" rtl="0" algn="l">
+              <a:spcBef>
+                <a:spcPts val="0"/>
+              </a:spcBef>
+              <a:spcAft>
+                <a:spcPts val="0"/>
+              </a:spcAft>
+              <a:buSzPts val="990"/>
+              <a:buNone/>
+            </a:pPr>
+            <a:r>
+              <a:rPr b="0" lang="en" sz="2640"/>
+              <a:t>a) Checklist-based testing</a:t>
+            </a:r>
+            <a:endParaRPr b="0" sz="2640"/>
+          </a:p>
+          <a:p>
+            <a:pPr indent="0" lvl="0" marL="0" rtl="0" algn="l">
+              <a:spcBef>
+                <a:spcPts val="0"/>
+              </a:spcBef>
+              <a:spcAft>
+                <a:spcPts val="0"/>
+              </a:spcAft>
+              <a:buSzPts val="990"/>
+              <a:buNone/>
+            </a:pPr>
+            <a:r>
+              <a:rPr b="0" lang="en" sz="2640"/>
+              <a:t>b) Error guessing</a:t>
+            </a:r>
+            <a:endParaRPr b="0" sz="2640"/>
+          </a:p>
+          <a:p>
+            <a:pPr indent="0" lvl="0" marL="0" rtl="0" algn="l">
+              <a:spcBef>
+                <a:spcPts val="0"/>
+              </a:spcBef>
+              <a:spcAft>
+                <a:spcPts val="0"/>
+              </a:spcAft>
+              <a:buSzPts val="990"/>
+              <a:buNone/>
+            </a:pPr>
+            <a:r>
+              <a:rPr b="0" lang="en" sz="2640"/>
+              <a:t>c) Exploratory testing</a:t>
+            </a:r>
+            <a:endParaRPr b="0" sz="2640"/>
+          </a:p>
+          <a:p>
+            <a:pPr indent="0" lvl="0" marL="0" rtl="0" algn="l">
+              <a:spcBef>
+                <a:spcPts val="0"/>
+              </a:spcBef>
+              <a:spcAft>
+                <a:spcPts val="0"/>
+              </a:spcAft>
+              <a:buSzPts val="990"/>
+              <a:buNone/>
+            </a:pPr>
+            <a:r>
+              <a:rPr b="0" lang="en" sz="2640"/>
+              <a:t>d) Branch testing</a:t>
+            </a:r>
+            <a:endParaRPr b="0" sz="2640"/>
+          </a:p>
+          <a:p>
+            <a:pPr indent="0" lvl="0" marL="0" rtl="0" algn="l">
+              <a:spcBef>
+                <a:spcPts val="0"/>
+              </a:spcBef>
+              <a:spcAft>
+                <a:spcPts val="0"/>
+              </a:spcAft>
+              <a:buSzPts val="990"/>
+              <a:buNone/>
+            </a:pPr>
+            <a:r>
+              <a:rPr b="0" lang="en" sz="2640"/>
+              <a:t>Select ONE option.</a:t>
+            </a:r>
+            <a:endParaRPr b="0" sz="2640"/>
+          </a:p>
+        </p:txBody>
+      </p:sp>
+    </p:spTree>
+  </p:cSld>
+  <p:clrMapOvr>
+    <a:masterClrMapping/>
+  </p:clrMapOvr>
+</p:sld>
+</file>
+
+<file path=ppt/slides/slide67.xml><?xml version="1.0" encoding="utf-8"?>
+<p:sld xmlns:a="http://schemas.openxmlformats.org/drawingml/2006/main" xmlns:r="http://schemas.openxmlformats.org/officeDocument/2006/relationships" xmlns:mc="http://schemas.openxmlformats.org/markup-compatibility/2006" xmlns:mv="urn:schemas-microsoft-com:mac:vml" xmlns:p="http://schemas.openxmlformats.org/presentationml/2006/main" xmlns:c="http://schemas.openxmlformats.org/drawingml/2006/chart" xmlns:dgm="http://schemas.openxmlformats.org/drawingml/2006/diagram" xmlns:o="urn:schemas-microsoft-com:office:office" xmlns:v="urn:schemas-microsoft-com:vml" xmlns:pvml="urn:schemas-microsoft-com:office:powerpoint" xmlns:com="http://schemas.openxmlformats.org/drawingml/2006/compatibility" xmlns:p14="http://schemas.microsoft.com/office/powerpoint/2010/main" xmlns:p15="http://schemas.microsoft.com/office/powerpoint/2012/main" xmlns:ahyp="http://schemas.microsoft.com/office/drawing/2018/hyperlinkcolor">
+  <p:cSld>
+    <p:spTree>
+      <p:nvGrpSpPr>
+        <p:cNvPr id="454" name="Shape 454"/>
+        <p:cNvGrpSpPr/>
+        <p:nvPr/>
+      </p:nvGrpSpPr>
+      <p:grpSpPr>
+        <a:xfrm>
+          <a:off x="0" y="0"/>
+          <a:ext cx="0" cy="0"/>
+          <a:chOff x="0" y="0"/>
+          <a:chExt cx="0" cy="0"/>
+        </a:xfrm>
+      </p:grpSpPr>
+      <p:sp>
+        <p:nvSpPr>
+          <p:cNvPr id="455" name="Google Shape;455;p79"/>
+          <p:cNvSpPr txBox="1"/>
+          <p:nvPr>
+            <p:ph idx="1" type="body"/>
+          </p:nvPr>
+        </p:nvSpPr>
+        <p:spPr>
+          <a:xfrm>
+            <a:off x="311700" y="227425"/>
+            <a:ext cx="8520600" cy="4341600"/>
+          </a:xfrm>
+          <a:prstGeom prst="rect">
+            <a:avLst/>
+          </a:prstGeom>
+        </p:spPr>
+        <p:txBody>
+          <a:bodyPr anchorCtr="0" anchor="t" bIns="91425" lIns="91425" spcFirstLastPara="1" rIns="91425" wrap="square" tIns="91425">
+            <a:normAutofit/>
+          </a:bodyPr>
+          <a:lstStyle/>
+          <a:p>
+            <a:pPr indent="0" lvl="0" marL="0" rtl="0" algn="l">
+              <a:spcBef>
+                <a:spcPts val="0"/>
+              </a:spcBef>
+              <a:spcAft>
+                <a:spcPts val="0"/>
+              </a:spcAft>
+              <a:buNone/>
+            </a:pPr>
+            <a:r>
+              <a:rPr lang="en" sz="2000"/>
+              <a:t>a) Is not correct. This is a new product. You probably do not have a checklist yet and test conditions might not be known due to missing requirements</a:t>
+            </a:r>
+            <a:endParaRPr sz="2000"/>
+          </a:p>
+          <a:p>
+            <a:pPr indent="0" lvl="0" marL="0" rtl="0" algn="l">
+              <a:spcBef>
+                <a:spcPts val="1200"/>
+              </a:spcBef>
+              <a:spcAft>
+                <a:spcPts val="0"/>
+              </a:spcAft>
+              <a:buNone/>
+            </a:pPr>
+            <a:r>
+              <a:rPr lang="en" sz="2000"/>
+              <a:t>b) Is not correct. This is a new product. You probably do not have enough information to make correct error guesses</a:t>
+            </a:r>
+            <a:endParaRPr sz="2000"/>
+          </a:p>
+          <a:p>
+            <a:pPr indent="0" lvl="0" marL="0" rtl="0" algn="l">
+              <a:spcBef>
+                <a:spcPts val="1200"/>
+              </a:spcBef>
+              <a:spcAft>
+                <a:spcPts val="0"/>
+              </a:spcAft>
+              <a:buNone/>
+            </a:pPr>
+            <a:r>
+              <a:rPr lang="en" sz="2000">
+                <a:highlight>
+                  <a:schemeClr val="accent6"/>
+                </a:highlight>
+              </a:rPr>
+              <a:t>c) Is correct. Exploratory testing is most useful when there are few known specifications and/or there is a pressing timeline for testing</a:t>
+            </a:r>
+            <a:endParaRPr sz="2000">
+              <a:highlight>
+                <a:schemeClr val="accent6"/>
+              </a:highlight>
+            </a:endParaRPr>
+          </a:p>
+          <a:p>
+            <a:pPr indent="0" lvl="0" marL="0" rtl="0" algn="l">
+              <a:spcBef>
+                <a:spcPts val="1200"/>
+              </a:spcBef>
+              <a:spcAft>
+                <a:spcPts val="1200"/>
+              </a:spcAft>
+              <a:buNone/>
+            </a:pPr>
+            <a:r>
+              <a:rPr lang="en" sz="2000"/>
+              <a:t>d) Is not correct. Branch testing is time-consuming, and your management is asking about some test results now. Also, branch testing does not involve domain knowledge</a:t>
+            </a:r>
+            <a:endParaRPr sz="2000"/>
+          </a:p>
+        </p:txBody>
+      </p:sp>
+    </p:spTree>
+  </p:cSld>
+  <p:clrMapOvr>
+    <a:masterClrMapping/>
+  </p:clrMapOvr>
+</p:sld>
+</file>
+
 <file path=ppt/slides/slide7.xml><?xml version="1.0" encoding="utf-8"?>
 <p:sld xmlns:a="http://schemas.openxmlformats.org/drawingml/2006/main" xmlns:r="http://schemas.openxmlformats.org/officeDocument/2006/relationships" xmlns:mc="http://schemas.openxmlformats.org/markup-compatibility/2006" xmlns:mv="urn:schemas-microsoft-com:mac:vml" xmlns:p="http://schemas.openxmlformats.org/presentationml/2006/main" xmlns:c="http://schemas.openxmlformats.org/drawingml/2006/chart" xmlns:dgm="http://schemas.openxmlformats.org/drawingml/2006/diagram" xmlns:o="urn:schemas-microsoft-com:office:office" xmlns:v="urn:schemas-microsoft-com:vml" xmlns:pvml="urn:schemas-microsoft-com:office:powerpoint" xmlns:com="http://schemas.openxmlformats.org/drawingml/2006/compatibility" xmlns:p14="http://schemas.microsoft.com/office/powerpoint/2010/main" xmlns:p15="http://schemas.microsoft.com/office/powerpoint/2012/main" xmlns:ahyp="http://schemas.microsoft.com/office/drawing/2018/hyperlinkcolor">
   <p:cSld>
@@ -25926,6 +27523,285 @@
 </file>
 
 <file path=ppt/theme/theme1.xml><?xml version="1.0" encoding="utf-8"?>
+<a:theme xmlns:a="http://schemas.openxmlformats.org/drawingml/2006/main" xmlns:r="http://schemas.openxmlformats.org/officeDocument/2006/relationships" name="Tropic">
+  <a:themeElements>
+    <a:clrScheme name="Tropic">
+      <a:dk1>
+        <a:srgbClr val="A1E8D9"/>
+      </a:dk1>
+      <a:lt1>
+        <a:srgbClr val="FFFFFF"/>
+      </a:lt1>
+      <a:dk2>
+        <a:srgbClr val="695D46"/>
+      </a:dk2>
+      <a:lt2>
+        <a:srgbClr val="B3A77D"/>
+      </a:lt2>
+      <a:accent1>
+        <a:srgbClr val="EF6C00"/>
+      </a:accent1>
+      <a:accent2>
+        <a:srgbClr val="CE93D8"/>
+      </a:accent2>
+      <a:accent3>
+        <a:srgbClr val="4DB6AC"/>
+      </a:accent3>
+      <a:accent4>
+        <a:srgbClr val="FF9800"/>
+      </a:accent4>
+      <a:accent5>
+        <a:srgbClr val="009668"/>
+      </a:accent5>
+      <a:accent6>
+        <a:srgbClr val="EEFF41"/>
+      </a:accent6>
+      <a:hlink>
+        <a:srgbClr val="009668"/>
+      </a:hlink>
+      <a:folHlink>
+        <a:srgbClr val="009668"/>
+      </a:folHlink>
+    </a:clrScheme>
+    <a:fontScheme name="Office">
+      <a:majorFont>
+        <a:latin typeface="Arial"/>
+        <a:ea typeface=""/>
+        <a:cs typeface=""/>
+        <a:font script="Jpan" typeface="ＭＳ Ｐゴシック"/>
+        <a:font script="Hang" typeface="맑은 고딕"/>
+        <a:font script="Hans" typeface="宋体"/>
+        <a:font script="Hant" typeface="新細明體"/>
+        <a:font script="Arab" typeface="Times New Roman"/>
+        <a:font script="Hebr" typeface="Times New Roman"/>
+        <a:font script="Thai" typeface="Angsana New"/>
+        <a:font script="Ethi" typeface="Nyala"/>
+        <a:font script="Beng" typeface="Vrinda"/>
+        <a:font script="Gujr" typeface="Shruti"/>
+        <a:font script="Khmr" typeface="MoolBoran"/>
+        <a:font script="Knda" typeface="Tunga"/>
+        <a:font script="Guru" typeface="Raavi"/>
+        <a:font script="Cans" typeface="Euphemia"/>
+        <a:font script="Cher" typeface="Plantagenet Cherokee"/>
+        <a:font script="Yiii" typeface="Microsoft Yi Baiti"/>
+        <a:font script="Tibt" typeface="Microsoft Himalaya"/>
+        <a:font script="Thaa" typeface="MV Boli"/>
+        <a:font script="Deva" typeface="Mangal"/>
+        <a:font script="Telu" typeface="Gautami"/>
+        <a:font script="Taml" typeface="Latha"/>
+        <a:font script="Syrc" typeface="Estrangelo Edessa"/>
+        <a:font script="Orya" typeface="Kalinga"/>
+        <a:font script="Mlym" typeface="Kartika"/>
+        <a:font script="Laoo" typeface="DokChampa"/>
+        <a:font script="Sinh" typeface="Iskoola Pota"/>
+        <a:font script="Mong" typeface="Mongolian Baiti"/>
+        <a:font script="Viet" typeface="Times New Roman"/>
+        <a:font script="Uigh" typeface="Microsoft Uighur"/>
+        <a:font script="Geor" typeface="Sylfaen"/>
+      </a:majorFont>
+      <a:minorFont>
+        <a:latin typeface="Arial"/>
+        <a:ea typeface=""/>
+        <a:cs typeface=""/>
+        <a:font script="Jpan" typeface="ＭＳ Ｐゴシック"/>
+        <a:font script="Hang" typeface="맑은 고딕"/>
+        <a:font script="Hans" typeface="宋体"/>
+        <a:font script="Hant" typeface="新細明體"/>
+        <a:font script="Arab" typeface="Arial"/>
+        <a:font script="Hebr" typeface="Arial"/>
+        <a:font script="Thai" typeface="Cordia New"/>
+        <a:font script="Ethi" typeface="Nyala"/>
+        <a:font script="Beng" typeface="Vrinda"/>
+        <a:font script="Gujr" typeface="Shruti"/>
+        <a:font script="Khmr" typeface="DaunPenh"/>
+        <a:font script="Knda" typeface="Tunga"/>
+        <a:font script="Guru" typeface="Raavi"/>
+        <a:font script="Cans" typeface="Euphemia"/>
+        <a:font script="Cher" typeface="Plantagenet Cherokee"/>
+        <a:font script="Yiii" typeface="Microsoft Yi Baiti"/>
+        <a:font script="Tibt" typeface="Microsoft Himalaya"/>
+        <a:font script="Thaa" typeface="MV Boli"/>
+        <a:font script="Deva" typeface="Mangal"/>
+        <a:font script="Telu" typeface="Gautami"/>
+        <a:font script="Taml" typeface="Latha"/>
+        <a:font script="Syrc" typeface="Estrangelo Edessa"/>
+        <a:font script="Orya" typeface="Kalinga"/>
+        <a:font script="Mlym" typeface="Kartika"/>
+        <a:font script="Laoo" typeface="DokChampa"/>
+        <a:font script="Sinh" typeface="Iskoola Pota"/>
+        <a:font script="Mong" typeface="Mongolian Baiti"/>
+        <a:font script="Viet" typeface="Arial"/>
+        <a:font script="Uigh" typeface="Microsoft Uighur"/>
+        <a:font script="Geor" typeface="Sylfaen"/>
+      </a:minorFont>
+    </a:fontScheme>
+    <a:fmtScheme name="Office">
+      <a:fillStyleLst>
+        <a:solidFill>
+          <a:schemeClr val="phClr"/>
+        </a:solidFill>
+        <a:gradFill rotWithShape="1">
+          <a:gsLst>
+            <a:gs pos="0">
+              <a:schemeClr val="phClr">
+                <a:tint val="50000"/>
+                <a:satMod val="300000"/>
+              </a:schemeClr>
+            </a:gs>
+            <a:gs pos="35000">
+              <a:schemeClr val="phClr">
+                <a:tint val="37000"/>
+                <a:satMod val="300000"/>
+              </a:schemeClr>
+            </a:gs>
+            <a:gs pos="100000">
+              <a:schemeClr val="phClr">
+                <a:tint val="15000"/>
+                <a:satMod val="350000"/>
+              </a:schemeClr>
+            </a:gs>
+          </a:gsLst>
+          <a:lin ang="16200000" scaled="1"/>
+        </a:gradFill>
+        <a:gradFill rotWithShape="1">
+          <a:gsLst>
+            <a:gs pos="0">
+              <a:schemeClr val="phClr">
+                <a:tint val="100000"/>
+                <a:shade val="100000"/>
+                <a:satMod val="130000"/>
+              </a:schemeClr>
+            </a:gs>
+            <a:gs pos="100000">
+              <a:schemeClr val="phClr">
+                <a:tint val="50000"/>
+                <a:shade val="100000"/>
+                <a:satMod val="350000"/>
+              </a:schemeClr>
+            </a:gs>
+          </a:gsLst>
+          <a:lin ang="16200000" scaled="0"/>
+        </a:gradFill>
+      </a:fillStyleLst>
+      <a:lnStyleLst>
+        <a:ln w="9525" cap="flat" cmpd="sng" algn="ctr">
+          <a:solidFill>
+            <a:schemeClr val="phClr">
+              <a:shade val="95000"/>
+              <a:satMod val="105000"/>
+            </a:schemeClr>
+          </a:solidFill>
+          <a:prstDash val="solid"/>
+        </a:ln>
+        <a:ln w="25400" cap="flat" cmpd="sng" algn="ctr">
+          <a:solidFill>
+            <a:schemeClr val="phClr"/>
+          </a:solidFill>
+          <a:prstDash val="solid"/>
+        </a:ln>
+        <a:ln w="38100" cap="flat" cmpd="sng" algn="ctr">
+          <a:solidFill>
+            <a:schemeClr val="phClr"/>
+          </a:solidFill>
+          <a:prstDash val="solid"/>
+        </a:ln>
+      </a:lnStyleLst>
+      <a:effectStyleLst>
+        <a:effectStyle>
+          <a:effectLst>
+            <a:outerShdw blurRad="40000" dist="20000" dir="5400000" rotWithShape="0">
+              <a:srgbClr val="000000">
+                <a:alpha val="38000"/>
+              </a:srgbClr>
+            </a:outerShdw>
+          </a:effectLst>
+        </a:effectStyle>
+        <a:effectStyle>
+          <a:effectLst>
+            <a:outerShdw blurRad="40000" dist="23000" dir="5400000" rotWithShape="0">
+              <a:srgbClr val="000000">
+                <a:alpha val="35000"/>
+              </a:srgbClr>
+            </a:outerShdw>
+          </a:effectLst>
+        </a:effectStyle>
+        <a:effectStyle>
+          <a:effectLst>
+            <a:outerShdw blurRad="40000" dist="23000" dir="5400000" rotWithShape="0">
+              <a:srgbClr val="000000">
+                <a:alpha val="35000"/>
+              </a:srgbClr>
+            </a:outerShdw>
+          </a:effectLst>
+          <a:scene3d>
+            <a:camera prst="orthographicFront">
+              <a:rot lat="0" lon="0" rev="0"/>
+            </a:camera>
+            <a:lightRig rig="threePt" dir="t">
+              <a:rot lat="0" lon="0" rev="1200000"/>
+            </a:lightRig>
+          </a:scene3d>
+          <a:sp3d>
+            <a:bevelT w="63500" h="25400"/>
+          </a:sp3d>
+        </a:effectStyle>
+      </a:effectStyleLst>
+      <a:bgFillStyleLst>
+        <a:solidFill>
+          <a:schemeClr val="phClr"/>
+        </a:solidFill>
+        <a:gradFill rotWithShape="1">
+          <a:gsLst>
+            <a:gs pos="0">
+              <a:schemeClr val="phClr">
+                <a:tint val="40000"/>
+                <a:satMod val="350000"/>
+              </a:schemeClr>
+            </a:gs>
+            <a:gs pos="40000">
+              <a:schemeClr val="phClr">
+                <a:tint val="45000"/>
+                <a:shade val="99000"/>
+                <a:satMod val="350000"/>
+              </a:schemeClr>
+            </a:gs>
+            <a:gs pos="100000">
+              <a:schemeClr val="phClr">
+                <a:shade val="20000"/>
+                <a:satMod val="255000"/>
+              </a:schemeClr>
+            </a:gs>
+          </a:gsLst>
+          <a:path path="circle">
+            <a:fillToRect l="50000" t="-80000" r="50000" b="180000"/>
+          </a:path>
+        </a:gradFill>
+        <a:gradFill rotWithShape="1">
+          <a:gsLst>
+            <a:gs pos="0">
+              <a:schemeClr val="phClr">
+                <a:tint val="80000"/>
+                <a:satMod val="300000"/>
+              </a:schemeClr>
+            </a:gs>
+            <a:gs pos="100000">
+              <a:schemeClr val="phClr">
+                <a:shade val="30000"/>
+                <a:satMod val="200000"/>
+              </a:schemeClr>
+            </a:gs>
+          </a:gsLst>
+          <a:path path="circle">
+            <a:fillToRect l="50000" t="50000" r="50000" b="50000"/>
+          </a:path>
+        </a:gradFill>
+      </a:bgFillStyleLst>
+    </a:fmtScheme>
+  </a:themeElements>
+</a:theme>
+</file>
+
+<file path=ppt/theme/theme2.xml><?xml version="1.0" encoding="utf-8"?>
 <a:theme xmlns:a="http://schemas.openxmlformats.org/drawingml/2006/main" xmlns:r="http://schemas.openxmlformats.org/officeDocument/2006/relationships">
   <a:themeElements>
     <a:clrScheme name="Default">
@@ -26202,283 +28078,4 @@
     </a:fmtScheme>
   </a:themeElements>
 </a:theme>
-</file>
-
-<file path=ppt/theme/theme2.xml><?xml version="1.0" encoding="utf-8"?>
-<a:theme xmlns:a="http://schemas.openxmlformats.org/drawingml/2006/main" xmlns:r="http://schemas.openxmlformats.org/officeDocument/2006/relationships" name="Tropic">
-  <a:themeElements>
-    <a:clrScheme name="Tropic">
-      <a:dk1>
-        <a:srgbClr val="A1E8D9"/>
-      </a:dk1>
-      <a:lt1>
-        <a:srgbClr val="FFFFFF"/>
-      </a:lt1>
-      <a:dk2>
-        <a:srgbClr val="695D46"/>
-      </a:dk2>
-      <a:lt2>
-        <a:srgbClr val="B3A77D"/>
-      </a:lt2>
-      <a:accent1>
-        <a:srgbClr val="EF6C00"/>
-      </a:accent1>
-      <a:accent2>
-        <a:srgbClr val="CE93D8"/>
-      </a:accent2>
-      <a:accent3>
-        <a:srgbClr val="4DB6AC"/>
-      </a:accent3>
-      <a:accent4>
-        <a:srgbClr val="FF9800"/>
-      </a:accent4>
-      <a:accent5>
-        <a:srgbClr val="009668"/>
-      </a:accent5>
-      <a:accent6>
-        <a:srgbClr val="EEFF41"/>
-      </a:accent6>
-      <a:hlink>
-        <a:srgbClr val="009668"/>
-      </a:hlink>
-      <a:folHlink>
-        <a:srgbClr val="009668"/>
-      </a:folHlink>
-    </a:clrScheme>
-    <a:fontScheme name="Office">
-      <a:majorFont>
-        <a:latin typeface="Arial"/>
-        <a:ea typeface=""/>
-        <a:cs typeface=""/>
-        <a:font script="Jpan" typeface="ＭＳ Ｐゴシック"/>
-        <a:font script="Hang" typeface="맑은 고딕"/>
-        <a:font script="Hans" typeface="宋体"/>
-        <a:font script="Hant" typeface="新細明體"/>
-        <a:font script="Arab" typeface="Times New Roman"/>
-        <a:font script="Hebr" typeface="Times New Roman"/>
-        <a:font script="Thai" typeface="Angsana New"/>
-        <a:font script="Ethi" typeface="Nyala"/>
-        <a:font script="Beng" typeface="Vrinda"/>
-        <a:font script="Gujr" typeface="Shruti"/>
-        <a:font script="Khmr" typeface="MoolBoran"/>
-        <a:font script="Knda" typeface="Tunga"/>
-        <a:font script="Guru" typeface="Raavi"/>
-        <a:font script="Cans" typeface="Euphemia"/>
-        <a:font script="Cher" typeface="Plantagenet Cherokee"/>
-        <a:font script="Yiii" typeface="Microsoft Yi Baiti"/>
-        <a:font script="Tibt" typeface="Microsoft Himalaya"/>
-        <a:font script="Thaa" typeface="MV Boli"/>
-        <a:font script="Deva" typeface="Mangal"/>
-        <a:font script="Telu" typeface="Gautami"/>
-        <a:font script="Taml" typeface="Latha"/>
-        <a:font script="Syrc" typeface="Estrangelo Edessa"/>
-        <a:font script="Orya" typeface="Kalinga"/>
-        <a:font script="Mlym" typeface="Kartika"/>
-        <a:font script="Laoo" typeface="DokChampa"/>
-        <a:font script="Sinh" typeface="Iskoola Pota"/>
-        <a:font script="Mong" typeface="Mongolian Baiti"/>
-        <a:font script="Viet" typeface="Times New Roman"/>
-        <a:font script="Uigh" typeface="Microsoft Uighur"/>
-        <a:font script="Geor" typeface="Sylfaen"/>
-      </a:majorFont>
-      <a:minorFont>
-        <a:latin typeface="Arial"/>
-        <a:ea typeface=""/>
-        <a:cs typeface=""/>
-        <a:font script="Jpan" typeface="ＭＳ Ｐゴシック"/>
-        <a:font script="Hang" typeface="맑은 고딕"/>
-        <a:font script="Hans" typeface="宋体"/>
-        <a:font script="Hant" typeface="新細明體"/>
-        <a:font script="Arab" typeface="Arial"/>
-        <a:font script="Hebr" typeface="Arial"/>
-        <a:font script="Thai" typeface="Cordia New"/>
-        <a:font script="Ethi" typeface="Nyala"/>
-        <a:font script="Beng" typeface="Vrinda"/>
-        <a:font script="Gujr" typeface="Shruti"/>
-        <a:font script="Khmr" typeface="DaunPenh"/>
-        <a:font script="Knda" typeface="Tunga"/>
-        <a:font script="Guru" typeface="Raavi"/>
-        <a:font script="Cans" typeface="Euphemia"/>
-        <a:font script="Cher" typeface="Plantagenet Cherokee"/>
-        <a:font script="Yiii" typeface="Microsoft Yi Baiti"/>
-        <a:font script="Tibt" typeface="Microsoft Himalaya"/>
-        <a:font script="Thaa" typeface="MV Boli"/>
-        <a:font script="Deva" typeface="Mangal"/>
-        <a:font script="Telu" typeface="Gautami"/>
-        <a:font script="Taml" typeface="Latha"/>
-        <a:font script="Syrc" typeface="Estrangelo Edessa"/>
-        <a:font script="Orya" typeface="Kalinga"/>
-        <a:font script="Mlym" typeface="Kartika"/>
-        <a:font script="Laoo" typeface="DokChampa"/>
-        <a:font script="Sinh" typeface="Iskoola Pota"/>
-        <a:font script="Mong" typeface="Mongolian Baiti"/>
-        <a:font script="Viet" typeface="Arial"/>
-        <a:font script="Uigh" typeface="Microsoft Uighur"/>
-        <a:font script="Geor" typeface="Sylfaen"/>
-      </a:minorFont>
-    </a:fontScheme>
-    <a:fmtScheme name="Office">
-      <a:fillStyleLst>
-        <a:solidFill>
-          <a:schemeClr val="phClr"/>
-        </a:solidFill>
-        <a:gradFill rotWithShape="1">
-          <a:gsLst>
-            <a:gs pos="0">
-              <a:schemeClr val="phClr">
-                <a:tint val="50000"/>
-                <a:satMod val="300000"/>
-              </a:schemeClr>
-            </a:gs>
-            <a:gs pos="35000">
-              <a:schemeClr val="phClr">
-                <a:tint val="37000"/>
-                <a:satMod val="300000"/>
-              </a:schemeClr>
-            </a:gs>
-            <a:gs pos="100000">
-              <a:schemeClr val="phClr">
-                <a:tint val="15000"/>
-                <a:satMod val="350000"/>
-              </a:schemeClr>
-            </a:gs>
-          </a:gsLst>
-          <a:lin ang="16200000" scaled="1"/>
-        </a:gradFill>
-        <a:gradFill rotWithShape="1">
-          <a:gsLst>
-            <a:gs pos="0">
-              <a:schemeClr val="phClr">
-                <a:tint val="100000"/>
-                <a:shade val="100000"/>
-                <a:satMod val="130000"/>
-              </a:schemeClr>
-            </a:gs>
-            <a:gs pos="100000">
-              <a:schemeClr val="phClr">
-                <a:tint val="50000"/>
-                <a:shade val="100000"/>
-                <a:satMod val="350000"/>
-              </a:schemeClr>
-            </a:gs>
-          </a:gsLst>
-          <a:lin ang="16200000" scaled="0"/>
-        </a:gradFill>
-      </a:fillStyleLst>
-      <a:lnStyleLst>
-        <a:ln w="9525" cap="flat" cmpd="sng" algn="ctr">
-          <a:solidFill>
-            <a:schemeClr val="phClr">
-              <a:shade val="95000"/>
-              <a:satMod val="105000"/>
-            </a:schemeClr>
-          </a:solidFill>
-          <a:prstDash val="solid"/>
-        </a:ln>
-        <a:ln w="25400" cap="flat" cmpd="sng" algn="ctr">
-          <a:solidFill>
-            <a:schemeClr val="phClr"/>
-          </a:solidFill>
-          <a:prstDash val="solid"/>
-        </a:ln>
-        <a:ln w="38100" cap="flat" cmpd="sng" algn="ctr">
-          <a:solidFill>
-            <a:schemeClr val="phClr"/>
-          </a:solidFill>
-          <a:prstDash val="solid"/>
-        </a:ln>
-      </a:lnStyleLst>
-      <a:effectStyleLst>
-        <a:effectStyle>
-          <a:effectLst>
-            <a:outerShdw blurRad="40000" dist="20000" dir="5400000" rotWithShape="0">
-              <a:srgbClr val="000000">
-                <a:alpha val="38000"/>
-              </a:srgbClr>
-            </a:outerShdw>
-          </a:effectLst>
-        </a:effectStyle>
-        <a:effectStyle>
-          <a:effectLst>
-            <a:outerShdw blurRad="40000" dist="23000" dir="5400000" rotWithShape="0">
-              <a:srgbClr val="000000">
-                <a:alpha val="35000"/>
-              </a:srgbClr>
-            </a:outerShdw>
-          </a:effectLst>
-        </a:effectStyle>
-        <a:effectStyle>
-          <a:effectLst>
-            <a:outerShdw blurRad="40000" dist="23000" dir="5400000" rotWithShape="0">
-              <a:srgbClr val="000000">
-                <a:alpha val="35000"/>
-              </a:srgbClr>
-            </a:outerShdw>
-          </a:effectLst>
-          <a:scene3d>
-            <a:camera prst="orthographicFront">
-              <a:rot lat="0" lon="0" rev="0"/>
-            </a:camera>
-            <a:lightRig rig="threePt" dir="t">
-              <a:rot lat="0" lon="0" rev="1200000"/>
-            </a:lightRig>
-          </a:scene3d>
-          <a:sp3d>
-            <a:bevelT w="63500" h="25400"/>
-          </a:sp3d>
-        </a:effectStyle>
-      </a:effectStyleLst>
-      <a:bgFillStyleLst>
-        <a:solidFill>
-          <a:schemeClr val="phClr"/>
-        </a:solidFill>
-        <a:gradFill rotWithShape="1">
-          <a:gsLst>
-            <a:gs pos="0">
-              <a:schemeClr val="phClr">
-                <a:tint val="40000"/>
-                <a:satMod val="350000"/>
-              </a:schemeClr>
-            </a:gs>
-            <a:gs pos="40000">
-              <a:schemeClr val="phClr">
-                <a:tint val="45000"/>
-                <a:shade val="99000"/>
-                <a:satMod val="350000"/>
-              </a:schemeClr>
-            </a:gs>
-            <a:gs pos="100000">
-              <a:schemeClr val="phClr">
-                <a:shade val="20000"/>
-                <a:satMod val="255000"/>
-              </a:schemeClr>
-            </a:gs>
-          </a:gsLst>
-          <a:path path="circle">
-            <a:fillToRect l="50000" t="-80000" r="50000" b="180000"/>
-          </a:path>
-        </a:gradFill>
-        <a:gradFill rotWithShape="1">
-          <a:gsLst>
-            <a:gs pos="0">
-              <a:schemeClr val="phClr">
-                <a:tint val="80000"/>
-                <a:satMod val="300000"/>
-              </a:schemeClr>
-            </a:gs>
-            <a:gs pos="100000">
-              <a:schemeClr val="phClr">
-                <a:shade val="30000"/>
-                <a:satMod val="200000"/>
-              </a:schemeClr>
-            </a:gs>
-          </a:gsLst>
-          <a:path path="circle">
-            <a:fillToRect l="50000" t="50000" r="50000" b="50000"/>
-          </a:path>
-        </a:gradFill>
-      </a:bgFillStyleLst>
-    </a:fmtScheme>
-  </a:themeElements>
-</a:theme>
 </file>
</xml_diff>

<commit_message>
Adds answers for Qs 28,29,30
</commit_message>
<xml_diff>
--- a/ISTQB Foundation Level Preparation.pptx
+++ b/ISTQB Foundation Level Preparation.pptx
@@ -7411,7 +7411,7 @@
   <p:cSld>
     <p:spTree>
       <p:nvGrpSpPr>
-        <p:cNvPr id="467" name="Shape 467"/>
+        <p:cNvPr id="466" name="Shape 466"/>
         <p:cNvGrpSpPr/>
         <p:nvPr/>
       </p:nvGrpSpPr>
@@ -7425,7 +7425,7 @@
       </p:grpSpPr>
       <p:sp>
         <p:nvSpPr>
-          <p:cNvPr id="468" name="Google Shape;468;g2f1e1d5e8dd_1_10:notes"/>
+          <p:cNvPr id="467" name="Google Shape;467;g2f1e1d5e8dd_1_10:notes"/>
           <p:cNvSpPr/>
           <p:nvPr>
             <p:ph idx="2" type="sldImg"/>
@@ -7460,7 +7460,7 @@
       </p:sp>
       <p:sp>
         <p:nvSpPr>
-          <p:cNvPr id="469" name="Google Shape;469;g2f1e1d5e8dd_1_10:notes"/>
+          <p:cNvPr id="468" name="Google Shape;468;g2f1e1d5e8dd_1_10:notes"/>
           <p:cNvSpPr txBox="1"/>
           <p:nvPr>
             <p:ph idx="1" type="body"/>
@@ -7510,7 +7510,7 @@
   <p:cSld>
     <p:spTree>
       <p:nvGrpSpPr>
-        <p:cNvPr id="472" name="Shape 472"/>
+        <p:cNvPr id="471" name="Shape 471"/>
         <p:cNvGrpSpPr/>
         <p:nvPr/>
       </p:nvGrpSpPr>
@@ -7524,7 +7524,7 @@
       </p:grpSpPr>
       <p:sp>
         <p:nvSpPr>
-          <p:cNvPr id="473" name="Google Shape;473;g2f1e1d5e8dd_1_48:notes"/>
+          <p:cNvPr id="472" name="Google Shape;472;g2f1e1d5e8dd_1_48:notes"/>
           <p:cNvSpPr/>
           <p:nvPr>
             <p:ph idx="2" type="sldImg"/>
@@ -7559,7 +7559,7 @@
       </p:sp>
       <p:sp>
         <p:nvSpPr>
-          <p:cNvPr id="474" name="Google Shape;474;g2f1e1d5e8dd_1_48:notes"/>
+          <p:cNvPr id="473" name="Google Shape;473;g2f1e1d5e8dd_1_48:notes"/>
           <p:cNvSpPr txBox="1"/>
           <p:nvPr>
             <p:ph idx="1" type="body"/>
@@ -7609,7 +7609,7 @@
   <p:cSld>
     <p:spTree>
       <p:nvGrpSpPr>
-        <p:cNvPr id="477" name="Shape 477"/>
+        <p:cNvPr id="476" name="Shape 476"/>
         <p:cNvGrpSpPr/>
         <p:nvPr/>
       </p:nvGrpSpPr>
@@ -7623,7 +7623,7 @@
       </p:grpSpPr>
       <p:sp>
         <p:nvSpPr>
-          <p:cNvPr id="478" name="Google Shape;478;g2f1e1d5e8dd_1_15:notes"/>
+          <p:cNvPr id="477" name="Google Shape;477;g2f1e1d5e8dd_1_15:notes"/>
           <p:cNvSpPr/>
           <p:nvPr>
             <p:ph idx="2" type="sldImg"/>
@@ -7658,7 +7658,7 @@
       </p:sp>
       <p:sp>
         <p:nvSpPr>
-          <p:cNvPr id="479" name="Google Shape;479;g2f1e1d5e8dd_1_15:notes"/>
+          <p:cNvPr id="478" name="Google Shape;478;g2f1e1d5e8dd_1_15:notes"/>
           <p:cNvSpPr txBox="1"/>
           <p:nvPr>
             <p:ph idx="1" type="body"/>
@@ -7708,7 +7708,7 @@
   <p:cSld>
     <p:spTree>
       <p:nvGrpSpPr>
-        <p:cNvPr id="483" name="Shape 483"/>
+        <p:cNvPr id="481" name="Shape 481"/>
         <p:cNvGrpSpPr/>
         <p:nvPr/>
       </p:nvGrpSpPr>
@@ -7722,7 +7722,7 @@
       </p:grpSpPr>
       <p:sp>
         <p:nvSpPr>
-          <p:cNvPr id="484" name="Google Shape;484;g2f1e1d5e8dd_1_20:notes"/>
+          <p:cNvPr id="482" name="Google Shape;482;g2f1e1d5e8dd_1_20:notes"/>
           <p:cNvSpPr/>
           <p:nvPr>
             <p:ph idx="2" type="sldImg"/>
@@ -7757,7 +7757,7 @@
       </p:sp>
       <p:sp>
         <p:nvSpPr>
-          <p:cNvPr id="485" name="Google Shape;485;g2f1e1d5e8dd_1_20:notes"/>
+          <p:cNvPr id="483" name="Google Shape;483;g2f1e1d5e8dd_1_20:notes"/>
           <p:cNvSpPr txBox="1"/>
           <p:nvPr>
             <p:ph idx="1" type="body"/>
@@ -7807,7 +7807,7 @@
   <p:cSld>
     <p:spTree>
       <p:nvGrpSpPr>
-        <p:cNvPr id="489" name="Shape 489"/>
+        <p:cNvPr id="487" name="Shape 487"/>
         <p:cNvGrpSpPr/>
         <p:nvPr/>
       </p:nvGrpSpPr>
@@ -7821,7 +7821,7 @@
       </p:grpSpPr>
       <p:sp>
         <p:nvSpPr>
-          <p:cNvPr id="490" name="Google Shape;490;g2f1e1d5e8dd_1_34:notes"/>
+          <p:cNvPr id="488" name="Google Shape;488;g2f1e1d5e8dd_1_34:notes"/>
           <p:cNvSpPr/>
           <p:nvPr>
             <p:ph idx="2" type="sldImg"/>
@@ -7856,7 +7856,7 @@
       </p:sp>
       <p:sp>
         <p:nvSpPr>
-          <p:cNvPr id="491" name="Google Shape;491;g2f1e1d5e8dd_1_34:notes"/>
+          <p:cNvPr id="489" name="Google Shape;489;g2f1e1d5e8dd_1_34:notes"/>
           <p:cNvSpPr txBox="1"/>
           <p:nvPr>
             <p:ph idx="1" type="body"/>
@@ -20341,7 +20341,7 @@
             <a:tbl>
               <a:tblPr>
                 <a:noFill/>
-                <a:tableStyleId>{44A1B72B-49B9-4133-944B-F7B362E0B490}</a:tableStyleId>
+                <a:tableStyleId>{C4480CC5-2E29-4362-8BB5-5E05654FAFB2}</a:tableStyleId>
               </a:tblPr>
               <a:tblGrid>
                 <a:gridCol w="5713925"/>
@@ -27747,13 +27747,13 @@
           <p:cNvPr id="465" name="Google Shape;465;p81"/>
           <p:cNvSpPr txBox="1"/>
           <p:nvPr>
-            <p:ph type="title"/>
-          </p:nvPr>
-        </p:nvSpPr>
-        <p:spPr>
-          <a:xfrm>
-            <a:off x="311700" y="445025"/>
-            <a:ext cx="8520600" cy="707400"/>
+            <p:ph idx="1" type="body"/>
+          </p:nvPr>
+        </p:nvSpPr>
+        <p:spPr>
+          <a:xfrm>
+            <a:off x="311700" y="332400"/>
+            <a:ext cx="8520600" cy="4408800"/>
           </a:xfrm>
           <a:prstGeom prst="rect">
             <a:avLst/>
@@ -27761,7 +27761,7 @@
         </p:spPr>
         <p:txBody>
           <a:bodyPr anchorCtr="0" anchor="t" bIns="91425" lIns="91425" spcFirstLastPara="1" rIns="91425" wrap="square" tIns="91425">
-            <a:normAutofit fontScale="90000"/>
+            <a:noAutofit/>
           </a:bodyPr>
           <a:lstStyle/>
           <a:p>
@@ -27775,48 +27775,66 @@
               <a:buNone/>
             </a:pPr>
             <a:r>
-              <a:t/>
-            </a:r>
-            <a:endParaRPr/>
-          </a:p>
-        </p:txBody>
-      </p:sp>
-      <p:sp>
-        <p:nvSpPr>
-          <p:cNvPr id="466" name="Google Shape;466;p81"/>
-          <p:cNvSpPr txBox="1"/>
-          <p:nvPr>
-            <p:ph idx="1" type="body"/>
-          </p:nvPr>
-        </p:nvSpPr>
-        <p:spPr>
-          <a:xfrm>
-            <a:off x="311700" y="1266325"/>
-            <a:ext cx="8520600" cy="3302700"/>
-          </a:xfrm>
-          <a:prstGeom prst="rect">
-            <a:avLst/>
-          </a:prstGeom>
-        </p:spPr>
-        <p:txBody>
-          <a:bodyPr anchorCtr="0" anchor="t" bIns="91425" lIns="91425" spcFirstLastPara="1" rIns="91425" wrap="square" tIns="91425">
-            <a:normAutofit/>
-          </a:bodyPr>
-          <a:lstStyle/>
-          <a:p>
-            <a:pPr indent="0" lvl="0" marL="0" rtl="0" algn="l">
-              <a:spcBef>
-                <a:spcPts val="0"/>
-              </a:spcBef>
-              <a:spcAft>
-                <a:spcPts val="1200"/>
-              </a:spcAft>
-              <a:buNone/>
-            </a:pPr>
-            <a:r>
-              <a:t/>
-            </a:r>
-            <a:endParaRPr/>
+              <a:rPr lang="en" sz="2000"/>
+              <a:t>a) Is not correct. Retrospectives are used to capture lessons learned and to improve the development and testing process, not to document the acceptance criteria</a:t>
+            </a:r>
+            <a:endParaRPr sz="2000"/>
+          </a:p>
+          <a:p>
+            <a:pPr indent="0" lvl="0" marL="0" rtl="0" algn="l">
+              <a:spcBef>
+                <a:spcPts val="1200"/>
+              </a:spcBef>
+              <a:spcAft>
+                <a:spcPts val="0"/>
+              </a:spcAft>
+              <a:buNone/>
+            </a:pPr>
+            <a:r>
+              <a:rPr lang="en" sz="2000">
+                <a:highlight>
+                  <a:schemeClr val="accent6"/>
+                </a:highlight>
+              </a:rPr>
+              <a:t>b) Is correct. This is the standard way to document acceptance criteria</a:t>
+            </a:r>
+            <a:endParaRPr sz="2000">
+              <a:highlight>
+                <a:schemeClr val="accent6"/>
+              </a:highlight>
+            </a:endParaRPr>
+          </a:p>
+          <a:p>
+            <a:pPr indent="0" lvl="0" marL="0" rtl="0" algn="l">
+              <a:spcBef>
+                <a:spcPts val="1200"/>
+              </a:spcBef>
+              <a:spcAft>
+                <a:spcPts val="0"/>
+              </a:spcAft>
+              <a:buNone/>
+            </a:pPr>
+            <a:r>
+              <a:rPr lang="en" sz="2000"/>
+              <a:t>c) Is not correct. Verbal communication does not allow to physically document the acceptance criteria as part of a user story (”card” aspect in the 3C’s model)</a:t>
+            </a:r>
+            <a:endParaRPr sz="2000"/>
+          </a:p>
+          <a:p>
+            <a:pPr indent="0" lvl="0" marL="0" rtl="0" algn="l">
+              <a:spcBef>
+                <a:spcPts val="1200"/>
+              </a:spcBef>
+              <a:spcAft>
+                <a:spcPts val="1200"/>
+              </a:spcAft>
+              <a:buNone/>
+            </a:pPr>
+            <a:r>
+              <a:rPr lang="en" sz="2000"/>
+              <a:t>d) Is not correct. Acceptance criteria are related to a user story, not a test plan. Also, acceptance criteria are the conditions that have to be fulfilled to decide if the user story is complete. Risks are not such condition.</a:t>
+            </a:r>
+            <a:endParaRPr sz="2000"/>
           </a:p>
         </p:txBody>
       </p:sp>
@@ -28084,7 +28102,7 @@
   <p:cSld>
     <p:spTree>
       <p:nvGrpSpPr>
-        <p:cNvPr id="470" name="Shape 470"/>
+        <p:cNvPr id="469" name="Shape 469"/>
         <p:cNvGrpSpPr/>
         <p:nvPr/>
       </p:nvGrpSpPr>
@@ -28098,7 +28116,7 @@
       </p:grpSpPr>
       <p:sp>
         <p:nvSpPr>
-          <p:cNvPr id="471" name="Google Shape;471;p82"/>
+          <p:cNvPr id="470" name="Google Shape;470;p82"/>
           <p:cNvSpPr txBox="1"/>
           <p:nvPr>
             <p:ph idx="1" type="body"/>
@@ -28333,7 +28351,7 @@
   <p:cSld>
     <p:spTree>
       <p:nvGrpSpPr>
-        <p:cNvPr id="475" name="Shape 475"/>
+        <p:cNvPr id="474" name="Shape 474"/>
         <p:cNvGrpSpPr/>
         <p:nvPr/>
       </p:nvGrpSpPr>
@@ -28347,7 +28365,7 @@
       </p:grpSpPr>
       <p:sp>
         <p:nvSpPr>
-          <p:cNvPr id="476" name="Google Shape;476;p83"/>
+          <p:cNvPr id="475" name="Google Shape;475;p83"/>
           <p:cNvSpPr txBox="1"/>
           <p:nvPr>
             <p:ph idx="1" type="body"/>
@@ -28511,7 +28529,7 @@
   <p:cSld>
     <p:spTree>
       <p:nvGrpSpPr>
-        <p:cNvPr id="480" name="Shape 480"/>
+        <p:cNvPr id="479" name="Shape 479"/>
         <p:cNvGrpSpPr/>
         <p:nvPr/>
       </p:nvGrpSpPr>
@@ -28525,55 +28543,16 @@
       </p:grpSpPr>
       <p:sp>
         <p:nvSpPr>
-          <p:cNvPr id="481" name="Google Shape;481;p84"/>
+          <p:cNvPr id="480" name="Google Shape;480;p84"/>
           <p:cNvSpPr txBox="1"/>
           <p:nvPr>
-            <p:ph type="title"/>
-          </p:nvPr>
-        </p:nvSpPr>
-        <p:spPr>
-          <a:xfrm>
-            <a:off x="311700" y="445025"/>
-            <a:ext cx="8520600" cy="707400"/>
-          </a:xfrm>
-          <a:prstGeom prst="rect">
-            <a:avLst/>
-          </a:prstGeom>
-        </p:spPr>
-        <p:txBody>
-          <a:bodyPr anchorCtr="0" anchor="t" bIns="91425" lIns="91425" spcFirstLastPara="1" rIns="91425" wrap="square" tIns="91425">
-            <a:normAutofit fontScale="90000"/>
-          </a:bodyPr>
-          <a:lstStyle/>
-          <a:p>
-            <a:pPr indent="0" lvl="0" marL="0" rtl="0" algn="l">
-              <a:spcBef>
-                <a:spcPts val="0"/>
-              </a:spcBef>
-              <a:spcAft>
-                <a:spcPts val="0"/>
-              </a:spcAft>
-              <a:buNone/>
-            </a:pPr>
-            <a:r>
-              <a:t/>
-            </a:r>
-            <a:endParaRPr/>
-          </a:p>
-        </p:txBody>
-      </p:sp>
-      <p:sp>
-        <p:nvSpPr>
-          <p:cNvPr id="482" name="Google Shape;482;p84"/>
-          <p:cNvSpPr txBox="1"/>
-          <p:nvPr>
             <p:ph idx="1" type="body"/>
           </p:nvPr>
         </p:nvSpPr>
         <p:spPr>
           <a:xfrm>
-            <a:off x="311700" y="1266325"/>
-            <a:ext cx="8520600" cy="3302700"/>
+            <a:off x="311700" y="297425"/>
+            <a:ext cx="8520600" cy="4271700"/>
           </a:xfrm>
           <a:prstGeom prst="rect">
             <a:avLst/>
@@ -28590,14 +28569,71 @@
                 <a:spcPts val="0"/>
               </a:spcBef>
               <a:spcAft>
-                <a:spcPts val="1200"/>
-              </a:spcAft>
-              <a:buNone/>
-            </a:pPr>
-            <a:r>
-              <a:t/>
-            </a:r>
-            <a:endParaRPr/>
+                <a:spcPts val="0"/>
+              </a:spcAft>
+              <a:buNone/>
+            </a:pPr>
+            <a:r>
+              <a:rPr lang="en" sz="2200">
+                <a:highlight>
+                  <a:schemeClr val="accent6"/>
+                </a:highlight>
+              </a:rPr>
+              <a:t>a) Is correct. This test covers two acceptance criteria: one about editing the document and one about saving changes</a:t>
+            </a:r>
+            <a:endParaRPr sz="2200">
+              <a:highlight>
+                <a:schemeClr val="accent6"/>
+              </a:highlight>
+            </a:endParaRPr>
+          </a:p>
+          <a:p>
+            <a:pPr indent="0" lvl="0" marL="0" rtl="0" algn="l">
+              <a:spcBef>
+                <a:spcPts val="1200"/>
+              </a:spcBef>
+              <a:spcAft>
+                <a:spcPts val="0"/>
+              </a:spcAft>
+              <a:buNone/>
+            </a:pPr>
+            <a:r>
+              <a:rPr lang="en" sz="2200"/>
+              <a:t>b) Is not correct. Acceptance criteria cover the editor activities, not the content owner activities</a:t>
+            </a:r>
+            <a:endParaRPr sz="2200"/>
+          </a:p>
+          <a:p>
+            <a:pPr indent="0" lvl="0" marL="0" rtl="0" algn="l">
+              <a:spcBef>
+                <a:spcPts val="1200"/>
+              </a:spcBef>
+              <a:spcAft>
+                <a:spcPts val="0"/>
+              </a:spcAft>
+              <a:buNone/>
+            </a:pPr>
+            <a:r>
+              <a:rPr lang="en" sz="2200"/>
+              <a:t>c) Is not correct. Scheduling the edited content for publication may be a nice feature, but it is not covered by the acceptance criteria</a:t>
+            </a:r>
+            <a:endParaRPr sz="2200"/>
+          </a:p>
+          <a:p>
+            <a:pPr indent="0" lvl="0" marL="0" rtl="0" algn="l">
+              <a:spcBef>
+                <a:spcPts val="1200"/>
+              </a:spcBef>
+              <a:spcAft>
+                <a:spcPts val="1200"/>
+              </a:spcAft>
+              <a:buNone/>
+            </a:pPr>
+            <a:r>
+              <a:rPr lang="en" sz="2200"/>
+              <a:t>d) Is not correct. Acceptance criteria state about reassigning from an editor to the content owner, not to another editor.</a:t>
+            </a:r>
+            <a:endParaRPr sz="2200"/>
           </a:p>
         </p:txBody>
       </p:sp>
@@ -28614,7 +28650,7 @@
   <p:cSld>
     <p:spTree>
       <p:nvGrpSpPr>
-        <p:cNvPr id="486" name="Shape 486"/>
+        <p:cNvPr id="484" name="Shape 484"/>
         <p:cNvGrpSpPr/>
         <p:nvPr/>
       </p:nvGrpSpPr>
@@ -28628,7 +28664,7 @@
       </p:grpSpPr>
       <p:sp>
         <p:nvSpPr>
-          <p:cNvPr id="487" name="Google Shape;487;p85"/>
+          <p:cNvPr id="485" name="Google Shape;485;p85"/>
           <p:cNvSpPr txBox="1"/>
           <p:nvPr>
             <p:ph type="title"/>
@@ -28673,7 +28709,7 @@
       </p:sp>
       <p:sp>
         <p:nvSpPr>
-          <p:cNvPr id="488" name="Google Shape;488;p85"/>
+          <p:cNvPr id="486" name="Google Shape;486;p85"/>
           <p:cNvSpPr txBox="1"/>
           <p:nvPr>
             <p:ph idx="1" type="body"/>
@@ -28823,7 +28859,7 @@
   <p:cSld>
     <p:spTree>
       <p:nvGrpSpPr>
-        <p:cNvPr id="492" name="Shape 492"/>
+        <p:cNvPr id="490" name="Shape 490"/>
         <p:cNvGrpSpPr/>
         <p:nvPr/>
       </p:nvGrpSpPr>
@@ -28837,16 +28873,16 @@
       </p:grpSpPr>
       <p:sp>
         <p:nvSpPr>
-          <p:cNvPr id="493" name="Google Shape;493;p86"/>
+          <p:cNvPr id="491" name="Google Shape;491;p86"/>
           <p:cNvSpPr txBox="1"/>
           <p:nvPr>
-            <p:ph type="title"/>
-          </p:nvPr>
-        </p:nvSpPr>
-        <p:spPr>
-          <a:xfrm>
-            <a:off x="311700" y="445025"/>
-            <a:ext cx="8520600" cy="707400"/>
+            <p:ph idx="1" type="body"/>
+          </p:nvPr>
+        </p:nvSpPr>
+        <p:spPr>
+          <a:xfrm>
+            <a:off x="311700" y="227425"/>
+            <a:ext cx="8520600" cy="4566300"/>
           </a:xfrm>
           <a:prstGeom prst="rect">
             <a:avLst/>
@@ -28854,7 +28890,7 @@
         </p:spPr>
         <p:txBody>
           <a:bodyPr anchorCtr="0" anchor="t" bIns="91425" lIns="91425" spcFirstLastPara="1" rIns="91425" wrap="square" tIns="91425">
-            <a:normAutofit fontScale="90000"/>
+            <a:noAutofit/>
           </a:bodyPr>
           <a:lstStyle/>
           <a:p>
@@ -28868,48 +28904,66 @@
               <a:buNone/>
             </a:pPr>
             <a:r>
-              <a:t/>
-            </a:r>
-            <a:endParaRPr/>
-          </a:p>
-        </p:txBody>
-      </p:sp>
-      <p:sp>
-        <p:nvSpPr>
-          <p:cNvPr id="494" name="Google Shape;494;p86"/>
-          <p:cNvSpPr txBox="1"/>
-          <p:nvPr>
-            <p:ph idx="1" type="body"/>
-          </p:nvPr>
-        </p:nvSpPr>
-        <p:spPr>
-          <a:xfrm>
-            <a:off x="311700" y="1266325"/>
-            <a:ext cx="8520600" cy="3302700"/>
-          </a:xfrm>
-          <a:prstGeom prst="rect">
-            <a:avLst/>
-          </a:prstGeom>
-        </p:spPr>
-        <p:txBody>
-          <a:bodyPr anchorCtr="0" anchor="t" bIns="91425" lIns="91425" spcFirstLastPara="1" rIns="91425" wrap="square" tIns="91425">
-            <a:normAutofit/>
-          </a:bodyPr>
-          <a:lstStyle/>
-          <a:p>
-            <a:pPr indent="0" lvl="0" marL="0" rtl="0" algn="l">
-              <a:spcBef>
-                <a:spcPts val="0"/>
-              </a:spcBef>
-              <a:spcAft>
-                <a:spcPts val="1200"/>
-              </a:spcAft>
-              <a:buNone/>
-            </a:pPr>
-            <a:r>
-              <a:t/>
-            </a:r>
-            <a:endParaRPr/>
+              <a:rPr lang="en" sz="2200"/>
+              <a:t>a) Is not correct. Priorities for user stories are determined by the business representative together with the development team</a:t>
+            </a:r>
+            <a:endParaRPr sz="2200"/>
+          </a:p>
+          <a:p>
+            <a:pPr indent="0" lvl="0" marL="0" rtl="0" algn="l">
+              <a:spcBef>
+                <a:spcPts val="1200"/>
+              </a:spcBef>
+              <a:spcAft>
+                <a:spcPts val="0"/>
+              </a:spcAft>
+              <a:buNone/>
+            </a:pPr>
+            <a:r>
+              <a:rPr lang="en" sz="2200"/>
+              <a:t>b) Is not correct. Testers focus on both functional and non-functional aspects of the system to be tested</a:t>
+            </a:r>
+            <a:endParaRPr sz="2200"/>
+          </a:p>
+          <a:p>
+            <a:pPr indent="0" lvl="0" marL="0" rtl="0" algn="l">
+              <a:spcBef>
+                <a:spcPts val="1200"/>
+              </a:spcBef>
+              <a:spcAft>
+                <a:spcPts val="0"/>
+              </a:spcAft>
+              <a:buNone/>
+            </a:pPr>
+            <a:r>
+              <a:rPr lang="en" sz="2200">
+                <a:highlight>
+                  <a:schemeClr val="accent6"/>
+                </a:highlight>
+              </a:rPr>
+              <a:t>c) Is correct. According to the syllabus, this is one of the ways testers add value to iteration and release planning</a:t>
+            </a:r>
+            <a:endParaRPr sz="2200">
+              <a:highlight>
+                <a:schemeClr val="accent6"/>
+              </a:highlight>
+            </a:endParaRPr>
+          </a:p>
+          <a:p>
+            <a:pPr indent="0" lvl="0" marL="0" rtl="0" algn="l">
+              <a:spcBef>
+                <a:spcPts val="1200"/>
+              </a:spcBef>
+              <a:spcAft>
+                <a:spcPts val="1200"/>
+              </a:spcAft>
+              <a:buNone/>
+            </a:pPr>
+            <a:r>
+              <a:rPr lang="en" sz="2200"/>
+              <a:t>d) Is not correct. Early test design is not part of release planning. Early test design does not automatically guarantee the release of quality software</a:t>
+            </a:r>
+            <a:endParaRPr sz="2200"/>
           </a:p>
         </p:txBody>
       </p:sp>
@@ -29337,6 +29391,285 @@
 </file>
 
 <file path=ppt/theme/theme1.xml><?xml version="1.0" encoding="utf-8"?>
+<a:theme xmlns:a="http://schemas.openxmlformats.org/drawingml/2006/main" xmlns:r="http://schemas.openxmlformats.org/officeDocument/2006/relationships">
+  <a:themeElements>
+    <a:clrScheme name="Default">
+      <a:dk1>
+        <a:srgbClr val="000000"/>
+      </a:dk1>
+      <a:lt1>
+        <a:srgbClr val="FFFFFF"/>
+      </a:lt1>
+      <a:dk2>
+        <a:srgbClr val="158158"/>
+      </a:dk2>
+      <a:lt2>
+        <a:srgbClr val="F3F3F3"/>
+      </a:lt2>
+      <a:accent1>
+        <a:srgbClr val="058DC7"/>
+      </a:accent1>
+      <a:accent2>
+        <a:srgbClr val="50B432"/>
+      </a:accent2>
+      <a:accent3>
+        <a:srgbClr val="ED561B"/>
+      </a:accent3>
+      <a:accent4>
+        <a:srgbClr val="EDEF00"/>
+      </a:accent4>
+      <a:accent5>
+        <a:srgbClr val="24CBE5"/>
+      </a:accent5>
+      <a:accent6>
+        <a:srgbClr val="64E572"/>
+      </a:accent6>
+      <a:hlink>
+        <a:srgbClr val="2200CC"/>
+      </a:hlink>
+      <a:folHlink>
+        <a:srgbClr val="551A8B"/>
+      </a:folHlink>
+    </a:clrScheme>
+    <a:fontScheme name="Office">
+      <a:majorFont>
+        <a:latin typeface="Arial"/>
+        <a:ea typeface=""/>
+        <a:cs typeface=""/>
+        <a:font script="Jpan" typeface="ＭＳ Ｐゴシック"/>
+        <a:font script="Hang" typeface="맑은 고딕"/>
+        <a:font script="Hans" typeface="宋体"/>
+        <a:font script="Hant" typeface="新細明體"/>
+        <a:font script="Arab" typeface="Times New Roman"/>
+        <a:font script="Hebr" typeface="Times New Roman"/>
+        <a:font script="Thai" typeface="Angsana New"/>
+        <a:font script="Ethi" typeface="Nyala"/>
+        <a:font script="Beng" typeface="Vrinda"/>
+        <a:font script="Gujr" typeface="Shruti"/>
+        <a:font script="Khmr" typeface="MoolBoran"/>
+        <a:font script="Knda" typeface="Tunga"/>
+        <a:font script="Guru" typeface="Raavi"/>
+        <a:font script="Cans" typeface="Euphemia"/>
+        <a:font script="Cher" typeface="Plantagenet Cherokee"/>
+        <a:font script="Yiii" typeface="Microsoft Yi Baiti"/>
+        <a:font script="Tibt" typeface="Microsoft Himalaya"/>
+        <a:font script="Thaa" typeface="MV Boli"/>
+        <a:font script="Deva" typeface="Mangal"/>
+        <a:font script="Telu" typeface="Gautami"/>
+        <a:font script="Taml" typeface="Latha"/>
+        <a:font script="Syrc" typeface="Estrangelo Edessa"/>
+        <a:font script="Orya" typeface="Kalinga"/>
+        <a:font script="Mlym" typeface="Kartika"/>
+        <a:font script="Laoo" typeface="DokChampa"/>
+        <a:font script="Sinh" typeface="Iskoola Pota"/>
+        <a:font script="Mong" typeface="Mongolian Baiti"/>
+        <a:font script="Viet" typeface="Times New Roman"/>
+        <a:font script="Uigh" typeface="Microsoft Uighur"/>
+        <a:font script="Geor" typeface="Sylfaen"/>
+      </a:majorFont>
+      <a:minorFont>
+        <a:latin typeface="Arial"/>
+        <a:ea typeface=""/>
+        <a:cs typeface=""/>
+        <a:font script="Jpan" typeface="ＭＳ Ｐゴシック"/>
+        <a:font script="Hang" typeface="맑은 고딕"/>
+        <a:font script="Hans" typeface="宋体"/>
+        <a:font script="Hant" typeface="新細明體"/>
+        <a:font script="Arab" typeface="Arial"/>
+        <a:font script="Hebr" typeface="Arial"/>
+        <a:font script="Thai" typeface="Cordia New"/>
+        <a:font script="Ethi" typeface="Nyala"/>
+        <a:font script="Beng" typeface="Vrinda"/>
+        <a:font script="Gujr" typeface="Shruti"/>
+        <a:font script="Khmr" typeface="DaunPenh"/>
+        <a:font script="Knda" typeface="Tunga"/>
+        <a:font script="Guru" typeface="Raavi"/>
+        <a:font script="Cans" typeface="Euphemia"/>
+        <a:font script="Cher" typeface="Plantagenet Cherokee"/>
+        <a:font script="Yiii" typeface="Microsoft Yi Baiti"/>
+        <a:font script="Tibt" typeface="Microsoft Himalaya"/>
+        <a:font script="Thaa" typeface="MV Boli"/>
+        <a:font script="Deva" typeface="Mangal"/>
+        <a:font script="Telu" typeface="Gautami"/>
+        <a:font script="Taml" typeface="Latha"/>
+        <a:font script="Syrc" typeface="Estrangelo Edessa"/>
+        <a:font script="Orya" typeface="Kalinga"/>
+        <a:font script="Mlym" typeface="Kartika"/>
+        <a:font script="Laoo" typeface="DokChampa"/>
+        <a:font script="Sinh" typeface="Iskoola Pota"/>
+        <a:font script="Mong" typeface="Mongolian Baiti"/>
+        <a:font script="Viet" typeface="Arial"/>
+        <a:font script="Uigh" typeface="Microsoft Uighur"/>
+        <a:font script="Geor" typeface="Sylfaen"/>
+      </a:minorFont>
+    </a:fontScheme>
+    <a:fmtScheme name="Office">
+      <a:fillStyleLst>
+        <a:solidFill>
+          <a:schemeClr val="phClr"/>
+        </a:solidFill>
+        <a:gradFill rotWithShape="1">
+          <a:gsLst>
+            <a:gs pos="0">
+              <a:schemeClr val="phClr">
+                <a:tint val="50000"/>
+                <a:satMod val="300000"/>
+              </a:schemeClr>
+            </a:gs>
+            <a:gs pos="35000">
+              <a:schemeClr val="phClr">
+                <a:tint val="37000"/>
+                <a:satMod val="300000"/>
+              </a:schemeClr>
+            </a:gs>
+            <a:gs pos="100000">
+              <a:schemeClr val="phClr">
+                <a:tint val="15000"/>
+                <a:satMod val="350000"/>
+              </a:schemeClr>
+            </a:gs>
+          </a:gsLst>
+          <a:lin ang="16200000" scaled="1"/>
+        </a:gradFill>
+        <a:gradFill rotWithShape="1">
+          <a:gsLst>
+            <a:gs pos="0">
+              <a:schemeClr val="phClr">
+                <a:tint val="100000"/>
+                <a:shade val="100000"/>
+                <a:satMod val="130000"/>
+              </a:schemeClr>
+            </a:gs>
+            <a:gs pos="100000">
+              <a:schemeClr val="phClr">
+                <a:tint val="50000"/>
+                <a:shade val="100000"/>
+                <a:satMod val="350000"/>
+              </a:schemeClr>
+            </a:gs>
+          </a:gsLst>
+          <a:lin ang="16200000" scaled="0"/>
+        </a:gradFill>
+      </a:fillStyleLst>
+      <a:lnStyleLst>
+        <a:ln w="9525" cap="flat" cmpd="sng" algn="ctr">
+          <a:solidFill>
+            <a:schemeClr val="phClr">
+              <a:shade val="95000"/>
+              <a:satMod val="105000"/>
+            </a:schemeClr>
+          </a:solidFill>
+          <a:prstDash val="solid"/>
+        </a:ln>
+        <a:ln w="25400" cap="flat" cmpd="sng" algn="ctr">
+          <a:solidFill>
+            <a:schemeClr val="phClr"/>
+          </a:solidFill>
+          <a:prstDash val="solid"/>
+        </a:ln>
+        <a:ln w="38100" cap="flat" cmpd="sng" algn="ctr">
+          <a:solidFill>
+            <a:schemeClr val="phClr"/>
+          </a:solidFill>
+          <a:prstDash val="solid"/>
+        </a:ln>
+      </a:lnStyleLst>
+      <a:effectStyleLst>
+        <a:effectStyle>
+          <a:effectLst>
+            <a:outerShdw blurRad="40000" dist="20000" dir="5400000" rotWithShape="0">
+              <a:srgbClr val="000000">
+                <a:alpha val="38000"/>
+              </a:srgbClr>
+            </a:outerShdw>
+          </a:effectLst>
+        </a:effectStyle>
+        <a:effectStyle>
+          <a:effectLst>
+            <a:outerShdw blurRad="40000" dist="23000" dir="5400000" rotWithShape="0">
+              <a:srgbClr val="000000">
+                <a:alpha val="35000"/>
+              </a:srgbClr>
+            </a:outerShdw>
+          </a:effectLst>
+        </a:effectStyle>
+        <a:effectStyle>
+          <a:effectLst>
+            <a:outerShdw blurRad="40000" dist="23000" dir="5400000" rotWithShape="0">
+              <a:srgbClr val="000000">
+                <a:alpha val="35000"/>
+              </a:srgbClr>
+            </a:outerShdw>
+          </a:effectLst>
+          <a:scene3d>
+            <a:camera prst="orthographicFront">
+              <a:rot lat="0" lon="0" rev="0"/>
+            </a:camera>
+            <a:lightRig rig="threePt" dir="t">
+              <a:rot lat="0" lon="0" rev="1200000"/>
+            </a:lightRig>
+          </a:scene3d>
+          <a:sp3d>
+            <a:bevelT w="63500" h="25400"/>
+          </a:sp3d>
+        </a:effectStyle>
+      </a:effectStyleLst>
+      <a:bgFillStyleLst>
+        <a:solidFill>
+          <a:schemeClr val="phClr"/>
+        </a:solidFill>
+        <a:gradFill rotWithShape="1">
+          <a:gsLst>
+            <a:gs pos="0">
+              <a:schemeClr val="phClr">
+                <a:tint val="40000"/>
+                <a:satMod val="350000"/>
+              </a:schemeClr>
+            </a:gs>
+            <a:gs pos="40000">
+              <a:schemeClr val="phClr">
+                <a:tint val="45000"/>
+                <a:shade val="99000"/>
+                <a:satMod val="350000"/>
+              </a:schemeClr>
+            </a:gs>
+            <a:gs pos="100000">
+              <a:schemeClr val="phClr">
+                <a:shade val="20000"/>
+                <a:satMod val="255000"/>
+              </a:schemeClr>
+            </a:gs>
+          </a:gsLst>
+          <a:path path="circle">
+            <a:fillToRect l="50000" t="-80000" r="50000" b="180000"/>
+          </a:path>
+        </a:gradFill>
+        <a:gradFill rotWithShape="1">
+          <a:gsLst>
+            <a:gs pos="0">
+              <a:schemeClr val="phClr">
+                <a:tint val="80000"/>
+                <a:satMod val="300000"/>
+              </a:schemeClr>
+            </a:gs>
+            <a:gs pos="100000">
+              <a:schemeClr val="phClr">
+                <a:shade val="30000"/>
+                <a:satMod val="200000"/>
+              </a:schemeClr>
+            </a:gs>
+          </a:gsLst>
+          <a:path path="circle">
+            <a:fillToRect l="50000" t="50000" r="50000" b="50000"/>
+          </a:path>
+        </a:gradFill>
+      </a:bgFillStyleLst>
+    </a:fmtScheme>
+  </a:themeElements>
+</a:theme>
+</file>
+
+<file path=ppt/theme/theme2.xml><?xml version="1.0" encoding="utf-8"?>
 <a:theme xmlns:a="http://schemas.openxmlformats.org/drawingml/2006/main" xmlns:r="http://schemas.openxmlformats.org/officeDocument/2006/relationships" name="Tropic">
   <a:themeElements>
     <a:clrScheme name="Tropic">
@@ -29613,283 +29946,4 @@
     </a:fmtScheme>
   </a:themeElements>
 </a:theme>
-</file>
-
-<file path=ppt/theme/theme2.xml><?xml version="1.0" encoding="utf-8"?>
-<a:theme xmlns:a="http://schemas.openxmlformats.org/drawingml/2006/main" xmlns:r="http://schemas.openxmlformats.org/officeDocument/2006/relationships">
-  <a:themeElements>
-    <a:clrScheme name="Default">
-      <a:dk1>
-        <a:srgbClr val="000000"/>
-      </a:dk1>
-      <a:lt1>
-        <a:srgbClr val="FFFFFF"/>
-      </a:lt1>
-      <a:dk2>
-        <a:srgbClr val="158158"/>
-      </a:dk2>
-      <a:lt2>
-        <a:srgbClr val="F3F3F3"/>
-      </a:lt2>
-      <a:accent1>
-        <a:srgbClr val="058DC7"/>
-      </a:accent1>
-      <a:accent2>
-        <a:srgbClr val="50B432"/>
-      </a:accent2>
-      <a:accent3>
-        <a:srgbClr val="ED561B"/>
-      </a:accent3>
-      <a:accent4>
-        <a:srgbClr val="EDEF00"/>
-      </a:accent4>
-      <a:accent5>
-        <a:srgbClr val="24CBE5"/>
-      </a:accent5>
-      <a:accent6>
-        <a:srgbClr val="64E572"/>
-      </a:accent6>
-      <a:hlink>
-        <a:srgbClr val="2200CC"/>
-      </a:hlink>
-      <a:folHlink>
-        <a:srgbClr val="551A8B"/>
-      </a:folHlink>
-    </a:clrScheme>
-    <a:fontScheme name="Office">
-      <a:majorFont>
-        <a:latin typeface="Arial"/>
-        <a:ea typeface=""/>
-        <a:cs typeface=""/>
-        <a:font script="Jpan" typeface="ＭＳ Ｐゴシック"/>
-        <a:font script="Hang" typeface="맑은 고딕"/>
-        <a:font script="Hans" typeface="宋体"/>
-        <a:font script="Hant" typeface="新細明體"/>
-        <a:font script="Arab" typeface="Times New Roman"/>
-        <a:font script="Hebr" typeface="Times New Roman"/>
-        <a:font script="Thai" typeface="Angsana New"/>
-        <a:font script="Ethi" typeface="Nyala"/>
-        <a:font script="Beng" typeface="Vrinda"/>
-        <a:font script="Gujr" typeface="Shruti"/>
-        <a:font script="Khmr" typeface="MoolBoran"/>
-        <a:font script="Knda" typeface="Tunga"/>
-        <a:font script="Guru" typeface="Raavi"/>
-        <a:font script="Cans" typeface="Euphemia"/>
-        <a:font script="Cher" typeface="Plantagenet Cherokee"/>
-        <a:font script="Yiii" typeface="Microsoft Yi Baiti"/>
-        <a:font script="Tibt" typeface="Microsoft Himalaya"/>
-        <a:font script="Thaa" typeface="MV Boli"/>
-        <a:font script="Deva" typeface="Mangal"/>
-        <a:font script="Telu" typeface="Gautami"/>
-        <a:font script="Taml" typeface="Latha"/>
-        <a:font script="Syrc" typeface="Estrangelo Edessa"/>
-        <a:font script="Orya" typeface="Kalinga"/>
-        <a:font script="Mlym" typeface="Kartika"/>
-        <a:font script="Laoo" typeface="DokChampa"/>
-        <a:font script="Sinh" typeface="Iskoola Pota"/>
-        <a:font script="Mong" typeface="Mongolian Baiti"/>
-        <a:font script="Viet" typeface="Times New Roman"/>
-        <a:font script="Uigh" typeface="Microsoft Uighur"/>
-        <a:font script="Geor" typeface="Sylfaen"/>
-      </a:majorFont>
-      <a:minorFont>
-        <a:latin typeface="Arial"/>
-        <a:ea typeface=""/>
-        <a:cs typeface=""/>
-        <a:font script="Jpan" typeface="ＭＳ Ｐゴシック"/>
-        <a:font script="Hang" typeface="맑은 고딕"/>
-        <a:font script="Hans" typeface="宋体"/>
-        <a:font script="Hant" typeface="新細明體"/>
-        <a:font script="Arab" typeface="Arial"/>
-        <a:font script="Hebr" typeface="Arial"/>
-        <a:font script="Thai" typeface="Cordia New"/>
-        <a:font script="Ethi" typeface="Nyala"/>
-        <a:font script="Beng" typeface="Vrinda"/>
-        <a:font script="Gujr" typeface="Shruti"/>
-        <a:font script="Khmr" typeface="DaunPenh"/>
-        <a:font script="Knda" typeface="Tunga"/>
-        <a:font script="Guru" typeface="Raavi"/>
-        <a:font script="Cans" typeface="Euphemia"/>
-        <a:font script="Cher" typeface="Plantagenet Cherokee"/>
-        <a:font script="Yiii" typeface="Microsoft Yi Baiti"/>
-        <a:font script="Tibt" typeface="Microsoft Himalaya"/>
-        <a:font script="Thaa" typeface="MV Boli"/>
-        <a:font script="Deva" typeface="Mangal"/>
-        <a:font script="Telu" typeface="Gautami"/>
-        <a:font script="Taml" typeface="Latha"/>
-        <a:font script="Syrc" typeface="Estrangelo Edessa"/>
-        <a:font script="Orya" typeface="Kalinga"/>
-        <a:font script="Mlym" typeface="Kartika"/>
-        <a:font script="Laoo" typeface="DokChampa"/>
-        <a:font script="Sinh" typeface="Iskoola Pota"/>
-        <a:font script="Mong" typeface="Mongolian Baiti"/>
-        <a:font script="Viet" typeface="Arial"/>
-        <a:font script="Uigh" typeface="Microsoft Uighur"/>
-        <a:font script="Geor" typeface="Sylfaen"/>
-      </a:minorFont>
-    </a:fontScheme>
-    <a:fmtScheme name="Office">
-      <a:fillStyleLst>
-        <a:solidFill>
-          <a:schemeClr val="phClr"/>
-        </a:solidFill>
-        <a:gradFill rotWithShape="1">
-          <a:gsLst>
-            <a:gs pos="0">
-              <a:schemeClr val="phClr">
-                <a:tint val="50000"/>
-                <a:satMod val="300000"/>
-              </a:schemeClr>
-            </a:gs>
-            <a:gs pos="35000">
-              <a:schemeClr val="phClr">
-                <a:tint val="37000"/>
-                <a:satMod val="300000"/>
-              </a:schemeClr>
-            </a:gs>
-            <a:gs pos="100000">
-              <a:schemeClr val="phClr">
-                <a:tint val="15000"/>
-                <a:satMod val="350000"/>
-              </a:schemeClr>
-            </a:gs>
-          </a:gsLst>
-          <a:lin ang="16200000" scaled="1"/>
-        </a:gradFill>
-        <a:gradFill rotWithShape="1">
-          <a:gsLst>
-            <a:gs pos="0">
-              <a:schemeClr val="phClr">
-                <a:tint val="100000"/>
-                <a:shade val="100000"/>
-                <a:satMod val="130000"/>
-              </a:schemeClr>
-            </a:gs>
-            <a:gs pos="100000">
-              <a:schemeClr val="phClr">
-                <a:tint val="50000"/>
-                <a:shade val="100000"/>
-                <a:satMod val="350000"/>
-              </a:schemeClr>
-            </a:gs>
-          </a:gsLst>
-          <a:lin ang="16200000" scaled="0"/>
-        </a:gradFill>
-      </a:fillStyleLst>
-      <a:lnStyleLst>
-        <a:ln w="9525" cap="flat" cmpd="sng" algn="ctr">
-          <a:solidFill>
-            <a:schemeClr val="phClr">
-              <a:shade val="95000"/>
-              <a:satMod val="105000"/>
-            </a:schemeClr>
-          </a:solidFill>
-          <a:prstDash val="solid"/>
-        </a:ln>
-        <a:ln w="25400" cap="flat" cmpd="sng" algn="ctr">
-          <a:solidFill>
-            <a:schemeClr val="phClr"/>
-          </a:solidFill>
-          <a:prstDash val="solid"/>
-        </a:ln>
-        <a:ln w="38100" cap="flat" cmpd="sng" algn="ctr">
-          <a:solidFill>
-            <a:schemeClr val="phClr"/>
-          </a:solidFill>
-          <a:prstDash val="solid"/>
-        </a:ln>
-      </a:lnStyleLst>
-      <a:effectStyleLst>
-        <a:effectStyle>
-          <a:effectLst>
-            <a:outerShdw blurRad="40000" dist="20000" dir="5400000" rotWithShape="0">
-              <a:srgbClr val="000000">
-                <a:alpha val="38000"/>
-              </a:srgbClr>
-            </a:outerShdw>
-          </a:effectLst>
-        </a:effectStyle>
-        <a:effectStyle>
-          <a:effectLst>
-            <a:outerShdw blurRad="40000" dist="23000" dir="5400000" rotWithShape="0">
-              <a:srgbClr val="000000">
-                <a:alpha val="35000"/>
-              </a:srgbClr>
-            </a:outerShdw>
-          </a:effectLst>
-        </a:effectStyle>
-        <a:effectStyle>
-          <a:effectLst>
-            <a:outerShdw blurRad="40000" dist="23000" dir="5400000" rotWithShape="0">
-              <a:srgbClr val="000000">
-                <a:alpha val="35000"/>
-              </a:srgbClr>
-            </a:outerShdw>
-          </a:effectLst>
-          <a:scene3d>
-            <a:camera prst="orthographicFront">
-              <a:rot lat="0" lon="0" rev="0"/>
-            </a:camera>
-            <a:lightRig rig="threePt" dir="t">
-              <a:rot lat="0" lon="0" rev="1200000"/>
-            </a:lightRig>
-          </a:scene3d>
-          <a:sp3d>
-            <a:bevelT w="63500" h="25400"/>
-          </a:sp3d>
-        </a:effectStyle>
-      </a:effectStyleLst>
-      <a:bgFillStyleLst>
-        <a:solidFill>
-          <a:schemeClr val="phClr"/>
-        </a:solidFill>
-        <a:gradFill rotWithShape="1">
-          <a:gsLst>
-            <a:gs pos="0">
-              <a:schemeClr val="phClr">
-                <a:tint val="40000"/>
-                <a:satMod val="350000"/>
-              </a:schemeClr>
-            </a:gs>
-            <a:gs pos="40000">
-              <a:schemeClr val="phClr">
-                <a:tint val="45000"/>
-                <a:shade val="99000"/>
-                <a:satMod val="350000"/>
-              </a:schemeClr>
-            </a:gs>
-            <a:gs pos="100000">
-              <a:schemeClr val="phClr">
-                <a:shade val="20000"/>
-                <a:satMod val="255000"/>
-              </a:schemeClr>
-            </a:gs>
-          </a:gsLst>
-          <a:path path="circle">
-            <a:fillToRect l="50000" t="-80000" r="50000" b="180000"/>
-          </a:path>
-        </a:gradFill>
-        <a:gradFill rotWithShape="1">
-          <a:gsLst>
-            <a:gs pos="0">
-              <a:schemeClr val="phClr">
-                <a:tint val="80000"/>
-                <a:satMod val="300000"/>
-              </a:schemeClr>
-            </a:gs>
-            <a:gs pos="100000">
-              <a:schemeClr val="phClr">
-                <a:shade val="30000"/>
-                <a:satMod val="200000"/>
-              </a:schemeClr>
-            </a:gs>
-          </a:gsLst>
-          <a:path path="circle">
-            <a:fillToRect l="50000" t="50000" r="50000" b="50000"/>
-          </a:path>
-        </a:gradFill>
-      </a:bgFillStyleLst>
-    </a:fmtScheme>
-  </a:themeElements>
-</a:theme>
 </file>
</xml_diff>

<commit_message>
Adds Questions and answers for 31,32,33
</commit_message>
<xml_diff>
--- a/ISTQB Foundation Level Preparation.pptx
+++ b/ISTQB Foundation Level Preparation.pptx
@@ -82,21 +82,28 @@
     <p:sldId id="327" r:id="rId78"/>
     <p:sldId id="328" r:id="rId79"/>
     <p:sldId id="329" r:id="rId80"/>
+    <p:sldId id="330" r:id="rId81"/>
+    <p:sldId id="331" r:id="rId82"/>
+    <p:sldId id="332" r:id="rId83"/>
+    <p:sldId id="333" r:id="rId84"/>
+    <p:sldId id="334" r:id="rId85"/>
+    <p:sldId id="335" r:id="rId86"/>
+    <p:sldId id="336" r:id="rId87"/>
   </p:sldIdLst>
   <p:sldSz cy="5143500" cx="9144000"/>
   <p:notesSz cx="6858000" cy="9144000"/>
   <p:embeddedFontLst>
     <p:embeddedFont>
       <p:font typeface="PT Sans Narrow"/>
-      <p:regular r:id="rId81"/>
-      <p:bold r:id="rId82"/>
+      <p:regular r:id="rId88"/>
+      <p:bold r:id="rId89"/>
     </p:embeddedFont>
     <p:embeddedFont>
       <p:font typeface="Open Sans"/>
-      <p:regular r:id="rId83"/>
-      <p:bold r:id="rId84"/>
-      <p:italic r:id="rId85"/>
-      <p:boldItalic r:id="rId86"/>
+      <p:regular r:id="rId90"/>
+      <p:bold r:id="rId91"/>
+      <p:italic r:id="rId92"/>
+      <p:boldItalic r:id="rId93"/>
     </p:embeddedFont>
   </p:embeddedFontLst>
   <p:defaultTextStyle>
@@ -7901,12 +7908,12 @@
 </p:notes>
 </file>
 
-<file path=ppt/notesSlides/notesSlide8.xml><?xml version="1.0" encoding="utf-8"?>
+<file path=ppt/notesSlides/notesSlide75.xml><?xml version="1.0" encoding="utf-8"?>
 <p:notes xmlns:a="http://schemas.openxmlformats.org/drawingml/2006/main" xmlns:r="http://schemas.openxmlformats.org/officeDocument/2006/relationships" xmlns:mc="http://schemas.openxmlformats.org/markup-compatibility/2006" xmlns:mv="urn:schemas-microsoft-com:mac:vml" xmlns:p="http://schemas.openxmlformats.org/presentationml/2006/main" xmlns:c="http://schemas.openxmlformats.org/drawingml/2006/chart" xmlns:dgm="http://schemas.openxmlformats.org/drawingml/2006/diagram" xmlns:o="urn:schemas-microsoft-com:office:office" xmlns:v="urn:schemas-microsoft-com:vml" xmlns:pvml="urn:schemas-microsoft-com:office:powerpoint" xmlns:com="http://schemas.openxmlformats.org/drawingml/2006/compatibility" xmlns:p14="http://schemas.microsoft.com/office/powerpoint/2010/main" xmlns:p15="http://schemas.microsoft.com/office/powerpoint/2012/main" xmlns:ahyp="http://schemas.microsoft.com/office/drawing/2018/hyperlinkcolor" showMasterPhAnim="0" showMasterSp="0">
   <p:cSld>
     <p:spTree>
       <p:nvGrpSpPr>
-        <p:cNvPr id="104" name="Shape 104"/>
+        <p:cNvPr id="492" name="Shape 492"/>
         <p:cNvGrpSpPr/>
         <p:nvPr/>
       </p:nvGrpSpPr>
@@ -7920,7 +7927,7 @@
       </p:grpSpPr>
       <p:sp>
         <p:nvSpPr>
-          <p:cNvPr id="105" name="Google Shape;105;g29a4c6b8399_0_1319:notes"/>
+          <p:cNvPr id="493" name="Google Shape;493;g2f1e1d5e8dd_1_55:notes"/>
           <p:cNvSpPr/>
           <p:nvPr>
             <p:ph idx="2" type="sldImg"/>
@@ -7955,7 +7962,700 @@
       </p:sp>
       <p:sp>
         <p:nvSpPr>
+          <p:cNvPr id="494" name="Google Shape;494;g2f1e1d5e8dd_1_55:notes"/>
+          <p:cNvSpPr txBox="1"/>
+          <p:nvPr>
+            <p:ph idx="1" type="body"/>
+          </p:nvPr>
+        </p:nvSpPr>
+        <p:spPr>
+          <a:xfrm>
+            <a:off x="685800" y="4343400"/>
+            <a:ext cx="5486400" cy="4114800"/>
+          </a:xfrm>
+          <a:prstGeom prst="rect">
+            <a:avLst/>
+          </a:prstGeom>
+        </p:spPr>
+        <p:txBody>
+          <a:bodyPr anchorCtr="0" anchor="t" bIns="91425" lIns="91425" spcFirstLastPara="1" rIns="91425" wrap="square" tIns="91425">
+            <a:noAutofit/>
+          </a:bodyPr>
+          <a:lstStyle/>
+          <a:p>
+            <a:pPr indent="0" lvl="0" marL="0" rtl="0" algn="l">
+              <a:spcBef>
+                <a:spcPts val="0"/>
+              </a:spcBef>
+              <a:spcAft>
+                <a:spcPts val="0"/>
+              </a:spcAft>
+              <a:buNone/>
+            </a:pPr>
+            <a:r>
+              <a:t/>
+            </a:r>
+            <a:endParaRPr/>
+          </a:p>
+        </p:txBody>
+      </p:sp>
+    </p:spTree>
+  </p:cSld>
+  <p:clrMapOvr>
+    <a:masterClrMapping/>
+  </p:clrMapOvr>
+</p:notes>
+</file>
+
+<file path=ppt/notesSlides/notesSlide76.xml><?xml version="1.0" encoding="utf-8"?>
+<p:notes xmlns:a="http://schemas.openxmlformats.org/drawingml/2006/main" xmlns:r="http://schemas.openxmlformats.org/officeDocument/2006/relationships" xmlns:mc="http://schemas.openxmlformats.org/markup-compatibility/2006" xmlns:mv="urn:schemas-microsoft-com:mac:vml" xmlns:p="http://schemas.openxmlformats.org/presentationml/2006/main" xmlns:c="http://schemas.openxmlformats.org/drawingml/2006/chart" xmlns:dgm="http://schemas.openxmlformats.org/drawingml/2006/diagram" xmlns:o="urn:schemas-microsoft-com:office:office" xmlns:v="urn:schemas-microsoft-com:vml" xmlns:pvml="urn:schemas-microsoft-com:office:powerpoint" xmlns:com="http://schemas.openxmlformats.org/drawingml/2006/compatibility" xmlns:p14="http://schemas.microsoft.com/office/powerpoint/2010/main" xmlns:p15="http://schemas.microsoft.com/office/powerpoint/2012/main" xmlns:ahyp="http://schemas.microsoft.com/office/drawing/2018/hyperlinkcolor" showMasterPhAnim="0" showMasterSp="0">
+  <p:cSld>
+    <p:spTree>
+      <p:nvGrpSpPr>
+        <p:cNvPr id="498" name="Shape 498"/>
+        <p:cNvGrpSpPr/>
+        <p:nvPr/>
+      </p:nvGrpSpPr>
+      <p:grpSpPr>
+        <a:xfrm>
+          <a:off x="0" y="0"/>
+          <a:ext cx="0" cy="0"/>
+          <a:chOff x="0" y="0"/>
+          <a:chExt cx="0" cy="0"/>
+        </a:xfrm>
+      </p:grpSpPr>
+      <p:sp>
+        <p:nvSpPr>
+          <p:cNvPr id="499" name="Google Shape;499;g2f1e1d5e8dd_1_61:notes"/>
+          <p:cNvSpPr/>
+          <p:nvPr>
+            <p:ph idx="2" type="sldImg"/>
+          </p:nvPr>
+        </p:nvSpPr>
+        <p:spPr>
+          <a:xfrm>
+            <a:off x="381300" y="685800"/>
+            <a:ext cx="6096000" cy="3429000"/>
+          </a:xfrm>
+          <a:custGeom>
+            <a:rect b="b" l="l" r="r" t="t"/>
+            <a:pathLst>
+              <a:path extrusionOk="0" h="120000" w="120000">
+                <a:moveTo>
+                  <a:pt x="0" y="0"/>
+                </a:moveTo>
+                <a:lnTo>
+                  <a:pt x="120000" y="0"/>
+                </a:lnTo>
+                <a:lnTo>
+                  <a:pt x="120000" y="120000"/>
+                </a:lnTo>
+                <a:lnTo>
+                  <a:pt x="0" y="120000"/>
+                </a:lnTo>
+                <a:close/>
+              </a:path>
+            </a:pathLst>
+          </a:custGeom>
+        </p:spPr>
+      </p:sp>
+      <p:sp>
+        <p:nvSpPr>
+          <p:cNvPr id="500" name="Google Shape;500;g2f1e1d5e8dd_1_61:notes"/>
+          <p:cNvSpPr txBox="1"/>
+          <p:nvPr>
+            <p:ph idx="1" type="body"/>
+          </p:nvPr>
+        </p:nvSpPr>
+        <p:spPr>
+          <a:xfrm>
+            <a:off x="685800" y="4343400"/>
+            <a:ext cx="5486400" cy="4114800"/>
+          </a:xfrm>
+          <a:prstGeom prst="rect">
+            <a:avLst/>
+          </a:prstGeom>
+        </p:spPr>
+        <p:txBody>
+          <a:bodyPr anchorCtr="0" anchor="t" bIns="91425" lIns="91425" spcFirstLastPara="1" rIns="91425" wrap="square" tIns="91425">
+            <a:noAutofit/>
+          </a:bodyPr>
+          <a:lstStyle/>
+          <a:p>
+            <a:pPr indent="0" lvl="0" marL="0" rtl="0" algn="l">
+              <a:spcBef>
+                <a:spcPts val="0"/>
+              </a:spcBef>
+              <a:spcAft>
+                <a:spcPts val="0"/>
+              </a:spcAft>
+              <a:buNone/>
+            </a:pPr>
+            <a:r>
+              <a:t/>
+            </a:r>
+            <a:endParaRPr/>
+          </a:p>
+        </p:txBody>
+      </p:sp>
+    </p:spTree>
+  </p:cSld>
+  <p:clrMapOvr>
+    <a:masterClrMapping/>
+  </p:clrMapOvr>
+</p:notes>
+</file>
+
+<file path=ppt/notesSlides/notesSlide77.xml><?xml version="1.0" encoding="utf-8"?>
+<p:notes xmlns:a="http://schemas.openxmlformats.org/drawingml/2006/main" xmlns:r="http://schemas.openxmlformats.org/officeDocument/2006/relationships" xmlns:mc="http://schemas.openxmlformats.org/markup-compatibility/2006" xmlns:mv="urn:schemas-microsoft-com:mac:vml" xmlns:p="http://schemas.openxmlformats.org/presentationml/2006/main" xmlns:c="http://schemas.openxmlformats.org/drawingml/2006/chart" xmlns:dgm="http://schemas.openxmlformats.org/drawingml/2006/diagram" xmlns:o="urn:schemas-microsoft-com:office:office" xmlns:v="urn:schemas-microsoft-com:vml" xmlns:pvml="urn:schemas-microsoft-com:office:powerpoint" xmlns:com="http://schemas.openxmlformats.org/drawingml/2006/compatibility" xmlns:p14="http://schemas.microsoft.com/office/powerpoint/2010/main" xmlns:p15="http://schemas.microsoft.com/office/powerpoint/2012/main" xmlns:ahyp="http://schemas.microsoft.com/office/drawing/2018/hyperlinkcolor" showMasterPhAnim="0" showMasterSp="0">
+  <p:cSld>
+    <p:spTree>
+      <p:nvGrpSpPr>
+        <p:cNvPr id="503" name="Shape 503"/>
+        <p:cNvGrpSpPr/>
+        <p:nvPr/>
+      </p:nvGrpSpPr>
+      <p:grpSpPr>
+        <a:xfrm>
+          <a:off x="0" y="0"/>
+          <a:ext cx="0" cy="0"/>
+          <a:chOff x="0" y="0"/>
+          <a:chExt cx="0" cy="0"/>
+        </a:xfrm>
+      </p:grpSpPr>
+      <p:sp>
+        <p:nvSpPr>
+          <p:cNvPr id="504" name="Google Shape;504;g2f1e1d5e8dd_1_67:notes"/>
+          <p:cNvSpPr/>
+          <p:nvPr>
+            <p:ph idx="2" type="sldImg"/>
+          </p:nvPr>
+        </p:nvSpPr>
+        <p:spPr>
+          <a:xfrm>
+            <a:off x="381300" y="685800"/>
+            <a:ext cx="6096000" cy="3429000"/>
+          </a:xfrm>
+          <a:custGeom>
+            <a:rect b="b" l="l" r="r" t="t"/>
+            <a:pathLst>
+              <a:path extrusionOk="0" h="120000" w="120000">
+                <a:moveTo>
+                  <a:pt x="0" y="0"/>
+                </a:moveTo>
+                <a:lnTo>
+                  <a:pt x="120000" y="0"/>
+                </a:lnTo>
+                <a:lnTo>
+                  <a:pt x="120000" y="120000"/>
+                </a:lnTo>
+                <a:lnTo>
+                  <a:pt x="0" y="120000"/>
+                </a:lnTo>
+                <a:close/>
+              </a:path>
+            </a:pathLst>
+          </a:custGeom>
+        </p:spPr>
+      </p:sp>
+      <p:sp>
+        <p:nvSpPr>
+          <p:cNvPr id="505" name="Google Shape;505;g2f1e1d5e8dd_1_67:notes"/>
+          <p:cNvSpPr txBox="1"/>
+          <p:nvPr>
+            <p:ph idx="1" type="body"/>
+          </p:nvPr>
+        </p:nvSpPr>
+        <p:spPr>
+          <a:xfrm>
+            <a:off x="685800" y="4343400"/>
+            <a:ext cx="5486400" cy="4114800"/>
+          </a:xfrm>
+          <a:prstGeom prst="rect">
+            <a:avLst/>
+          </a:prstGeom>
+        </p:spPr>
+        <p:txBody>
+          <a:bodyPr anchorCtr="0" anchor="t" bIns="91425" lIns="91425" spcFirstLastPara="1" rIns="91425" wrap="square" tIns="91425">
+            <a:noAutofit/>
+          </a:bodyPr>
+          <a:lstStyle/>
+          <a:p>
+            <a:pPr indent="0" lvl="0" marL="0" rtl="0" algn="l">
+              <a:spcBef>
+                <a:spcPts val="0"/>
+              </a:spcBef>
+              <a:spcAft>
+                <a:spcPts val="0"/>
+              </a:spcAft>
+              <a:buNone/>
+            </a:pPr>
+            <a:r>
+              <a:t/>
+            </a:r>
+            <a:endParaRPr/>
+          </a:p>
+        </p:txBody>
+      </p:sp>
+    </p:spTree>
+  </p:cSld>
+  <p:clrMapOvr>
+    <a:masterClrMapping/>
+  </p:clrMapOvr>
+</p:notes>
+</file>
+
+<file path=ppt/notesSlides/notesSlide78.xml><?xml version="1.0" encoding="utf-8"?>
+<p:notes xmlns:a="http://schemas.openxmlformats.org/drawingml/2006/main" xmlns:r="http://schemas.openxmlformats.org/officeDocument/2006/relationships" xmlns:mc="http://schemas.openxmlformats.org/markup-compatibility/2006" xmlns:mv="urn:schemas-microsoft-com:mac:vml" xmlns:p="http://schemas.openxmlformats.org/presentationml/2006/main" xmlns:c="http://schemas.openxmlformats.org/drawingml/2006/chart" xmlns:dgm="http://schemas.openxmlformats.org/drawingml/2006/diagram" xmlns:o="urn:schemas-microsoft-com:office:office" xmlns:v="urn:schemas-microsoft-com:vml" xmlns:pvml="urn:schemas-microsoft-com:office:powerpoint" xmlns:com="http://schemas.openxmlformats.org/drawingml/2006/compatibility" xmlns:p14="http://schemas.microsoft.com/office/powerpoint/2010/main" xmlns:p15="http://schemas.microsoft.com/office/powerpoint/2012/main" xmlns:ahyp="http://schemas.microsoft.com/office/drawing/2018/hyperlinkcolor" showMasterPhAnim="0" showMasterSp="0">
+  <p:cSld>
+    <p:spTree>
+      <p:nvGrpSpPr>
+        <p:cNvPr id="509" name="Shape 509"/>
+        <p:cNvGrpSpPr/>
+        <p:nvPr/>
+      </p:nvGrpSpPr>
+      <p:grpSpPr>
+        <a:xfrm>
+          <a:off x="0" y="0"/>
+          <a:ext cx="0" cy="0"/>
+          <a:chOff x="0" y="0"/>
+          <a:chExt cx="0" cy="0"/>
+        </a:xfrm>
+      </p:grpSpPr>
+      <p:sp>
+        <p:nvSpPr>
+          <p:cNvPr id="510" name="Google Shape;510;g2f1e1d5e8dd_1_90:notes"/>
+          <p:cNvSpPr/>
+          <p:nvPr>
+            <p:ph idx="2" type="sldImg"/>
+          </p:nvPr>
+        </p:nvSpPr>
+        <p:spPr>
+          <a:xfrm>
+            <a:off x="381300" y="685800"/>
+            <a:ext cx="6096000" cy="3429000"/>
+          </a:xfrm>
+          <a:custGeom>
+            <a:rect b="b" l="l" r="r" t="t"/>
+            <a:pathLst>
+              <a:path extrusionOk="0" h="120000" w="120000">
+                <a:moveTo>
+                  <a:pt x="0" y="0"/>
+                </a:moveTo>
+                <a:lnTo>
+                  <a:pt x="120000" y="0"/>
+                </a:lnTo>
+                <a:lnTo>
+                  <a:pt x="120000" y="120000"/>
+                </a:lnTo>
+                <a:lnTo>
+                  <a:pt x="0" y="120000"/>
+                </a:lnTo>
+                <a:close/>
+              </a:path>
+            </a:pathLst>
+          </a:custGeom>
+        </p:spPr>
+      </p:sp>
+      <p:sp>
+        <p:nvSpPr>
+          <p:cNvPr id="511" name="Google Shape;511;g2f1e1d5e8dd_1_90:notes"/>
+          <p:cNvSpPr txBox="1"/>
+          <p:nvPr>
+            <p:ph idx="1" type="body"/>
+          </p:nvPr>
+        </p:nvSpPr>
+        <p:spPr>
+          <a:xfrm>
+            <a:off x="685800" y="4343400"/>
+            <a:ext cx="5486400" cy="4114800"/>
+          </a:xfrm>
+          <a:prstGeom prst="rect">
+            <a:avLst/>
+          </a:prstGeom>
+        </p:spPr>
+        <p:txBody>
+          <a:bodyPr anchorCtr="0" anchor="t" bIns="91425" lIns="91425" spcFirstLastPara="1" rIns="91425" wrap="square" tIns="91425">
+            <a:noAutofit/>
+          </a:bodyPr>
+          <a:lstStyle/>
+          <a:p>
+            <a:pPr indent="0" lvl="0" marL="0" rtl="0" algn="l">
+              <a:spcBef>
+                <a:spcPts val="0"/>
+              </a:spcBef>
+              <a:spcAft>
+                <a:spcPts val="0"/>
+              </a:spcAft>
+              <a:buNone/>
+            </a:pPr>
+            <a:r>
+              <a:t/>
+            </a:r>
+            <a:endParaRPr/>
+          </a:p>
+        </p:txBody>
+      </p:sp>
+    </p:spTree>
+  </p:cSld>
+  <p:clrMapOvr>
+    <a:masterClrMapping/>
+  </p:clrMapOvr>
+</p:notes>
+</file>
+
+<file path=ppt/notesSlides/notesSlide79.xml><?xml version="1.0" encoding="utf-8"?>
+<p:notes xmlns:a="http://schemas.openxmlformats.org/drawingml/2006/main" xmlns:r="http://schemas.openxmlformats.org/officeDocument/2006/relationships" xmlns:mc="http://schemas.openxmlformats.org/markup-compatibility/2006" xmlns:mv="urn:schemas-microsoft-com:mac:vml" xmlns:p="http://schemas.openxmlformats.org/presentationml/2006/main" xmlns:c="http://schemas.openxmlformats.org/drawingml/2006/chart" xmlns:dgm="http://schemas.openxmlformats.org/drawingml/2006/diagram" xmlns:o="urn:schemas-microsoft-com:office:office" xmlns:v="urn:schemas-microsoft-com:vml" xmlns:pvml="urn:schemas-microsoft-com:office:powerpoint" xmlns:com="http://schemas.openxmlformats.org/drawingml/2006/compatibility" xmlns:p14="http://schemas.microsoft.com/office/powerpoint/2010/main" xmlns:p15="http://schemas.microsoft.com/office/powerpoint/2012/main" xmlns:ahyp="http://schemas.microsoft.com/office/drawing/2018/hyperlinkcolor" showMasterPhAnim="0" showMasterSp="0">
+  <p:cSld>
+    <p:spTree>
+      <p:nvGrpSpPr>
+        <p:cNvPr id="514" name="Shape 514"/>
+        <p:cNvGrpSpPr/>
+        <p:nvPr/>
+      </p:nvGrpSpPr>
+      <p:grpSpPr>
+        <a:xfrm>
+          <a:off x="0" y="0"/>
+          <a:ext cx="0" cy="0"/>
+          <a:chOff x="0" y="0"/>
+          <a:chExt cx="0" cy="0"/>
+        </a:xfrm>
+      </p:grpSpPr>
+      <p:sp>
+        <p:nvSpPr>
+          <p:cNvPr id="515" name="Google Shape;515;g2f1e1d5e8dd_1_73:notes"/>
+          <p:cNvSpPr/>
+          <p:nvPr>
+            <p:ph idx="2" type="sldImg"/>
+          </p:nvPr>
+        </p:nvSpPr>
+        <p:spPr>
+          <a:xfrm>
+            <a:off x="381300" y="685800"/>
+            <a:ext cx="6096000" cy="3429000"/>
+          </a:xfrm>
+          <a:custGeom>
+            <a:rect b="b" l="l" r="r" t="t"/>
+            <a:pathLst>
+              <a:path extrusionOk="0" h="120000" w="120000">
+                <a:moveTo>
+                  <a:pt x="0" y="0"/>
+                </a:moveTo>
+                <a:lnTo>
+                  <a:pt x="120000" y="0"/>
+                </a:lnTo>
+                <a:lnTo>
+                  <a:pt x="120000" y="120000"/>
+                </a:lnTo>
+                <a:lnTo>
+                  <a:pt x="0" y="120000"/>
+                </a:lnTo>
+                <a:close/>
+              </a:path>
+            </a:pathLst>
+          </a:custGeom>
+        </p:spPr>
+      </p:sp>
+      <p:sp>
+        <p:nvSpPr>
+          <p:cNvPr id="516" name="Google Shape;516;g2f1e1d5e8dd_1_73:notes"/>
+          <p:cNvSpPr txBox="1"/>
+          <p:nvPr>
+            <p:ph idx="1" type="body"/>
+          </p:nvPr>
+        </p:nvSpPr>
+        <p:spPr>
+          <a:xfrm>
+            <a:off x="685800" y="4343400"/>
+            <a:ext cx="5486400" cy="4114800"/>
+          </a:xfrm>
+          <a:prstGeom prst="rect">
+            <a:avLst/>
+          </a:prstGeom>
+        </p:spPr>
+        <p:txBody>
+          <a:bodyPr anchorCtr="0" anchor="t" bIns="91425" lIns="91425" spcFirstLastPara="1" rIns="91425" wrap="square" tIns="91425">
+            <a:noAutofit/>
+          </a:bodyPr>
+          <a:lstStyle/>
+          <a:p>
+            <a:pPr indent="0" lvl="0" marL="0" rtl="0" algn="l">
+              <a:spcBef>
+                <a:spcPts val="0"/>
+              </a:spcBef>
+              <a:spcAft>
+                <a:spcPts val="0"/>
+              </a:spcAft>
+              <a:buNone/>
+            </a:pPr>
+            <a:r>
+              <a:t/>
+            </a:r>
+            <a:endParaRPr/>
+          </a:p>
+        </p:txBody>
+      </p:sp>
+    </p:spTree>
+  </p:cSld>
+  <p:clrMapOvr>
+    <a:masterClrMapping/>
+  </p:clrMapOvr>
+</p:notes>
+</file>
+
+<file path=ppt/notesSlides/notesSlide8.xml><?xml version="1.0" encoding="utf-8"?>
+<p:notes xmlns:a="http://schemas.openxmlformats.org/drawingml/2006/main" xmlns:r="http://schemas.openxmlformats.org/officeDocument/2006/relationships" xmlns:mc="http://schemas.openxmlformats.org/markup-compatibility/2006" xmlns:mv="urn:schemas-microsoft-com:mac:vml" xmlns:p="http://schemas.openxmlformats.org/presentationml/2006/main" xmlns:c="http://schemas.openxmlformats.org/drawingml/2006/chart" xmlns:dgm="http://schemas.openxmlformats.org/drawingml/2006/diagram" xmlns:o="urn:schemas-microsoft-com:office:office" xmlns:v="urn:schemas-microsoft-com:vml" xmlns:pvml="urn:schemas-microsoft-com:office:powerpoint" xmlns:com="http://schemas.openxmlformats.org/drawingml/2006/compatibility" xmlns:p14="http://schemas.microsoft.com/office/powerpoint/2010/main" xmlns:p15="http://schemas.microsoft.com/office/powerpoint/2012/main" xmlns:ahyp="http://schemas.microsoft.com/office/drawing/2018/hyperlinkcolor" showMasterPhAnim="0" showMasterSp="0">
+  <p:cSld>
+    <p:spTree>
+      <p:nvGrpSpPr>
+        <p:cNvPr id="104" name="Shape 104"/>
+        <p:cNvGrpSpPr/>
+        <p:nvPr/>
+      </p:nvGrpSpPr>
+      <p:grpSpPr>
+        <a:xfrm>
+          <a:off x="0" y="0"/>
+          <a:ext cx="0" cy="0"/>
+          <a:chOff x="0" y="0"/>
+          <a:chExt cx="0" cy="0"/>
+        </a:xfrm>
+      </p:grpSpPr>
+      <p:sp>
+        <p:nvSpPr>
+          <p:cNvPr id="105" name="Google Shape;105;g29a4c6b8399_0_1319:notes"/>
+          <p:cNvSpPr/>
+          <p:nvPr>
+            <p:ph idx="2" type="sldImg"/>
+          </p:nvPr>
+        </p:nvSpPr>
+        <p:spPr>
+          <a:xfrm>
+            <a:off x="381300" y="685800"/>
+            <a:ext cx="6096000" cy="3429000"/>
+          </a:xfrm>
+          <a:custGeom>
+            <a:rect b="b" l="l" r="r" t="t"/>
+            <a:pathLst>
+              <a:path extrusionOk="0" h="120000" w="120000">
+                <a:moveTo>
+                  <a:pt x="0" y="0"/>
+                </a:moveTo>
+                <a:lnTo>
+                  <a:pt x="120000" y="0"/>
+                </a:lnTo>
+                <a:lnTo>
+                  <a:pt x="120000" y="120000"/>
+                </a:lnTo>
+                <a:lnTo>
+                  <a:pt x="0" y="120000"/>
+                </a:lnTo>
+                <a:close/>
+              </a:path>
+            </a:pathLst>
+          </a:custGeom>
+        </p:spPr>
+      </p:sp>
+      <p:sp>
+        <p:nvSpPr>
           <p:cNvPr id="106" name="Google Shape;106;g29a4c6b8399_0_1319:notes"/>
+          <p:cNvSpPr txBox="1"/>
+          <p:nvPr>
+            <p:ph idx="1" type="body"/>
+          </p:nvPr>
+        </p:nvSpPr>
+        <p:spPr>
+          <a:xfrm>
+            <a:off x="685800" y="4343400"/>
+            <a:ext cx="5486400" cy="4114800"/>
+          </a:xfrm>
+          <a:prstGeom prst="rect">
+            <a:avLst/>
+          </a:prstGeom>
+        </p:spPr>
+        <p:txBody>
+          <a:bodyPr anchorCtr="0" anchor="t" bIns="91425" lIns="91425" spcFirstLastPara="1" rIns="91425" wrap="square" tIns="91425">
+            <a:noAutofit/>
+          </a:bodyPr>
+          <a:lstStyle/>
+          <a:p>
+            <a:pPr indent="0" lvl="0" marL="0" rtl="0" algn="l">
+              <a:spcBef>
+                <a:spcPts val="0"/>
+              </a:spcBef>
+              <a:spcAft>
+                <a:spcPts val="0"/>
+              </a:spcAft>
+              <a:buNone/>
+            </a:pPr>
+            <a:r>
+              <a:t/>
+            </a:r>
+            <a:endParaRPr/>
+          </a:p>
+        </p:txBody>
+      </p:sp>
+    </p:spTree>
+  </p:cSld>
+  <p:clrMapOvr>
+    <a:masterClrMapping/>
+  </p:clrMapOvr>
+</p:notes>
+</file>
+
+<file path=ppt/notesSlides/notesSlide80.xml><?xml version="1.0" encoding="utf-8"?>
+<p:notes xmlns:a="http://schemas.openxmlformats.org/drawingml/2006/main" xmlns:r="http://schemas.openxmlformats.org/officeDocument/2006/relationships" xmlns:mc="http://schemas.openxmlformats.org/markup-compatibility/2006" xmlns:mv="urn:schemas-microsoft-com:mac:vml" xmlns:p="http://schemas.openxmlformats.org/presentationml/2006/main" xmlns:c="http://schemas.openxmlformats.org/drawingml/2006/chart" xmlns:dgm="http://schemas.openxmlformats.org/drawingml/2006/diagram" xmlns:o="urn:schemas-microsoft-com:office:office" xmlns:v="urn:schemas-microsoft-com:vml" xmlns:pvml="urn:schemas-microsoft-com:office:powerpoint" xmlns:com="http://schemas.openxmlformats.org/drawingml/2006/compatibility" xmlns:p14="http://schemas.microsoft.com/office/powerpoint/2010/main" xmlns:p15="http://schemas.microsoft.com/office/powerpoint/2012/main" xmlns:ahyp="http://schemas.microsoft.com/office/drawing/2018/hyperlinkcolor" showMasterPhAnim="0" showMasterSp="0">
+  <p:cSld>
+    <p:spTree>
+      <p:nvGrpSpPr>
+        <p:cNvPr id="519" name="Shape 519"/>
+        <p:cNvGrpSpPr/>
+        <p:nvPr/>
+      </p:nvGrpSpPr>
+      <p:grpSpPr>
+        <a:xfrm>
+          <a:off x="0" y="0"/>
+          <a:ext cx="0" cy="0"/>
+          <a:chOff x="0" y="0"/>
+          <a:chExt cx="0" cy="0"/>
+        </a:xfrm>
+      </p:grpSpPr>
+      <p:sp>
+        <p:nvSpPr>
+          <p:cNvPr id="520" name="Google Shape;520;g2f1e1d5e8dd_1_79:notes"/>
+          <p:cNvSpPr/>
+          <p:nvPr>
+            <p:ph idx="2" type="sldImg"/>
+          </p:nvPr>
+        </p:nvSpPr>
+        <p:spPr>
+          <a:xfrm>
+            <a:off x="381300" y="685800"/>
+            <a:ext cx="6096000" cy="3429000"/>
+          </a:xfrm>
+          <a:custGeom>
+            <a:rect b="b" l="l" r="r" t="t"/>
+            <a:pathLst>
+              <a:path extrusionOk="0" h="120000" w="120000">
+                <a:moveTo>
+                  <a:pt x="0" y="0"/>
+                </a:moveTo>
+                <a:lnTo>
+                  <a:pt x="120000" y="0"/>
+                </a:lnTo>
+                <a:lnTo>
+                  <a:pt x="120000" y="120000"/>
+                </a:lnTo>
+                <a:lnTo>
+                  <a:pt x="0" y="120000"/>
+                </a:lnTo>
+                <a:close/>
+              </a:path>
+            </a:pathLst>
+          </a:custGeom>
+        </p:spPr>
+      </p:sp>
+      <p:sp>
+        <p:nvSpPr>
+          <p:cNvPr id="521" name="Google Shape;521;g2f1e1d5e8dd_1_79:notes"/>
+          <p:cNvSpPr txBox="1"/>
+          <p:nvPr>
+            <p:ph idx="1" type="body"/>
+          </p:nvPr>
+        </p:nvSpPr>
+        <p:spPr>
+          <a:xfrm>
+            <a:off x="685800" y="4343400"/>
+            <a:ext cx="5486400" cy="4114800"/>
+          </a:xfrm>
+          <a:prstGeom prst="rect">
+            <a:avLst/>
+          </a:prstGeom>
+        </p:spPr>
+        <p:txBody>
+          <a:bodyPr anchorCtr="0" anchor="t" bIns="91425" lIns="91425" spcFirstLastPara="1" rIns="91425" wrap="square" tIns="91425">
+            <a:noAutofit/>
+          </a:bodyPr>
+          <a:lstStyle/>
+          <a:p>
+            <a:pPr indent="0" lvl="0" marL="0" rtl="0" algn="l">
+              <a:spcBef>
+                <a:spcPts val="0"/>
+              </a:spcBef>
+              <a:spcAft>
+                <a:spcPts val="0"/>
+              </a:spcAft>
+              <a:buNone/>
+            </a:pPr>
+            <a:r>
+              <a:t/>
+            </a:r>
+            <a:endParaRPr/>
+          </a:p>
+        </p:txBody>
+      </p:sp>
+    </p:spTree>
+  </p:cSld>
+  <p:clrMapOvr>
+    <a:masterClrMapping/>
+  </p:clrMapOvr>
+</p:notes>
+</file>
+
+<file path=ppt/notesSlides/notesSlide81.xml><?xml version="1.0" encoding="utf-8"?>
+<p:notes xmlns:a="http://schemas.openxmlformats.org/drawingml/2006/main" xmlns:r="http://schemas.openxmlformats.org/officeDocument/2006/relationships" xmlns:mc="http://schemas.openxmlformats.org/markup-compatibility/2006" xmlns:mv="urn:schemas-microsoft-com:mac:vml" xmlns:p="http://schemas.openxmlformats.org/presentationml/2006/main" xmlns:c="http://schemas.openxmlformats.org/drawingml/2006/chart" xmlns:dgm="http://schemas.openxmlformats.org/drawingml/2006/diagram" xmlns:o="urn:schemas-microsoft-com:office:office" xmlns:v="urn:schemas-microsoft-com:vml" xmlns:pvml="urn:schemas-microsoft-com:office:powerpoint" xmlns:com="http://schemas.openxmlformats.org/drawingml/2006/compatibility" xmlns:p14="http://schemas.microsoft.com/office/powerpoint/2010/main" xmlns:p15="http://schemas.microsoft.com/office/powerpoint/2012/main" xmlns:ahyp="http://schemas.microsoft.com/office/drawing/2018/hyperlinkcolor" showMasterPhAnim="0" showMasterSp="0">
+  <p:cSld>
+    <p:spTree>
+      <p:nvGrpSpPr>
+        <p:cNvPr id="525" name="Shape 525"/>
+        <p:cNvGrpSpPr/>
+        <p:nvPr/>
+      </p:nvGrpSpPr>
+      <p:grpSpPr>
+        <a:xfrm>
+          <a:off x="0" y="0"/>
+          <a:ext cx="0" cy="0"/>
+          <a:chOff x="0" y="0"/>
+          <a:chExt cx="0" cy="0"/>
+        </a:xfrm>
+      </p:grpSpPr>
+      <p:sp>
+        <p:nvSpPr>
+          <p:cNvPr id="526" name="Google Shape;526;g2f1e1d5e8dd_1_84:notes"/>
+          <p:cNvSpPr/>
+          <p:nvPr>
+            <p:ph idx="2" type="sldImg"/>
+          </p:nvPr>
+        </p:nvSpPr>
+        <p:spPr>
+          <a:xfrm>
+            <a:off x="381300" y="685800"/>
+            <a:ext cx="6096000" cy="3429000"/>
+          </a:xfrm>
+          <a:custGeom>
+            <a:rect b="b" l="l" r="r" t="t"/>
+            <a:pathLst>
+              <a:path extrusionOk="0" h="120000" w="120000">
+                <a:moveTo>
+                  <a:pt x="0" y="0"/>
+                </a:moveTo>
+                <a:lnTo>
+                  <a:pt x="120000" y="0"/>
+                </a:lnTo>
+                <a:lnTo>
+                  <a:pt x="120000" y="120000"/>
+                </a:lnTo>
+                <a:lnTo>
+                  <a:pt x="0" y="120000"/>
+                </a:lnTo>
+                <a:close/>
+              </a:path>
+            </a:pathLst>
+          </a:custGeom>
+        </p:spPr>
+      </p:sp>
+      <p:sp>
+        <p:nvSpPr>
+          <p:cNvPr id="527" name="Google Shape;527;g2f1e1d5e8dd_1_84:notes"/>
           <p:cNvSpPr txBox="1"/>
           <p:nvPr>
             <p:ph idx="1" type="body"/>
@@ -20341,7 +21041,7 @@
             <a:tbl>
               <a:tblPr>
                 <a:noFill/>
-                <a:tableStyleId>{C4480CC5-2E29-4362-8BB5-5E05654FAFB2}</a:tableStyleId>
+                <a:tableStyleId>{8DDDA086-17E0-4925-8A85-B426547AD317}</a:tableStyleId>
               </a:tblPr>
               <a:tblGrid>
                 <a:gridCol w="5713925"/>
@@ -28975,6 +29675,844 @@
 </p:sld>
 </file>
 
+<file path=ppt/slides/slide75.xml><?xml version="1.0" encoding="utf-8"?>
+<p:sld xmlns:a="http://schemas.openxmlformats.org/drawingml/2006/main" xmlns:r="http://schemas.openxmlformats.org/officeDocument/2006/relationships" xmlns:mc="http://schemas.openxmlformats.org/markup-compatibility/2006" xmlns:mv="urn:schemas-microsoft-com:mac:vml" xmlns:p="http://schemas.openxmlformats.org/presentationml/2006/main" xmlns:c="http://schemas.openxmlformats.org/drawingml/2006/chart" xmlns:dgm="http://schemas.openxmlformats.org/drawingml/2006/diagram" xmlns:o="urn:schemas-microsoft-com:office:office" xmlns:v="urn:schemas-microsoft-com:vml" xmlns:pvml="urn:schemas-microsoft-com:office:powerpoint" xmlns:com="http://schemas.openxmlformats.org/drawingml/2006/compatibility" xmlns:p14="http://schemas.microsoft.com/office/powerpoint/2010/main" xmlns:p15="http://schemas.microsoft.com/office/powerpoint/2012/main" xmlns:ahyp="http://schemas.microsoft.com/office/drawing/2018/hyperlinkcolor">
+  <p:cSld>
+    <p:spTree>
+      <p:nvGrpSpPr>
+        <p:cNvPr id="495" name="Shape 495"/>
+        <p:cNvGrpSpPr/>
+        <p:nvPr/>
+      </p:nvGrpSpPr>
+      <p:grpSpPr>
+        <a:xfrm>
+          <a:off x="0" y="0"/>
+          <a:ext cx="0" cy="0"/>
+          <a:chOff x="0" y="0"/>
+          <a:chExt cx="0" cy="0"/>
+        </a:xfrm>
+      </p:grpSpPr>
+      <p:sp>
+        <p:nvSpPr>
+          <p:cNvPr id="496" name="Google Shape;496;p87"/>
+          <p:cNvSpPr txBox="1"/>
+          <p:nvPr>
+            <p:ph type="title"/>
+          </p:nvPr>
+        </p:nvSpPr>
+        <p:spPr>
+          <a:xfrm>
+            <a:off x="311700" y="445025"/>
+            <a:ext cx="8520600" cy="707400"/>
+          </a:xfrm>
+          <a:prstGeom prst="rect">
+            <a:avLst/>
+          </a:prstGeom>
+        </p:spPr>
+        <p:txBody>
+          <a:bodyPr anchorCtr="0" anchor="t" bIns="91425" lIns="91425" spcFirstLastPara="1" rIns="91425" wrap="square" tIns="91425">
+            <a:noAutofit/>
+          </a:bodyPr>
+          <a:lstStyle/>
+          <a:p>
+            <a:pPr indent="0" lvl="0" marL="0" rtl="0" algn="l">
+              <a:spcBef>
+                <a:spcPts val="0"/>
+              </a:spcBef>
+              <a:spcAft>
+                <a:spcPts val="0"/>
+              </a:spcAft>
+              <a:buSzPts val="990"/>
+              <a:buNone/>
+            </a:pPr>
+            <a:r>
+              <a:rPr lang="en" sz="2440"/>
+              <a:t>31. Which TWO of the given options are exit criteria for testing a system?</a:t>
+            </a:r>
+            <a:endParaRPr sz="2440"/>
+          </a:p>
+        </p:txBody>
+      </p:sp>
+      <p:sp>
+        <p:nvSpPr>
+          <p:cNvPr id="497" name="Google Shape;497;p87"/>
+          <p:cNvSpPr txBox="1"/>
+          <p:nvPr>
+            <p:ph idx="1" type="body"/>
+          </p:nvPr>
+        </p:nvSpPr>
+        <p:spPr>
+          <a:xfrm>
+            <a:off x="311700" y="1266325"/>
+            <a:ext cx="8520600" cy="3302700"/>
+          </a:xfrm>
+          <a:prstGeom prst="rect">
+            <a:avLst/>
+          </a:prstGeom>
+        </p:spPr>
+        <p:txBody>
+          <a:bodyPr anchorCtr="0" anchor="t" bIns="91425" lIns="91425" spcFirstLastPara="1" rIns="91425" wrap="square" tIns="91425">
+            <a:normAutofit/>
+          </a:bodyPr>
+          <a:lstStyle/>
+          <a:p>
+            <a:pPr indent="0" lvl="0" marL="0" rtl="0" algn="l">
+              <a:spcBef>
+                <a:spcPts val="0"/>
+              </a:spcBef>
+              <a:spcAft>
+                <a:spcPts val="0"/>
+              </a:spcAft>
+              <a:buNone/>
+            </a:pPr>
+            <a:r>
+              <a:rPr lang="en"/>
+              <a:t>a) Test environment readiness</a:t>
+            </a:r>
+            <a:endParaRPr/>
+          </a:p>
+          <a:p>
+            <a:pPr indent="0" lvl="0" marL="0" rtl="0" algn="l">
+              <a:spcBef>
+                <a:spcPts val="1200"/>
+              </a:spcBef>
+              <a:spcAft>
+                <a:spcPts val="0"/>
+              </a:spcAft>
+              <a:buNone/>
+            </a:pPr>
+            <a:r>
+              <a:rPr lang="en"/>
+              <a:t>b) The ability to log in to the test object by the tester</a:t>
+            </a:r>
+            <a:endParaRPr/>
+          </a:p>
+          <a:p>
+            <a:pPr indent="0" lvl="0" marL="0" rtl="0" algn="l">
+              <a:spcBef>
+                <a:spcPts val="1200"/>
+              </a:spcBef>
+              <a:spcAft>
+                <a:spcPts val="0"/>
+              </a:spcAft>
+              <a:buNone/>
+            </a:pPr>
+            <a:r>
+              <a:rPr lang="en"/>
+              <a:t>c) Estimated defect density is reached</a:t>
+            </a:r>
+            <a:endParaRPr/>
+          </a:p>
+          <a:p>
+            <a:pPr indent="0" lvl="0" marL="0" rtl="0" algn="l">
+              <a:spcBef>
+                <a:spcPts val="1200"/>
+              </a:spcBef>
+              <a:spcAft>
+                <a:spcPts val="0"/>
+              </a:spcAft>
+              <a:buNone/>
+            </a:pPr>
+            <a:r>
+              <a:rPr lang="en"/>
+              <a:t>d) Requirements are translated into given/when/then format</a:t>
+            </a:r>
+            <a:endParaRPr/>
+          </a:p>
+          <a:p>
+            <a:pPr indent="0" lvl="0" marL="0" rtl="0" algn="l">
+              <a:spcBef>
+                <a:spcPts val="1200"/>
+              </a:spcBef>
+              <a:spcAft>
+                <a:spcPts val="0"/>
+              </a:spcAft>
+              <a:buNone/>
+            </a:pPr>
+            <a:r>
+              <a:rPr lang="en"/>
+              <a:t>e) Regression tests are automated</a:t>
+            </a:r>
+            <a:endParaRPr/>
+          </a:p>
+          <a:p>
+            <a:pPr indent="0" lvl="0" marL="0" rtl="0" algn="l">
+              <a:spcBef>
+                <a:spcPts val="1200"/>
+              </a:spcBef>
+              <a:spcAft>
+                <a:spcPts val="0"/>
+              </a:spcAft>
+              <a:buNone/>
+            </a:pPr>
+            <a:r>
+              <a:rPr lang="en"/>
+              <a:t>Select TWO options.</a:t>
+            </a:r>
+            <a:endParaRPr/>
+          </a:p>
+          <a:p>
+            <a:pPr indent="0" lvl="0" marL="0" rtl="0" algn="l">
+              <a:spcBef>
+                <a:spcPts val="1200"/>
+              </a:spcBef>
+              <a:spcAft>
+                <a:spcPts val="1200"/>
+              </a:spcAft>
+              <a:buNone/>
+            </a:pPr>
+            <a:r>
+              <a:t/>
+            </a:r>
+            <a:endParaRPr/>
+          </a:p>
+        </p:txBody>
+      </p:sp>
+    </p:spTree>
+  </p:cSld>
+  <p:clrMapOvr>
+    <a:masterClrMapping/>
+  </p:clrMapOvr>
+</p:sld>
+</file>
+
+<file path=ppt/slides/slide76.xml><?xml version="1.0" encoding="utf-8"?>
+<p:sld xmlns:a="http://schemas.openxmlformats.org/drawingml/2006/main" xmlns:r="http://schemas.openxmlformats.org/officeDocument/2006/relationships" xmlns:mc="http://schemas.openxmlformats.org/markup-compatibility/2006" xmlns:mv="urn:schemas-microsoft-com:mac:vml" xmlns:p="http://schemas.openxmlformats.org/presentationml/2006/main" xmlns:c="http://schemas.openxmlformats.org/drawingml/2006/chart" xmlns:dgm="http://schemas.openxmlformats.org/drawingml/2006/diagram" xmlns:o="urn:schemas-microsoft-com:office:office" xmlns:v="urn:schemas-microsoft-com:vml" xmlns:pvml="urn:schemas-microsoft-com:office:powerpoint" xmlns:com="http://schemas.openxmlformats.org/drawingml/2006/compatibility" xmlns:p14="http://schemas.microsoft.com/office/powerpoint/2010/main" xmlns:p15="http://schemas.microsoft.com/office/powerpoint/2012/main" xmlns:ahyp="http://schemas.microsoft.com/office/drawing/2018/hyperlinkcolor">
+  <p:cSld>
+    <p:spTree>
+      <p:nvGrpSpPr>
+        <p:cNvPr id="501" name="Shape 501"/>
+        <p:cNvGrpSpPr/>
+        <p:nvPr/>
+      </p:nvGrpSpPr>
+      <p:grpSpPr>
+        <a:xfrm>
+          <a:off x="0" y="0"/>
+          <a:ext cx="0" cy="0"/>
+          <a:chOff x="0" y="0"/>
+          <a:chExt cx="0" cy="0"/>
+        </a:xfrm>
+      </p:grpSpPr>
+      <p:sp>
+        <p:nvSpPr>
+          <p:cNvPr id="502" name="Google Shape;502;p88"/>
+          <p:cNvSpPr txBox="1"/>
+          <p:nvPr>
+            <p:ph idx="1" type="body"/>
+          </p:nvPr>
+        </p:nvSpPr>
+        <p:spPr>
+          <a:xfrm>
+            <a:off x="311700" y="192450"/>
+            <a:ext cx="8520600" cy="4636200"/>
+          </a:xfrm>
+          <a:prstGeom prst="rect">
+            <a:avLst/>
+          </a:prstGeom>
+        </p:spPr>
+        <p:txBody>
+          <a:bodyPr anchorCtr="0" anchor="t" bIns="91425" lIns="91425" spcFirstLastPara="1" rIns="91425" wrap="square" tIns="91425">
+            <a:normAutofit/>
+          </a:bodyPr>
+          <a:lstStyle/>
+          <a:p>
+            <a:pPr indent="0" lvl="0" marL="0" rtl="0" algn="l">
+              <a:spcBef>
+                <a:spcPts val="0"/>
+              </a:spcBef>
+              <a:spcAft>
+                <a:spcPts val="0"/>
+              </a:spcAft>
+              <a:buNone/>
+            </a:pPr>
+            <a:r>
+              <a:rPr lang="en"/>
+              <a:t>a) Is not correct. Test environment readiness is a resource availability criterion; hence it belongs to the entry criteria</a:t>
+            </a:r>
+            <a:endParaRPr/>
+          </a:p>
+          <a:p>
+            <a:pPr indent="0" lvl="0" marL="0" rtl="0" algn="l">
+              <a:spcBef>
+                <a:spcPts val="1200"/>
+              </a:spcBef>
+              <a:spcAft>
+                <a:spcPts val="0"/>
+              </a:spcAft>
+              <a:buNone/>
+            </a:pPr>
+            <a:r>
+              <a:rPr lang="en"/>
+              <a:t>b) Is not correct. This is a resource availability criterion; hence it belongs to the entry criteria</a:t>
+            </a:r>
+            <a:endParaRPr/>
+          </a:p>
+          <a:p>
+            <a:pPr indent="0" lvl="0" marL="0" rtl="0" algn="l">
+              <a:spcBef>
+                <a:spcPts val="1200"/>
+              </a:spcBef>
+              <a:spcAft>
+                <a:spcPts val="0"/>
+              </a:spcAft>
+              <a:buNone/>
+            </a:pPr>
+            <a:r>
+              <a:rPr lang="en">
+                <a:highlight>
+                  <a:schemeClr val="accent6"/>
+                </a:highlight>
+              </a:rPr>
+              <a:t>c) Is correct. Estimated defect density is a measure of diligence; hence it belongs to the exit criteria.</a:t>
+            </a:r>
+            <a:endParaRPr>
+              <a:highlight>
+                <a:schemeClr val="accent6"/>
+              </a:highlight>
+            </a:endParaRPr>
+          </a:p>
+          <a:p>
+            <a:pPr indent="0" lvl="0" marL="0" rtl="0" algn="l">
+              <a:spcBef>
+                <a:spcPts val="1200"/>
+              </a:spcBef>
+              <a:spcAft>
+                <a:spcPts val="0"/>
+              </a:spcAft>
+              <a:buNone/>
+            </a:pPr>
+            <a:r>
+              <a:rPr lang="en"/>
+              <a:t>d) Is not correct. Requirements translated into a given format result in testable requirements; hence it belongs to the entry criteria</a:t>
+            </a:r>
+            <a:endParaRPr/>
+          </a:p>
+          <a:p>
+            <a:pPr indent="0" lvl="0" marL="0" rtl="0" algn="l">
+              <a:spcBef>
+                <a:spcPts val="1200"/>
+              </a:spcBef>
+              <a:spcAft>
+                <a:spcPts val="1200"/>
+              </a:spcAft>
+              <a:buNone/>
+            </a:pPr>
+            <a:r>
+              <a:rPr lang="en">
+                <a:highlight>
+                  <a:schemeClr val="accent6"/>
+                </a:highlight>
+              </a:rPr>
+              <a:t>e) Is correct. Automation of regression</a:t>
+            </a:r>
+            <a:endParaRPr>
+              <a:highlight>
+                <a:schemeClr val="accent6"/>
+              </a:highlight>
+            </a:endParaRPr>
+          </a:p>
+        </p:txBody>
+      </p:sp>
+    </p:spTree>
+  </p:cSld>
+  <p:clrMapOvr>
+    <a:masterClrMapping/>
+  </p:clrMapOvr>
+</p:sld>
+</file>
+
+<file path=ppt/slides/slide77.xml><?xml version="1.0" encoding="utf-8"?>
+<p:sld xmlns:a="http://schemas.openxmlformats.org/drawingml/2006/main" xmlns:r="http://schemas.openxmlformats.org/officeDocument/2006/relationships" xmlns:mc="http://schemas.openxmlformats.org/markup-compatibility/2006" xmlns:mv="urn:schemas-microsoft-com:mac:vml" xmlns:p="http://schemas.openxmlformats.org/presentationml/2006/main" xmlns:c="http://schemas.openxmlformats.org/drawingml/2006/chart" xmlns:dgm="http://schemas.openxmlformats.org/drawingml/2006/diagram" xmlns:o="urn:schemas-microsoft-com:office:office" xmlns:v="urn:schemas-microsoft-com:vml" xmlns:pvml="urn:schemas-microsoft-com:office:powerpoint" xmlns:com="http://schemas.openxmlformats.org/drawingml/2006/compatibility" xmlns:p14="http://schemas.microsoft.com/office/powerpoint/2010/main" xmlns:p15="http://schemas.microsoft.com/office/powerpoint/2012/main" xmlns:ahyp="http://schemas.microsoft.com/office/drawing/2018/hyperlinkcolor">
+  <p:cSld>
+    <p:spTree>
+      <p:nvGrpSpPr>
+        <p:cNvPr id="506" name="Shape 506"/>
+        <p:cNvGrpSpPr/>
+        <p:nvPr/>
+      </p:nvGrpSpPr>
+      <p:grpSpPr>
+        <a:xfrm>
+          <a:off x="0" y="0"/>
+          <a:ext cx="0" cy="0"/>
+          <a:chOff x="0" y="0"/>
+          <a:chExt cx="0" cy="0"/>
+        </a:xfrm>
+      </p:grpSpPr>
+      <p:sp>
+        <p:nvSpPr>
+          <p:cNvPr id="507" name="Google Shape;507;p89"/>
+          <p:cNvSpPr txBox="1"/>
+          <p:nvPr>
+            <p:ph type="title"/>
+          </p:nvPr>
+        </p:nvSpPr>
+        <p:spPr>
+          <a:xfrm>
+            <a:off x="311700" y="445025"/>
+            <a:ext cx="8520600" cy="1251900"/>
+          </a:xfrm>
+          <a:prstGeom prst="rect">
+            <a:avLst/>
+          </a:prstGeom>
+        </p:spPr>
+        <p:txBody>
+          <a:bodyPr anchorCtr="0" anchor="t" bIns="91425" lIns="91425" spcFirstLastPara="1" rIns="91425" wrap="square" tIns="91425">
+            <a:noAutofit/>
+          </a:bodyPr>
+          <a:lstStyle/>
+          <a:p>
+            <a:pPr indent="0" lvl="0" marL="0" rtl="0" algn="l">
+              <a:spcBef>
+                <a:spcPts val="0"/>
+              </a:spcBef>
+              <a:spcAft>
+                <a:spcPts val="0"/>
+              </a:spcAft>
+              <a:buNone/>
+            </a:pPr>
+            <a:r>
+              <a:rPr lang="en" sz="2400"/>
+              <a:t>32.</a:t>
+            </a:r>
+            <a:r>
+              <a:rPr b="0" lang="en" sz="2400">
+                <a:latin typeface="Open Sans"/>
+                <a:ea typeface="Open Sans"/>
+                <a:cs typeface="Open Sans"/>
+                <a:sym typeface="Open Sans"/>
+              </a:rPr>
+              <a:t>Your team uses the three-point estimation technique to estimate the test effort for a new high-risk feature. The following estimates were made:</a:t>
+            </a:r>
+            <a:endParaRPr sz="2400"/>
+          </a:p>
+        </p:txBody>
+      </p:sp>
+      <p:sp>
+        <p:nvSpPr>
+          <p:cNvPr id="508" name="Google Shape;508;p89"/>
+          <p:cNvSpPr txBox="1"/>
+          <p:nvPr>
+            <p:ph idx="1" type="body"/>
+          </p:nvPr>
+        </p:nvSpPr>
+        <p:spPr>
+          <a:xfrm>
+            <a:off x="311700" y="1784475"/>
+            <a:ext cx="8520600" cy="3009000"/>
+          </a:xfrm>
+          <a:prstGeom prst="rect">
+            <a:avLst/>
+          </a:prstGeom>
+        </p:spPr>
+        <p:txBody>
+          <a:bodyPr anchorCtr="0" anchor="t" bIns="91425" lIns="91425" spcFirstLastPara="1" rIns="91425" wrap="square" tIns="91425">
+            <a:noAutofit/>
+          </a:bodyPr>
+          <a:lstStyle/>
+          <a:p>
+            <a:pPr indent="0" lvl="0" marL="0" rtl="0" algn="l">
+              <a:spcBef>
+                <a:spcPts val="0"/>
+              </a:spcBef>
+              <a:spcAft>
+                <a:spcPts val="0"/>
+              </a:spcAft>
+              <a:buNone/>
+            </a:pPr>
+            <a:r>
+              <a:rPr lang="en" sz="2200"/>
+              <a:t>Your team uses the three-point estimation technique to estimate the test effort for a new high-risk feature. The following estimates were made:</a:t>
+            </a:r>
+            <a:endParaRPr sz="2200"/>
+          </a:p>
+          <a:p>
+            <a:pPr indent="0" lvl="0" marL="0" rtl="0" algn="l">
+              <a:spcBef>
+                <a:spcPts val="1200"/>
+              </a:spcBef>
+              <a:spcAft>
+                <a:spcPts val="0"/>
+              </a:spcAft>
+              <a:buNone/>
+            </a:pPr>
+            <a:r>
+              <a:rPr lang="en" sz="2200"/>
+              <a:t>Most optimistic estimation: 2 person-hours</a:t>
+            </a:r>
+            <a:endParaRPr sz="2200"/>
+          </a:p>
+          <a:p>
+            <a:pPr indent="0" lvl="0" marL="0" rtl="0" algn="l">
+              <a:spcBef>
+                <a:spcPts val="1200"/>
+              </a:spcBef>
+              <a:spcAft>
+                <a:spcPts val="0"/>
+              </a:spcAft>
+              <a:buNone/>
+            </a:pPr>
+            <a:r>
+              <a:rPr lang="en" sz="2200"/>
+              <a:t>Most likely estimation: 11 person-hours</a:t>
+            </a:r>
+            <a:endParaRPr sz="2200"/>
+          </a:p>
+          <a:p>
+            <a:pPr indent="0" lvl="0" marL="0" rtl="0" algn="l">
+              <a:spcBef>
+                <a:spcPts val="1200"/>
+              </a:spcBef>
+              <a:spcAft>
+                <a:spcPts val="1200"/>
+              </a:spcAft>
+              <a:buNone/>
+            </a:pPr>
+            <a:r>
+              <a:rPr lang="en" sz="2200"/>
+              <a:t>Most pessimistic estimation: 14 person-hours</a:t>
+            </a:r>
+            <a:endParaRPr sz="2200"/>
+          </a:p>
+        </p:txBody>
+      </p:sp>
+    </p:spTree>
+  </p:cSld>
+  <p:clrMapOvr>
+    <a:masterClrMapping/>
+  </p:clrMapOvr>
+</p:sld>
+</file>
+
+<file path=ppt/slides/slide78.xml><?xml version="1.0" encoding="utf-8"?>
+<p:sld xmlns:a="http://schemas.openxmlformats.org/drawingml/2006/main" xmlns:r="http://schemas.openxmlformats.org/officeDocument/2006/relationships" xmlns:mc="http://schemas.openxmlformats.org/markup-compatibility/2006" xmlns:mv="urn:schemas-microsoft-com:mac:vml" xmlns:p="http://schemas.openxmlformats.org/presentationml/2006/main" xmlns:c="http://schemas.openxmlformats.org/drawingml/2006/chart" xmlns:dgm="http://schemas.openxmlformats.org/drawingml/2006/diagram" xmlns:o="urn:schemas-microsoft-com:office:office" xmlns:v="urn:schemas-microsoft-com:vml" xmlns:pvml="urn:schemas-microsoft-com:office:powerpoint" xmlns:com="http://schemas.openxmlformats.org/drawingml/2006/compatibility" xmlns:p14="http://schemas.microsoft.com/office/powerpoint/2010/main" xmlns:p15="http://schemas.microsoft.com/office/powerpoint/2012/main" xmlns:ahyp="http://schemas.microsoft.com/office/drawing/2018/hyperlinkcolor">
+  <p:cSld>
+    <p:spTree>
+      <p:nvGrpSpPr>
+        <p:cNvPr id="512" name="Shape 512"/>
+        <p:cNvGrpSpPr/>
+        <p:nvPr/>
+      </p:nvGrpSpPr>
+      <p:grpSpPr>
+        <a:xfrm>
+          <a:off x="0" y="0"/>
+          <a:ext cx="0" cy="0"/>
+          <a:chOff x="0" y="0"/>
+          <a:chExt cx="0" cy="0"/>
+        </a:xfrm>
+      </p:grpSpPr>
+      <p:sp>
+        <p:nvSpPr>
+          <p:cNvPr id="513" name="Google Shape;513;p90"/>
+          <p:cNvSpPr txBox="1"/>
+          <p:nvPr>
+            <p:ph idx="1" type="body"/>
+          </p:nvPr>
+        </p:nvSpPr>
+        <p:spPr>
+          <a:xfrm>
+            <a:off x="311700" y="349900"/>
+            <a:ext cx="8520600" cy="4219200"/>
+          </a:xfrm>
+          <a:prstGeom prst="rect">
+            <a:avLst/>
+          </a:prstGeom>
+        </p:spPr>
+        <p:txBody>
+          <a:bodyPr anchorCtr="0" anchor="t" bIns="91425" lIns="91425" spcFirstLastPara="1" rIns="91425" wrap="square" tIns="91425">
+            <a:normAutofit/>
+          </a:bodyPr>
+          <a:lstStyle/>
+          <a:p>
+            <a:pPr indent="0" lvl="0" marL="0" rtl="0" algn="l">
+              <a:spcBef>
+                <a:spcPts val="0"/>
+              </a:spcBef>
+              <a:spcAft>
+                <a:spcPts val="0"/>
+              </a:spcAft>
+              <a:buNone/>
+            </a:pPr>
+            <a:r>
+              <a:rPr lang="en" sz="2500"/>
+              <a:t>What is the final estimate?</a:t>
+            </a:r>
+            <a:endParaRPr sz="2500"/>
+          </a:p>
+          <a:p>
+            <a:pPr indent="0" lvl="0" marL="0" rtl="0" algn="l">
+              <a:spcBef>
+                <a:spcPts val="1200"/>
+              </a:spcBef>
+              <a:spcAft>
+                <a:spcPts val="0"/>
+              </a:spcAft>
+              <a:buNone/>
+            </a:pPr>
+            <a:r>
+              <a:rPr lang="en" sz="2500"/>
+              <a:t>a) 9 person-hours</a:t>
+            </a:r>
+            <a:endParaRPr sz="2500"/>
+          </a:p>
+          <a:p>
+            <a:pPr indent="0" lvl="0" marL="0" rtl="0" algn="l">
+              <a:spcBef>
+                <a:spcPts val="1200"/>
+              </a:spcBef>
+              <a:spcAft>
+                <a:spcPts val="0"/>
+              </a:spcAft>
+              <a:buNone/>
+            </a:pPr>
+            <a:r>
+              <a:rPr lang="en" sz="2500"/>
+              <a:t>b) 14 person-hours</a:t>
+            </a:r>
+            <a:endParaRPr sz="2500"/>
+          </a:p>
+          <a:p>
+            <a:pPr indent="0" lvl="0" marL="0" rtl="0" algn="l">
+              <a:spcBef>
+                <a:spcPts val="1200"/>
+              </a:spcBef>
+              <a:spcAft>
+                <a:spcPts val="0"/>
+              </a:spcAft>
+              <a:buNone/>
+            </a:pPr>
+            <a:r>
+              <a:rPr lang="en" sz="2500"/>
+              <a:t>c) 11 person-hours</a:t>
+            </a:r>
+            <a:endParaRPr sz="2500"/>
+          </a:p>
+          <a:p>
+            <a:pPr indent="0" lvl="0" marL="0" rtl="0" algn="l">
+              <a:spcBef>
+                <a:spcPts val="1200"/>
+              </a:spcBef>
+              <a:spcAft>
+                <a:spcPts val="0"/>
+              </a:spcAft>
+              <a:buNone/>
+            </a:pPr>
+            <a:r>
+              <a:rPr lang="en" sz="2500"/>
+              <a:t>d) 10 person-hours</a:t>
+            </a:r>
+            <a:endParaRPr sz="2500"/>
+          </a:p>
+          <a:p>
+            <a:pPr indent="0" lvl="0" marL="0" rtl="0" algn="l">
+              <a:spcBef>
+                <a:spcPts val="1200"/>
+              </a:spcBef>
+              <a:spcAft>
+                <a:spcPts val="1200"/>
+              </a:spcAft>
+              <a:buNone/>
+            </a:pPr>
+            <a:r>
+              <a:rPr lang="en" sz="2500"/>
+              <a:t>Select ONE option.</a:t>
+            </a:r>
+            <a:endParaRPr sz="2500"/>
+          </a:p>
+        </p:txBody>
+      </p:sp>
+    </p:spTree>
+  </p:cSld>
+  <p:clrMapOvr>
+    <a:masterClrMapping/>
+  </p:clrMapOvr>
+</p:sld>
+</file>
+
+<file path=ppt/slides/slide79.xml><?xml version="1.0" encoding="utf-8"?>
+<p:sld xmlns:a="http://schemas.openxmlformats.org/drawingml/2006/main" xmlns:r="http://schemas.openxmlformats.org/officeDocument/2006/relationships" xmlns:mc="http://schemas.openxmlformats.org/markup-compatibility/2006" xmlns:mv="urn:schemas-microsoft-com:mac:vml" xmlns:p="http://schemas.openxmlformats.org/presentationml/2006/main" xmlns:c="http://schemas.openxmlformats.org/drawingml/2006/chart" xmlns:dgm="http://schemas.openxmlformats.org/drawingml/2006/diagram" xmlns:o="urn:schemas-microsoft-com:office:office" xmlns:v="urn:schemas-microsoft-com:vml" xmlns:pvml="urn:schemas-microsoft-com:office:powerpoint" xmlns:com="http://schemas.openxmlformats.org/drawingml/2006/compatibility" xmlns:p14="http://schemas.microsoft.com/office/powerpoint/2010/main" xmlns:p15="http://schemas.microsoft.com/office/powerpoint/2012/main" xmlns:ahyp="http://schemas.microsoft.com/office/drawing/2018/hyperlinkcolor">
+  <p:cSld>
+    <p:spTree>
+      <p:nvGrpSpPr>
+        <p:cNvPr id="517" name="Shape 517"/>
+        <p:cNvGrpSpPr/>
+        <p:nvPr/>
+      </p:nvGrpSpPr>
+      <p:grpSpPr>
+        <a:xfrm>
+          <a:off x="0" y="0"/>
+          <a:ext cx="0" cy="0"/>
+          <a:chOff x="0" y="0"/>
+          <a:chExt cx="0" cy="0"/>
+        </a:xfrm>
+      </p:grpSpPr>
+      <p:sp>
+        <p:nvSpPr>
+          <p:cNvPr id="518" name="Google Shape;518;p91"/>
+          <p:cNvSpPr txBox="1"/>
+          <p:nvPr>
+            <p:ph idx="1" type="body"/>
+          </p:nvPr>
+        </p:nvSpPr>
+        <p:spPr>
+          <a:xfrm>
+            <a:off x="311700" y="209950"/>
+            <a:ext cx="8520600" cy="4583700"/>
+          </a:xfrm>
+          <a:prstGeom prst="rect">
+            <a:avLst/>
+          </a:prstGeom>
+        </p:spPr>
+        <p:txBody>
+          <a:bodyPr anchorCtr="0" anchor="t" bIns="91425" lIns="91425" spcFirstLastPara="1" rIns="91425" wrap="square" tIns="91425">
+            <a:normAutofit/>
+          </a:bodyPr>
+          <a:lstStyle/>
+          <a:p>
+            <a:pPr indent="0" lvl="0" marL="0" rtl="0" algn="l">
+              <a:spcBef>
+                <a:spcPts val="0"/>
+              </a:spcBef>
+              <a:spcAft>
+                <a:spcPts val="0"/>
+              </a:spcAft>
+              <a:buNone/>
+            </a:pPr>
+            <a:r>
+              <a:rPr lang="en" sz="2400"/>
+              <a:t>In the three-point estimation technique:</a:t>
+            </a:r>
+            <a:endParaRPr sz="2400"/>
+          </a:p>
+          <a:p>
+            <a:pPr indent="0" lvl="0" marL="0" rtl="0" algn="l">
+              <a:spcBef>
+                <a:spcPts val="1200"/>
+              </a:spcBef>
+              <a:spcAft>
+                <a:spcPts val="0"/>
+              </a:spcAft>
+              <a:buNone/>
+            </a:pPr>
+            <a:r>
+              <a:rPr lang="en" sz="2400"/>
+              <a:t>E = (optimistic + 4*most likely + pessimistic)/6</a:t>
+            </a:r>
+            <a:endParaRPr sz="2400"/>
+          </a:p>
+          <a:p>
+            <a:pPr indent="0" lvl="0" marL="0" rtl="0" algn="l">
+              <a:spcBef>
+                <a:spcPts val="1200"/>
+              </a:spcBef>
+              <a:spcAft>
+                <a:spcPts val="0"/>
+              </a:spcAft>
+              <a:buNone/>
+            </a:pPr>
+            <a:r>
+              <a:rPr lang="en" sz="2400"/>
+              <a:t>E = (2+(4*11)+14)/6 = 10</a:t>
+            </a:r>
+            <a:endParaRPr sz="2400"/>
+          </a:p>
+          <a:p>
+            <a:pPr indent="0" lvl="0" marL="0" rtl="0" algn="l">
+              <a:spcBef>
+                <a:spcPts val="1200"/>
+              </a:spcBef>
+              <a:spcAft>
+                <a:spcPts val="0"/>
+              </a:spcAft>
+              <a:buNone/>
+            </a:pPr>
+            <a:r>
+              <a:rPr lang="en" sz="2400"/>
+              <a:t>Thus:</a:t>
+            </a:r>
+            <a:endParaRPr sz="2400"/>
+          </a:p>
+          <a:p>
+            <a:pPr indent="0" lvl="0" marL="0" rtl="0" algn="l">
+              <a:spcBef>
+                <a:spcPts val="1200"/>
+              </a:spcBef>
+              <a:spcAft>
+                <a:spcPts val="0"/>
+              </a:spcAft>
+              <a:buNone/>
+            </a:pPr>
+            <a:r>
+              <a:rPr lang="en" sz="2400"/>
+              <a:t>a) Is not correct</a:t>
+            </a:r>
+            <a:endParaRPr sz="2400"/>
+          </a:p>
+          <a:p>
+            <a:pPr indent="0" lvl="0" marL="0" rtl="0" algn="l">
+              <a:spcBef>
+                <a:spcPts val="1200"/>
+              </a:spcBef>
+              <a:spcAft>
+                <a:spcPts val="0"/>
+              </a:spcAft>
+              <a:buNone/>
+            </a:pPr>
+            <a:r>
+              <a:rPr lang="en" sz="2400"/>
+              <a:t>b) Is not correct</a:t>
+            </a:r>
+            <a:endParaRPr sz="2400"/>
+          </a:p>
+          <a:p>
+            <a:pPr indent="0" lvl="0" marL="0" rtl="0" algn="l">
+              <a:spcBef>
+                <a:spcPts val="1200"/>
+              </a:spcBef>
+              <a:spcAft>
+                <a:spcPts val="0"/>
+              </a:spcAft>
+              <a:buNone/>
+            </a:pPr>
+            <a:r>
+              <a:rPr lang="en" sz="2400"/>
+              <a:t>c) Is not correct</a:t>
+            </a:r>
+            <a:endParaRPr sz="2400"/>
+          </a:p>
+          <a:p>
+            <a:pPr indent="0" lvl="0" marL="0" rtl="0" algn="l">
+              <a:spcBef>
+                <a:spcPts val="1200"/>
+              </a:spcBef>
+              <a:spcAft>
+                <a:spcPts val="1200"/>
+              </a:spcAft>
+              <a:buNone/>
+            </a:pPr>
+            <a:r>
+              <a:rPr lang="en" sz="2400">
+                <a:highlight>
+                  <a:schemeClr val="accent6"/>
+                </a:highlight>
+              </a:rPr>
+              <a:t>d) Is correct</a:t>
+            </a:r>
+            <a:endParaRPr sz="2400">
+              <a:highlight>
+                <a:schemeClr val="accent6"/>
+              </a:highlight>
+            </a:endParaRPr>
+          </a:p>
+        </p:txBody>
+      </p:sp>
+    </p:spTree>
+  </p:cSld>
+  <p:clrMapOvr>
+    <a:masterClrMapping/>
+  </p:clrMapOvr>
+</p:sld>
+</file>
+
 <file path=ppt/slides/slide8.xml><?xml version="1.0" encoding="utf-8"?>
 <p:sld xmlns:a="http://schemas.openxmlformats.org/drawingml/2006/main" xmlns:r="http://schemas.openxmlformats.org/officeDocument/2006/relationships" xmlns:mc="http://schemas.openxmlformats.org/markup-compatibility/2006" xmlns:mv="urn:schemas-microsoft-com:mac:vml" xmlns:p="http://schemas.openxmlformats.org/presentationml/2006/main" xmlns:c="http://schemas.openxmlformats.org/drawingml/2006/chart" xmlns:dgm="http://schemas.openxmlformats.org/drawingml/2006/diagram" xmlns:o="urn:schemas-microsoft-com:office:office" xmlns:v="urn:schemas-microsoft-com:vml" xmlns:pvml="urn:schemas-microsoft-com:office:powerpoint" xmlns:com="http://schemas.openxmlformats.org/drawingml/2006/compatibility" xmlns:p14="http://schemas.microsoft.com/office/powerpoint/2010/main" xmlns:p15="http://schemas.microsoft.com/office/powerpoint/2012/main" xmlns:ahyp="http://schemas.microsoft.com/office/drawing/2018/hyperlinkcolor">
   <p:cSld>
@@ -29195,6 +30733,392 @@
               <a:cs typeface="Arial"/>
               <a:sym typeface="Arial"/>
             </a:endParaRPr>
+          </a:p>
+        </p:txBody>
+      </p:sp>
+    </p:spTree>
+  </p:cSld>
+  <p:clrMapOvr>
+    <a:masterClrMapping/>
+  </p:clrMapOvr>
+</p:sld>
+</file>
+
+<file path=ppt/slides/slide80.xml><?xml version="1.0" encoding="utf-8"?>
+<p:sld xmlns:a="http://schemas.openxmlformats.org/drawingml/2006/main" xmlns:r="http://schemas.openxmlformats.org/officeDocument/2006/relationships" xmlns:mc="http://schemas.openxmlformats.org/markup-compatibility/2006" xmlns:mv="urn:schemas-microsoft-com:mac:vml" xmlns:p="http://schemas.openxmlformats.org/presentationml/2006/main" xmlns:c="http://schemas.openxmlformats.org/drawingml/2006/chart" xmlns:dgm="http://schemas.openxmlformats.org/drawingml/2006/diagram" xmlns:o="urn:schemas-microsoft-com:office:office" xmlns:v="urn:schemas-microsoft-com:vml" xmlns:pvml="urn:schemas-microsoft-com:office:powerpoint" xmlns:com="http://schemas.openxmlformats.org/drawingml/2006/compatibility" xmlns:p14="http://schemas.microsoft.com/office/powerpoint/2010/main" xmlns:p15="http://schemas.microsoft.com/office/powerpoint/2012/main" xmlns:ahyp="http://schemas.microsoft.com/office/drawing/2018/hyperlinkcolor">
+  <p:cSld>
+    <p:spTree>
+      <p:nvGrpSpPr>
+        <p:cNvPr id="522" name="Shape 522"/>
+        <p:cNvGrpSpPr/>
+        <p:nvPr/>
+      </p:nvGrpSpPr>
+      <p:grpSpPr>
+        <a:xfrm>
+          <a:off x="0" y="0"/>
+          <a:ext cx="0" cy="0"/>
+          <a:chOff x="0" y="0"/>
+          <a:chExt cx="0" cy="0"/>
+        </a:xfrm>
+      </p:grpSpPr>
+      <p:sp>
+        <p:nvSpPr>
+          <p:cNvPr id="523" name="Google Shape;523;p92"/>
+          <p:cNvSpPr txBox="1"/>
+          <p:nvPr>
+            <p:ph idx="1" type="body"/>
+          </p:nvPr>
+        </p:nvSpPr>
+        <p:spPr>
+          <a:xfrm>
+            <a:off x="311700" y="314900"/>
+            <a:ext cx="8520600" cy="4548600"/>
+          </a:xfrm>
+          <a:prstGeom prst="rect">
+            <a:avLst/>
+          </a:prstGeom>
+        </p:spPr>
+        <p:txBody>
+          <a:bodyPr anchorCtr="0" anchor="t" bIns="91425" lIns="91425" spcFirstLastPara="1" rIns="91425" wrap="square" tIns="91425">
+            <a:noAutofit/>
+          </a:bodyPr>
+          <a:lstStyle/>
+          <a:p>
+            <a:pPr indent="0" lvl="0" marL="0" rtl="0" algn="l">
+              <a:lnSpc>
+                <a:spcPct val="95000"/>
+              </a:lnSpc>
+              <a:spcBef>
+                <a:spcPts val="0"/>
+              </a:spcBef>
+              <a:spcAft>
+                <a:spcPts val="0"/>
+              </a:spcAft>
+              <a:buNone/>
+            </a:pPr>
+            <a:r>
+              <a:rPr b="1" lang="en" sz="2600">
+                <a:solidFill>
+                  <a:schemeClr val="accent1"/>
+                </a:solidFill>
+              </a:rPr>
+              <a:t>33. </a:t>
+            </a:r>
+            <a:r>
+              <a:rPr b="1" lang="en" sz="2600">
+                <a:solidFill>
+                  <a:schemeClr val="accent1"/>
+                </a:solidFill>
+              </a:rPr>
+              <a:t>You are testing a mobile application that allows users to find a nearby </a:t>
+            </a:r>
+            <a:r>
+              <a:rPr lang="en" sz="2600"/>
+              <a:t>restaurant based on the type of food they want to eat. Consider the following list of test cases, priorities (i.e., a smaller number means a higher priority), and dependencies: Which of the following test cases should be executed as the third one? </a:t>
+            </a:r>
+            <a:r>
+              <a:rPr lang="en" sz="2600"/>
+              <a:t>Select ONE option.</a:t>
+            </a:r>
+            <a:endParaRPr sz="2600"/>
+          </a:p>
+          <a:p>
+            <a:pPr indent="0" lvl="0" marL="0" rtl="0" algn="l">
+              <a:lnSpc>
+                <a:spcPct val="95000"/>
+              </a:lnSpc>
+              <a:spcBef>
+                <a:spcPts val="1200"/>
+              </a:spcBef>
+              <a:spcAft>
+                <a:spcPts val="0"/>
+              </a:spcAft>
+              <a:buNone/>
+            </a:pPr>
+            <a:r>
+              <a:rPr lang="en" sz="2000"/>
+              <a:t>a) TC 003</a:t>
+            </a:r>
+            <a:endParaRPr sz="2000"/>
+          </a:p>
+          <a:p>
+            <a:pPr indent="0" lvl="0" marL="0" rtl="0" algn="l">
+              <a:lnSpc>
+                <a:spcPct val="95000"/>
+              </a:lnSpc>
+              <a:spcBef>
+                <a:spcPts val="1200"/>
+              </a:spcBef>
+              <a:spcAft>
+                <a:spcPts val="0"/>
+              </a:spcAft>
+              <a:buNone/>
+            </a:pPr>
+            <a:r>
+              <a:rPr lang="en" sz="2000"/>
+              <a:t>b) TC 005</a:t>
+            </a:r>
+            <a:endParaRPr sz="2000"/>
+          </a:p>
+          <a:p>
+            <a:pPr indent="0" lvl="0" marL="0" rtl="0" algn="l">
+              <a:lnSpc>
+                <a:spcPct val="95000"/>
+              </a:lnSpc>
+              <a:spcBef>
+                <a:spcPts val="1200"/>
+              </a:spcBef>
+              <a:spcAft>
+                <a:spcPts val="0"/>
+              </a:spcAft>
+              <a:buNone/>
+            </a:pPr>
+            <a:r>
+              <a:rPr lang="en" sz="2000"/>
+              <a:t>c) TC 002</a:t>
+            </a:r>
+            <a:endParaRPr sz="2000"/>
+          </a:p>
+          <a:p>
+            <a:pPr indent="0" lvl="0" marL="0" rtl="0" algn="l">
+              <a:lnSpc>
+                <a:spcPct val="95000"/>
+              </a:lnSpc>
+              <a:spcBef>
+                <a:spcPts val="1200"/>
+              </a:spcBef>
+              <a:spcAft>
+                <a:spcPts val="1200"/>
+              </a:spcAft>
+              <a:buNone/>
+            </a:pPr>
+            <a:r>
+              <a:rPr lang="en" sz="2000"/>
+              <a:t>d) TC 001</a:t>
+            </a:r>
+            <a:endParaRPr sz="2000"/>
+          </a:p>
+        </p:txBody>
+      </p:sp>
+      <p:pic>
+        <p:nvPicPr>
+          <p:cNvPr id="524" name="Google Shape;524;p92"/>
+          <p:cNvPicPr preferRelativeResize="0"/>
+          <p:nvPr/>
+        </p:nvPicPr>
+        <p:blipFill>
+          <a:blip r:embed="rId3">
+            <a:alphaModFix/>
+          </a:blip>
+          <a:stretch>
+            <a:fillRect/>
+          </a:stretch>
+        </p:blipFill>
+        <p:spPr>
+          <a:xfrm>
+            <a:off x="3162574" y="3333549"/>
+            <a:ext cx="5823976" cy="1529950"/>
+          </a:xfrm>
+          <a:prstGeom prst="rect">
+            <a:avLst/>
+          </a:prstGeom>
+          <a:noFill/>
+          <a:ln>
+            <a:noFill/>
+          </a:ln>
+        </p:spPr>
+      </p:pic>
+    </p:spTree>
+  </p:cSld>
+  <p:clrMapOvr>
+    <a:masterClrMapping/>
+  </p:clrMapOvr>
+</p:sld>
+</file>
+
+<file path=ppt/slides/slide81.xml><?xml version="1.0" encoding="utf-8"?>
+<p:sld xmlns:a="http://schemas.openxmlformats.org/drawingml/2006/main" xmlns:r="http://schemas.openxmlformats.org/officeDocument/2006/relationships" xmlns:mc="http://schemas.openxmlformats.org/markup-compatibility/2006" xmlns:mv="urn:schemas-microsoft-com:mac:vml" xmlns:p="http://schemas.openxmlformats.org/presentationml/2006/main" xmlns:c="http://schemas.openxmlformats.org/drawingml/2006/chart" xmlns:dgm="http://schemas.openxmlformats.org/drawingml/2006/diagram" xmlns:o="urn:schemas-microsoft-com:office:office" xmlns:v="urn:schemas-microsoft-com:vml" xmlns:pvml="urn:schemas-microsoft-com:office:powerpoint" xmlns:com="http://schemas.openxmlformats.org/drawingml/2006/compatibility" xmlns:p14="http://schemas.microsoft.com/office/powerpoint/2010/main" xmlns:p15="http://schemas.microsoft.com/office/powerpoint/2012/main" xmlns:ahyp="http://schemas.microsoft.com/office/drawing/2018/hyperlinkcolor">
+  <p:cSld>
+    <p:spTree>
+      <p:nvGrpSpPr>
+        <p:cNvPr id="528" name="Shape 528"/>
+        <p:cNvGrpSpPr/>
+        <p:nvPr/>
+      </p:nvGrpSpPr>
+      <p:grpSpPr>
+        <a:xfrm>
+          <a:off x="0" y="0"/>
+          <a:ext cx="0" cy="0"/>
+          <a:chOff x="0" y="0"/>
+          <a:chExt cx="0" cy="0"/>
+        </a:xfrm>
+      </p:grpSpPr>
+      <p:sp>
+        <p:nvSpPr>
+          <p:cNvPr id="529" name="Google Shape;529;p93"/>
+          <p:cNvSpPr txBox="1"/>
+          <p:nvPr>
+            <p:ph type="title"/>
+          </p:nvPr>
+        </p:nvSpPr>
+        <p:spPr>
+          <a:xfrm>
+            <a:off x="311700" y="445025"/>
+            <a:ext cx="8520600" cy="707400"/>
+          </a:xfrm>
+          <a:prstGeom prst="rect">
+            <a:avLst/>
+          </a:prstGeom>
+        </p:spPr>
+        <p:txBody>
+          <a:bodyPr anchorCtr="0" anchor="t" bIns="91425" lIns="91425" spcFirstLastPara="1" rIns="91425" wrap="square" tIns="91425">
+            <a:normAutofit fontScale="90000"/>
+          </a:bodyPr>
+          <a:lstStyle/>
+          <a:p>
+            <a:pPr indent="-434340" lvl="0" marL="457200" rtl="0" algn="l">
+              <a:spcBef>
+                <a:spcPts val="0"/>
+              </a:spcBef>
+              <a:spcAft>
+                <a:spcPts val="0"/>
+              </a:spcAft>
+              <a:buSzPct val="100000"/>
+              <a:buAutoNum type="alphaLcParenR"/>
+            </a:pPr>
+            <a:r>
+              <a:rPr lang="en"/>
+              <a:t>Is correct</a:t>
+            </a:r>
+            <a:endParaRPr/>
+          </a:p>
+        </p:txBody>
+      </p:sp>
+      <p:sp>
+        <p:nvSpPr>
+          <p:cNvPr id="530" name="Google Shape;530;p93"/>
+          <p:cNvSpPr txBox="1"/>
+          <p:nvPr>
+            <p:ph idx="1" type="body"/>
+          </p:nvPr>
+        </p:nvSpPr>
+        <p:spPr>
+          <a:xfrm>
+            <a:off x="311700" y="1266325"/>
+            <a:ext cx="8520600" cy="3302700"/>
+          </a:xfrm>
+          <a:prstGeom prst="rect">
+            <a:avLst/>
+          </a:prstGeom>
+        </p:spPr>
+        <p:txBody>
+          <a:bodyPr anchorCtr="0" anchor="t" bIns="91425" lIns="91425" spcFirstLastPara="1" rIns="91425" wrap="square" tIns="91425">
+            <a:normAutofit/>
+          </a:bodyPr>
+          <a:lstStyle/>
+          <a:p>
+            <a:pPr indent="0" lvl="0" marL="0" rtl="0" algn="l">
+              <a:spcBef>
+                <a:spcPts val="0"/>
+              </a:spcBef>
+              <a:spcAft>
+                <a:spcPts val="0"/>
+              </a:spcAft>
+              <a:buNone/>
+            </a:pPr>
+            <a:r>
+              <a:rPr lang="en"/>
+              <a:t>Test TC 001 must come first, followed by TC 002, to satisfy dependencies. Afterwards, TC 003 to satisfy priority and then TC 004, followed by TC 005.</a:t>
+            </a:r>
+            <a:endParaRPr/>
+          </a:p>
+          <a:p>
+            <a:pPr indent="0" lvl="0" marL="0" rtl="0" algn="l">
+              <a:spcBef>
+                <a:spcPts val="1200"/>
+              </a:spcBef>
+              <a:spcAft>
+                <a:spcPts val="0"/>
+              </a:spcAft>
+              <a:buNone/>
+            </a:pPr>
+            <a:r>
+              <a:rPr lang="en"/>
+              <a:t>Thus:</a:t>
+            </a:r>
+            <a:endParaRPr/>
+          </a:p>
+          <a:p>
+            <a:pPr indent="0" lvl="0" marL="0" rtl="0" algn="l">
+              <a:spcBef>
+                <a:spcPts val="1200"/>
+              </a:spcBef>
+              <a:spcAft>
+                <a:spcPts val="0"/>
+              </a:spcAft>
+              <a:buNone/>
+            </a:pPr>
+            <a:r>
+              <a:rPr lang="en">
+                <a:highlight>
+                  <a:schemeClr val="accent6"/>
+                </a:highlight>
+              </a:rPr>
+              <a:t>a) Is correct</a:t>
+            </a:r>
+            <a:endParaRPr>
+              <a:highlight>
+                <a:schemeClr val="accent6"/>
+              </a:highlight>
+            </a:endParaRPr>
+          </a:p>
+          <a:p>
+            <a:pPr indent="0" lvl="0" marL="0" rtl="0" algn="l">
+              <a:spcBef>
+                <a:spcPts val="1200"/>
+              </a:spcBef>
+              <a:spcAft>
+                <a:spcPts val="0"/>
+              </a:spcAft>
+              <a:buNone/>
+            </a:pPr>
+            <a:r>
+              <a:rPr lang="en"/>
+              <a:t>b) Is not correct</a:t>
+            </a:r>
+            <a:endParaRPr/>
+          </a:p>
+          <a:p>
+            <a:pPr indent="0" lvl="0" marL="0" rtl="0" algn="l">
+              <a:spcBef>
+                <a:spcPts val="1200"/>
+              </a:spcBef>
+              <a:spcAft>
+                <a:spcPts val="0"/>
+              </a:spcAft>
+              <a:buNone/>
+            </a:pPr>
+            <a:r>
+              <a:rPr lang="en"/>
+              <a:t>c) Is not correct</a:t>
+            </a:r>
+            <a:endParaRPr/>
+          </a:p>
+          <a:p>
+            <a:pPr indent="0" lvl="0" marL="0" rtl="0" algn="l">
+              <a:spcBef>
+                <a:spcPts val="1200"/>
+              </a:spcBef>
+              <a:spcAft>
+                <a:spcPts val="1200"/>
+              </a:spcAft>
+              <a:buNone/>
+            </a:pPr>
+            <a:r>
+              <a:rPr lang="en"/>
+              <a:t>d) Is not correct</a:t>
+            </a:r>
+            <a:endParaRPr/>
           </a:p>
         </p:txBody>
       </p:sp>
@@ -29391,6 +31315,285 @@
 </file>
 
 <file path=ppt/theme/theme1.xml><?xml version="1.0" encoding="utf-8"?>
+<a:theme xmlns:a="http://schemas.openxmlformats.org/drawingml/2006/main" xmlns:r="http://schemas.openxmlformats.org/officeDocument/2006/relationships" name="Tropic">
+  <a:themeElements>
+    <a:clrScheme name="Tropic">
+      <a:dk1>
+        <a:srgbClr val="A1E8D9"/>
+      </a:dk1>
+      <a:lt1>
+        <a:srgbClr val="FFFFFF"/>
+      </a:lt1>
+      <a:dk2>
+        <a:srgbClr val="695D46"/>
+      </a:dk2>
+      <a:lt2>
+        <a:srgbClr val="B3A77D"/>
+      </a:lt2>
+      <a:accent1>
+        <a:srgbClr val="EF6C00"/>
+      </a:accent1>
+      <a:accent2>
+        <a:srgbClr val="CE93D8"/>
+      </a:accent2>
+      <a:accent3>
+        <a:srgbClr val="4DB6AC"/>
+      </a:accent3>
+      <a:accent4>
+        <a:srgbClr val="FF9800"/>
+      </a:accent4>
+      <a:accent5>
+        <a:srgbClr val="009668"/>
+      </a:accent5>
+      <a:accent6>
+        <a:srgbClr val="EEFF41"/>
+      </a:accent6>
+      <a:hlink>
+        <a:srgbClr val="009668"/>
+      </a:hlink>
+      <a:folHlink>
+        <a:srgbClr val="009668"/>
+      </a:folHlink>
+    </a:clrScheme>
+    <a:fontScheme name="Office">
+      <a:majorFont>
+        <a:latin typeface="Arial"/>
+        <a:ea typeface=""/>
+        <a:cs typeface=""/>
+        <a:font script="Jpan" typeface="ＭＳ Ｐゴシック"/>
+        <a:font script="Hang" typeface="맑은 고딕"/>
+        <a:font script="Hans" typeface="宋体"/>
+        <a:font script="Hant" typeface="新細明體"/>
+        <a:font script="Arab" typeface="Times New Roman"/>
+        <a:font script="Hebr" typeface="Times New Roman"/>
+        <a:font script="Thai" typeface="Angsana New"/>
+        <a:font script="Ethi" typeface="Nyala"/>
+        <a:font script="Beng" typeface="Vrinda"/>
+        <a:font script="Gujr" typeface="Shruti"/>
+        <a:font script="Khmr" typeface="MoolBoran"/>
+        <a:font script="Knda" typeface="Tunga"/>
+        <a:font script="Guru" typeface="Raavi"/>
+        <a:font script="Cans" typeface="Euphemia"/>
+        <a:font script="Cher" typeface="Plantagenet Cherokee"/>
+        <a:font script="Yiii" typeface="Microsoft Yi Baiti"/>
+        <a:font script="Tibt" typeface="Microsoft Himalaya"/>
+        <a:font script="Thaa" typeface="MV Boli"/>
+        <a:font script="Deva" typeface="Mangal"/>
+        <a:font script="Telu" typeface="Gautami"/>
+        <a:font script="Taml" typeface="Latha"/>
+        <a:font script="Syrc" typeface="Estrangelo Edessa"/>
+        <a:font script="Orya" typeface="Kalinga"/>
+        <a:font script="Mlym" typeface="Kartika"/>
+        <a:font script="Laoo" typeface="DokChampa"/>
+        <a:font script="Sinh" typeface="Iskoola Pota"/>
+        <a:font script="Mong" typeface="Mongolian Baiti"/>
+        <a:font script="Viet" typeface="Times New Roman"/>
+        <a:font script="Uigh" typeface="Microsoft Uighur"/>
+        <a:font script="Geor" typeface="Sylfaen"/>
+      </a:majorFont>
+      <a:minorFont>
+        <a:latin typeface="Arial"/>
+        <a:ea typeface=""/>
+        <a:cs typeface=""/>
+        <a:font script="Jpan" typeface="ＭＳ Ｐゴシック"/>
+        <a:font script="Hang" typeface="맑은 고딕"/>
+        <a:font script="Hans" typeface="宋体"/>
+        <a:font script="Hant" typeface="新細明體"/>
+        <a:font script="Arab" typeface="Arial"/>
+        <a:font script="Hebr" typeface="Arial"/>
+        <a:font script="Thai" typeface="Cordia New"/>
+        <a:font script="Ethi" typeface="Nyala"/>
+        <a:font script="Beng" typeface="Vrinda"/>
+        <a:font script="Gujr" typeface="Shruti"/>
+        <a:font script="Khmr" typeface="DaunPenh"/>
+        <a:font script="Knda" typeface="Tunga"/>
+        <a:font script="Guru" typeface="Raavi"/>
+        <a:font script="Cans" typeface="Euphemia"/>
+        <a:font script="Cher" typeface="Plantagenet Cherokee"/>
+        <a:font script="Yiii" typeface="Microsoft Yi Baiti"/>
+        <a:font script="Tibt" typeface="Microsoft Himalaya"/>
+        <a:font script="Thaa" typeface="MV Boli"/>
+        <a:font script="Deva" typeface="Mangal"/>
+        <a:font script="Telu" typeface="Gautami"/>
+        <a:font script="Taml" typeface="Latha"/>
+        <a:font script="Syrc" typeface="Estrangelo Edessa"/>
+        <a:font script="Orya" typeface="Kalinga"/>
+        <a:font script="Mlym" typeface="Kartika"/>
+        <a:font script="Laoo" typeface="DokChampa"/>
+        <a:font script="Sinh" typeface="Iskoola Pota"/>
+        <a:font script="Mong" typeface="Mongolian Baiti"/>
+        <a:font script="Viet" typeface="Arial"/>
+        <a:font script="Uigh" typeface="Microsoft Uighur"/>
+        <a:font script="Geor" typeface="Sylfaen"/>
+      </a:minorFont>
+    </a:fontScheme>
+    <a:fmtScheme name="Office">
+      <a:fillStyleLst>
+        <a:solidFill>
+          <a:schemeClr val="phClr"/>
+        </a:solidFill>
+        <a:gradFill rotWithShape="1">
+          <a:gsLst>
+            <a:gs pos="0">
+              <a:schemeClr val="phClr">
+                <a:tint val="50000"/>
+                <a:satMod val="300000"/>
+              </a:schemeClr>
+            </a:gs>
+            <a:gs pos="35000">
+              <a:schemeClr val="phClr">
+                <a:tint val="37000"/>
+                <a:satMod val="300000"/>
+              </a:schemeClr>
+            </a:gs>
+            <a:gs pos="100000">
+              <a:schemeClr val="phClr">
+                <a:tint val="15000"/>
+                <a:satMod val="350000"/>
+              </a:schemeClr>
+            </a:gs>
+          </a:gsLst>
+          <a:lin ang="16200000" scaled="1"/>
+        </a:gradFill>
+        <a:gradFill rotWithShape="1">
+          <a:gsLst>
+            <a:gs pos="0">
+              <a:schemeClr val="phClr">
+                <a:tint val="100000"/>
+                <a:shade val="100000"/>
+                <a:satMod val="130000"/>
+              </a:schemeClr>
+            </a:gs>
+            <a:gs pos="100000">
+              <a:schemeClr val="phClr">
+                <a:tint val="50000"/>
+                <a:shade val="100000"/>
+                <a:satMod val="350000"/>
+              </a:schemeClr>
+            </a:gs>
+          </a:gsLst>
+          <a:lin ang="16200000" scaled="0"/>
+        </a:gradFill>
+      </a:fillStyleLst>
+      <a:lnStyleLst>
+        <a:ln w="9525" cap="flat" cmpd="sng" algn="ctr">
+          <a:solidFill>
+            <a:schemeClr val="phClr">
+              <a:shade val="95000"/>
+              <a:satMod val="105000"/>
+            </a:schemeClr>
+          </a:solidFill>
+          <a:prstDash val="solid"/>
+        </a:ln>
+        <a:ln w="25400" cap="flat" cmpd="sng" algn="ctr">
+          <a:solidFill>
+            <a:schemeClr val="phClr"/>
+          </a:solidFill>
+          <a:prstDash val="solid"/>
+        </a:ln>
+        <a:ln w="38100" cap="flat" cmpd="sng" algn="ctr">
+          <a:solidFill>
+            <a:schemeClr val="phClr"/>
+          </a:solidFill>
+          <a:prstDash val="solid"/>
+        </a:ln>
+      </a:lnStyleLst>
+      <a:effectStyleLst>
+        <a:effectStyle>
+          <a:effectLst>
+            <a:outerShdw blurRad="40000" dist="20000" dir="5400000" rotWithShape="0">
+              <a:srgbClr val="000000">
+                <a:alpha val="38000"/>
+              </a:srgbClr>
+            </a:outerShdw>
+          </a:effectLst>
+        </a:effectStyle>
+        <a:effectStyle>
+          <a:effectLst>
+            <a:outerShdw blurRad="40000" dist="23000" dir="5400000" rotWithShape="0">
+              <a:srgbClr val="000000">
+                <a:alpha val="35000"/>
+              </a:srgbClr>
+            </a:outerShdw>
+          </a:effectLst>
+        </a:effectStyle>
+        <a:effectStyle>
+          <a:effectLst>
+            <a:outerShdw blurRad="40000" dist="23000" dir="5400000" rotWithShape="0">
+              <a:srgbClr val="000000">
+                <a:alpha val="35000"/>
+              </a:srgbClr>
+            </a:outerShdw>
+          </a:effectLst>
+          <a:scene3d>
+            <a:camera prst="orthographicFront">
+              <a:rot lat="0" lon="0" rev="0"/>
+            </a:camera>
+            <a:lightRig rig="threePt" dir="t">
+              <a:rot lat="0" lon="0" rev="1200000"/>
+            </a:lightRig>
+          </a:scene3d>
+          <a:sp3d>
+            <a:bevelT w="63500" h="25400"/>
+          </a:sp3d>
+        </a:effectStyle>
+      </a:effectStyleLst>
+      <a:bgFillStyleLst>
+        <a:solidFill>
+          <a:schemeClr val="phClr"/>
+        </a:solidFill>
+        <a:gradFill rotWithShape="1">
+          <a:gsLst>
+            <a:gs pos="0">
+              <a:schemeClr val="phClr">
+                <a:tint val="40000"/>
+                <a:satMod val="350000"/>
+              </a:schemeClr>
+            </a:gs>
+            <a:gs pos="40000">
+              <a:schemeClr val="phClr">
+                <a:tint val="45000"/>
+                <a:shade val="99000"/>
+                <a:satMod val="350000"/>
+              </a:schemeClr>
+            </a:gs>
+            <a:gs pos="100000">
+              <a:schemeClr val="phClr">
+                <a:shade val="20000"/>
+                <a:satMod val="255000"/>
+              </a:schemeClr>
+            </a:gs>
+          </a:gsLst>
+          <a:path path="circle">
+            <a:fillToRect l="50000" t="-80000" r="50000" b="180000"/>
+          </a:path>
+        </a:gradFill>
+        <a:gradFill rotWithShape="1">
+          <a:gsLst>
+            <a:gs pos="0">
+              <a:schemeClr val="phClr">
+                <a:tint val="80000"/>
+                <a:satMod val="300000"/>
+              </a:schemeClr>
+            </a:gs>
+            <a:gs pos="100000">
+              <a:schemeClr val="phClr">
+                <a:shade val="30000"/>
+                <a:satMod val="200000"/>
+              </a:schemeClr>
+            </a:gs>
+          </a:gsLst>
+          <a:path path="circle">
+            <a:fillToRect l="50000" t="50000" r="50000" b="50000"/>
+          </a:path>
+        </a:gradFill>
+      </a:bgFillStyleLst>
+    </a:fmtScheme>
+  </a:themeElements>
+</a:theme>
+</file>
+
+<file path=ppt/theme/theme2.xml><?xml version="1.0" encoding="utf-8"?>
 <a:theme xmlns:a="http://schemas.openxmlformats.org/drawingml/2006/main" xmlns:r="http://schemas.openxmlformats.org/officeDocument/2006/relationships">
   <a:themeElements>
     <a:clrScheme name="Default">
@@ -29667,283 +31870,4 @@
     </a:fmtScheme>
   </a:themeElements>
 </a:theme>
-</file>
-
-<file path=ppt/theme/theme2.xml><?xml version="1.0" encoding="utf-8"?>
-<a:theme xmlns:a="http://schemas.openxmlformats.org/drawingml/2006/main" xmlns:r="http://schemas.openxmlformats.org/officeDocument/2006/relationships" name="Tropic">
-  <a:themeElements>
-    <a:clrScheme name="Tropic">
-      <a:dk1>
-        <a:srgbClr val="A1E8D9"/>
-      </a:dk1>
-      <a:lt1>
-        <a:srgbClr val="FFFFFF"/>
-      </a:lt1>
-      <a:dk2>
-        <a:srgbClr val="695D46"/>
-      </a:dk2>
-      <a:lt2>
-        <a:srgbClr val="B3A77D"/>
-      </a:lt2>
-      <a:accent1>
-        <a:srgbClr val="EF6C00"/>
-      </a:accent1>
-      <a:accent2>
-        <a:srgbClr val="CE93D8"/>
-      </a:accent2>
-      <a:accent3>
-        <a:srgbClr val="4DB6AC"/>
-      </a:accent3>
-      <a:accent4>
-        <a:srgbClr val="FF9800"/>
-      </a:accent4>
-      <a:accent5>
-        <a:srgbClr val="009668"/>
-      </a:accent5>
-      <a:accent6>
-        <a:srgbClr val="EEFF41"/>
-      </a:accent6>
-      <a:hlink>
-        <a:srgbClr val="009668"/>
-      </a:hlink>
-      <a:folHlink>
-        <a:srgbClr val="009668"/>
-      </a:folHlink>
-    </a:clrScheme>
-    <a:fontScheme name="Office">
-      <a:majorFont>
-        <a:latin typeface="Arial"/>
-        <a:ea typeface=""/>
-        <a:cs typeface=""/>
-        <a:font script="Jpan" typeface="ＭＳ Ｐゴシック"/>
-        <a:font script="Hang" typeface="맑은 고딕"/>
-        <a:font script="Hans" typeface="宋体"/>
-        <a:font script="Hant" typeface="新細明體"/>
-        <a:font script="Arab" typeface="Times New Roman"/>
-        <a:font script="Hebr" typeface="Times New Roman"/>
-        <a:font script="Thai" typeface="Angsana New"/>
-        <a:font script="Ethi" typeface="Nyala"/>
-        <a:font script="Beng" typeface="Vrinda"/>
-        <a:font script="Gujr" typeface="Shruti"/>
-        <a:font script="Khmr" typeface="MoolBoran"/>
-        <a:font script="Knda" typeface="Tunga"/>
-        <a:font script="Guru" typeface="Raavi"/>
-        <a:font script="Cans" typeface="Euphemia"/>
-        <a:font script="Cher" typeface="Plantagenet Cherokee"/>
-        <a:font script="Yiii" typeface="Microsoft Yi Baiti"/>
-        <a:font script="Tibt" typeface="Microsoft Himalaya"/>
-        <a:font script="Thaa" typeface="MV Boli"/>
-        <a:font script="Deva" typeface="Mangal"/>
-        <a:font script="Telu" typeface="Gautami"/>
-        <a:font script="Taml" typeface="Latha"/>
-        <a:font script="Syrc" typeface="Estrangelo Edessa"/>
-        <a:font script="Orya" typeface="Kalinga"/>
-        <a:font script="Mlym" typeface="Kartika"/>
-        <a:font script="Laoo" typeface="DokChampa"/>
-        <a:font script="Sinh" typeface="Iskoola Pota"/>
-        <a:font script="Mong" typeface="Mongolian Baiti"/>
-        <a:font script="Viet" typeface="Times New Roman"/>
-        <a:font script="Uigh" typeface="Microsoft Uighur"/>
-        <a:font script="Geor" typeface="Sylfaen"/>
-      </a:majorFont>
-      <a:minorFont>
-        <a:latin typeface="Arial"/>
-        <a:ea typeface=""/>
-        <a:cs typeface=""/>
-        <a:font script="Jpan" typeface="ＭＳ Ｐゴシック"/>
-        <a:font script="Hang" typeface="맑은 고딕"/>
-        <a:font script="Hans" typeface="宋体"/>
-        <a:font script="Hant" typeface="新細明體"/>
-        <a:font script="Arab" typeface="Arial"/>
-        <a:font script="Hebr" typeface="Arial"/>
-        <a:font script="Thai" typeface="Cordia New"/>
-        <a:font script="Ethi" typeface="Nyala"/>
-        <a:font script="Beng" typeface="Vrinda"/>
-        <a:font script="Gujr" typeface="Shruti"/>
-        <a:font script="Khmr" typeface="DaunPenh"/>
-        <a:font script="Knda" typeface="Tunga"/>
-        <a:font script="Guru" typeface="Raavi"/>
-        <a:font script="Cans" typeface="Euphemia"/>
-        <a:font script="Cher" typeface="Plantagenet Cherokee"/>
-        <a:font script="Yiii" typeface="Microsoft Yi Baiti"/>
-        <a:font script="Tibt" typeface="Microsoft Himalaya"/>
-        <a:font script="Thaa" typeface="MV Boli"/>
-        <a:font script="Deva" typeface="Mangal"/>
-        <a:font script="Telu" typeface="Gautami"/>
-        <a:font script="Taml" typeface="Latha"/>
-        <a:font script="Syrc" typeface="Estrangelo Edessa"/>
-        <a:font script="Orya" typeface="Kalinga"/>
-        <a:font script="Mlym" typeface="Kartika"/>
-        <a:font script="Laoo" typeface="DokChampa"/>
-        <a:font script="Sinh" typeface="Iskoola Pota"/>
-        <a:font script="Mong" typeface="Mongolian Baiti"/>
-        <a:font script="Viet" typeface="Arial"/>
-        <a:font script="Uigh" typeface="Microsoft Uighur"/>
-        <a:font script="Geor" typeface="Sylfaen"/>
-      </a:minorFont>
-    </a:fontScheme>
-    <a:fmtScheme name="Office">
-      <a:fillStyleLst>
-        <a:solidFill>
-          <a:schemeClr val="phClr"/>
-        </a:solidFill>
-        <a:gradFill rotWithShape="1">
-          <a:gsLst>
-            <a:gs pos="0">
-              <a:schemeClr val="phClr">
-                <a:tint val="50000"/>
-                <a:satMod val="300000"/>
-              </a:schemeClr>
-            </a:gs>
-            <a:gs pos="35000">
-              <a:schemeClr val="phClr">
-                <a:tint val="37000"/>
-                <a:satMod val="300000"/>
-              </a:schemeClr>
-            </a:gs>
-            <a:gs pos="100000">
-              <a:schemeClr val="phClr">
-                <a:tint val="15000"/>
-                <a:satMod val="350000"/>
-              </a:schemeClr>
-            </a:gs>
-          </a:gsLst>
-          <a:lin ang="16200000" scaled="1"/>
-        </a:gradFill>
-        <a:gradFill rotWithShape="1">
-          <a:gsLst>
-            <a:gs pos="0">
-              <a:schemeClr val="phClr">
-                <a:tint val="100000"/>
-                <a:shade val="100000"/>
-                <a:satMod val="130000"/>
-              </a:schemeClr>
-            </a:gs>
-            <a:gs pos="100000">
-              <a:schemeClr val="phClr">
-                <a:tint val="50000"/>
-                <a:shade val="100000"/>
-                <a:satMod val="350000"/>
-              </a:schemeClr>
-            </a:gs>
-          </a:gsLst>
-          <a:lin ang="16200000" scaled="0"/>
-        </a:gradFill>
-      </a:fillStyleLst>
-      <a:lnStyleLst>
-        <a:ln w="9525" cap="flat" cmpd="sng" algn="ctr">
-          <a:solidFill>
-            <a:schemeClr val="phClr">
-              <a:shade val="95000"/>
-              <a:satMod val="105000"/>
-            </a:schemeClr>
-          </a:solidFill>
-          <a:prstDash val="solid"/>
-        </a:ln>
-        <a:ln w="25400" cap="flat" cmpd="sng" algn="ctr">
-          <a:solidFill>
-            <a:schemeClr val="phClr"/>
-          </a:solidFill>
-          <a:prstDash val="solid"/>
-        </a:ln>
-        <a:ln w="38100" cap="flat" cmpd="sng" algn="ctr">
-          <a:solidFill>
-            <a:schemeClr val="phClr"/>
-          </a:solidFill>
-          <a:prstDash val="solid"/>
-        </a:ln>
-      </a:lnStyleLst>
-      <a:effectStyleLst>
-        <a:effectStyle>
-          <a:effectLst>
-            <a:outerShdw blurRad="40000" dist="20000" dir="5400000" rotWithShape="0">
-              <a:srgbClr val="000000">
-                <a:alpha val="38000"/>
-              </a:srgbClr>
-            </a:outerShdw>
-          </a:effectLst>
-        </a:effectStyle>
-        <a:effectStyle>
-          <a:effectLst>
-            <a:outerShdw blurRad="40000" dist="23000" dir="5400000" rotWithShape="0">
-              <a:srgbClr val="000000">
-                <a:alpha val="35000"/>
-              </a:srgbClr>
-            </a:outerShdw>
-          </a:effectLst>
-        </a:effectStyle>
-        <a:effectStyle>
-          <a:effectLst>
-            <a:outerShdw blurRad="40000" dist="23000" dir="5400000" rotWithShape="0">
-              <a:srgbClr val="000000">
-                <a:alpha val="35000"/>
-              </a:srgbClr>
-            </a:outerShdw>
-          </a:effectLst>
-          <a:scene3d>
-            <a:camera prst="orthographicFront">
-              <a:rot lat="0" lon="0" rev="0"/>
-            </a:camera>
-            <a:lightRig rig="threePt" dir="t">
-              <a:rot lat="0" lon="0" rev="1200000"/>
-            </a:lightRig>
-          </a:scene3d>
-          <a:sp3d>
-            <a:bevelT w="63500" h="25400"/>
-          </a:sp3d>
-        </a:effectStyle>
-      </a:effectStyleLst>
-      <a:bgFillStyleLst>
-        <a:solidFill>
-          <a:schemeClr val="phClr"/>
-        </a:solidFill>
-        <a:gradFill rotWithShape="1">
-          <a:gsLst>
-            <a:gs pos="0">
-              <a:schemeClr val="phClr">
-                <a:tint val="40000"/>
-                <a:satMod val="350000"/>
-              </a:schemeClr>
-            </a:gs>
-            <a:gs pos="40000">
-              <a:schemeClr val="phClr">
-                <a:tint val="45000"/>
-                <a:shade val="99000"/>
-                <a:satMod val="350000"/>
-              </a:schemeClr>
-            </a:gs>
-            <a:gs pos="100000">
-              <a:schemeClr val="phClr">
-                <a:shade val="20000"/>
-                <a:satMod val="255000"/>
-              </a:schemeClr>
-            </a:gs>
-          </a:gsLst>
-          <a:path path="circle">
-            <a:fillToRect l="50000" t="-80000" r="50000" b="180000"/>
-          </a:path>
-        </a:gradFill>
-        <a:gradFill rotWithShape="1">
-          <a:gsLst>
-            <a:gs pos="0">
-              <a:schemeClr val="phClr">
-                <a:tint val="80000"/>
-                <a:satMod val="300000"/>
-              </a:schemeClr>
-            </a:gs>
-            <a:gs pos="100000">
-              <a:schemeClr val="phClr">
-                <a:shade val="30000"/>
-                <a:satMod val="200000"/>
-              </a:schemeClr>
-            </a:gs>
-          </a:gsLst>
-          <a:path path="circle">
-            <a:fillToRect l="50000" t="50000" r="50000" b="50000"/>
-          </a:path>
-        </a:gradFill>
-      </a:bgFillStyleLst>
-    </a:fmtScheme>
-  </a:themeElements>
-</a:theme>
 </file>
</xml_diff>